<commit_message>
Add clipboard test to ConvertToPicture test
</commit_message>
<xml_diff>
--- a/doc/test/ShortcutsLab/ConvertToPicture.pptx
+++ b/doc/test/ShortcutsLab/ConvertToPicture.pptx
@@ -7,7 +7,7 @@
     <p:sldMasterId id="2147483672" r:id="rId3"/>
   </p:sldMasterIdLst>
   <p:notesMasterIdLst>
-    <p:notesMasterId r:id="rId13"/>
+    <p:notesMasterId r:id="rId16"/>
   </p:notesMasterIdLst>
   <p:sldIdLst>
     <p:sldId id="287" r:id="rId4"/>
@@ -18,7 +18,10 @@
     <p:sldId id="295" r:id="rId9"/>
     <p:sldId id="296" r:id="rId10"/>
     <p:sldId id="297" r:id="rId11"/>
-    <p:sldId id="274" r:id="rId12"/>
+    <p:sldId id="298" r:id="rId12"/>
+    <p:sldId id="299" r:id="rId13"/>
+    <p:sldId id="300" r:id="rId14"/>
+    <p:sldId id="274" r:id="rId15"/>
   </p:sldIdLst>
   <p:sldSz cx="9144000" cy="6858000" type="screen4x3"/>
   <p:notesSz cx="6858000" cy="9144000"/>
@@ -134,6 +137,9 @@
             <p14:sldId id="295"/>
             <p14:sldId id="296"/>
             <p14:sldId id="297"/>
+            <p14:sldId id="298"/>
+            <p14:sldId id="299"/>
+            <p14:sldId id="300"/>
             <p14:sldId id="274"/>
           </p14:sldIdLst>
         </p14:section>
@@ -239,7 +245,7 @@
           <a:p>
             <a:fld id="{26004F41-C1A1-4B0D-9EEE-5E3F0E5BC108}" type="datetimeFigureOut">
               <a:rPr lang="en-SG" smtClean="0"/>
-              <a:t>11/6/2015</a:t>
+              <a:t>3/2/2018</a:t>
             </a:fld>
             <a:endParaRPr lang="en-SG"/>
           </a:p>
@@ -688,7 +694,7 @@
           <a:p>
             <a:fld id="{699DC775-C286-4358-8C92-D7E584E969B3}" type="datetimeFigureOut">
               <a:rPr lang="en-US" smtClean="0"/>
-              <a:t>6/11/2015</a:t>
+              <a:t>2/3/2018</a:t>
             </a:fld>
             <a:endParaRPr lang="en-US"/>
           </a:p>
@@ -858,7 +864,7 @@
           <a:p>
             <a:fld id="{699DC775-C286-4358-8C92-D7E584E969B3}" type="datetimeFigureOut">
               <a:rPr lang="en-US" smtClean="0"/>
-              <a:t>6/11/2015</a:t>
+              <a:t>2/3/2018</a:t>
             </a:fld>
             <a:endParaRPr lang="en-US"/>
           </a:p>
@@ -1038,7 +1044,7 @@
           <a:p>
             <a:fld id="{699DC775-C286-4358-8C92-D7E584E969B3}" type="datetimeFigureOut">
               <a:rPr lang="en-US" smtClean="0"/>
-              <a:t>6/11/2015</a:t>
+              <a:t>2/3/2018</a:t>
             </a:fld>
             <a:endParaRPr lang="en-US"/>
           </a:p>
@@ -1280,7 +1286,7 @@
           <a:p>
             <a:fld id="{699DC775-C286-4358-8C92-D7E584E969B3}" type="datetimeFigureOut">
               <a:rPr lang="en-US" smtClean="0"/>
-              <a:t>6/11/2015</a:t>
+              <a:t>2/3/2018</a:t>
             </a:fld>
             <a:endParaRPr lang="en-US"/>
           </a:p>
@@ -1450,7 +1456,7 @@
           <a:p>
             <a:fld id="{699DC775-C286-4358-8C92-D7E584E969B3}" type="datetimeFigureOut">
               <a:rPr lang="en-US" smtClean="0"/>
-              <a:t>6/11/2015</a:t>
+              <a:t>2/3/2018</a:t>
             </a:fld>
             <a:endParaRPr lang="en-US"/>
           </a:p>
@@ -1696,7 +1702,7 @@
           <a:p>
             <a:fld id="{699DC775-C286-4358-8C92-D7E584E969B3}" type="datetimeFigureOut">
               <a:rPr lang="en-US" smtClean="0"/>
-              <a:t>6/11/2015</a:t>
+              <a:t>2/3/2018</a:t>
             </a:fld>
             <a:endParaRPr lang="en-US"/>
           </a:p>
@@ -1984,7 +1990,7 @@
           <a:p>
             <a:fld id="{699DC775-C286-4358-8C92-D7E584E969B3}" type="datetimeFigureOut">
               <a:rPr lang="en-US" smtClean="0"/>
-              <a:t>6/11/2015</a:t>
+              <a:t>2/3/2018</a:t>
             </a:fld>
             <a:endParaRPr lang="en-US"/>
           </a:p>
@@ -2406,7 +2412,7 @@
           <a:p>
             <a:fld id="{699DC775-C286-4358-8C92-D7E584E969B3}" type="datetimeFigureOut">
               <a:rPr lang="en-US" smtClean="0"/>
-              <a:t>6/11/2015</a:t>
+              <a:t>2/3/2018</a:t>
             </a:fld>
             <a:endParaRPr lang="en-US"/>
           </a:p>
@@ -2524,7 +2530,7 @@
           <a:p>
             <a:fld id="{699DC775-C286-4358-8C92-D7E584E969B3}" type="datetimeFigureOut">
               <a:rPr lang="en-US" smtClean="0"/>
-              <a:t>6/11/2015</a:t>
+              <a:t>2/3/2018</a:t>
             </a:fld>
             <a:endParaRPr lang="en-US"/>
           </a:p>
@@ -2619,7 +2625,7 @@
           <a:p>
             <a:fld id="{699DC775-C286-4358-8C92-D7E584E969B3}" type="datetimeFigureOut">
               <a:rPr lang="en-US" smtClean="0"/>
-              <a:t>6/11/2015</a:t>
+              <a:t>2/3/2018</a:t>
             </a:fld>
             <a:endParaRPr lang="en-US"/>
           </a:p>
@@ -2896,7 +2902,7 @@
           <a:p>
             <a:fld id="{699DC775-C286-4358-8C92-D7E584E969B3}" type="datetimeFigureOut">
               <a:rPr lang="en-US" smtClean="0"/>
-              <a:t>6/11/2015</a:t>
+              <a:t>2/3/2018</a:t>
             </a:fld>
             <a:endParaRPr lang="en-US"/>
           </a:p>
@@ -3066,7 +3072,7 @@
           <a:p>
             <a:fld id="{699DC775-C286-4358-8C92-D7E584E969B3}" type="datetimeFigureOut">
               <a:rPr lang="en-US" smtClean="0"/>
-              <a:t>6/11/2015</a:t>
+              <a:t>2/3/2018</a:t>
             </a:fld>
             <a:endParaRPr lang="en-US"/>
           </a:p>
@@ -3319,7 +3325,7 @@
           <a:p>
             <a:fld id="{699DC775-C286-4358-8C92-D7E584E969B3}" type="datetimeFigureOut">
               <a:rPr lang="en-US" smtClean="0"/>
-              <a:t>6/11/2015</a:t>
+              <a:t>2/3/2018</a:t>
             </a:fld>
             <a:endParaRPr lang="en-US"/>
           </a:p>
@@ -3489,7 +3495,7 @@
           <a:p>
             <a:fld id="{699DC775-C286-4358-8C92-D7E584E969B3}" type="datetimeFigureOut">
               <a:rPr lang="en-US" smtClean="0"/>
-              <a:t>6/11/2015</a:t>
+              <a:t>2/3/2018</a:t>
             </a:fld>
             <a:endParaRPr lang="en-US"/>
           </a:p>
@@ -3669,7 +3675,7 @@
           <a:p>
             <a:fld id="{699DC775-C286-4358-8C92-D7E584E969B3}" type="datetimeFigureOut">
               <a:rPr lang="en-US" smtClean="0"/>
-              <a:t>6/11/2015</a:t>
+              <a:t>2/3/2018</a:t>
             </a:fld>
             <a:endParaRPr lang="en-US"/>
           </a:p>
@@ -3919,7 +3925,7 @@
           <a:p>
             <a:fld id="{699DC775-C286-4358-8C92-D7E584E969B3}" type="datetimeFigureOut">
               <a:rPr lang="en-US" smtClean="0"/>
-              <a:t>6/11/2015</a:t>
+              <a:t>2/3/2018</a:t>
             </a:fld>
             <a:endParaRPr lang="en-US"/>
           </a:p>
@@ -4097,7 +4103,7 @@
           <a:p>
             <a:fld id="{699DC775-C286-4358-8C92-D7E584E969B3}" type="datetimeFigureOut">
               <a:rPr lang="en-US" smtClean="0"/>
-              <a:t>6/11/2015</a:t>
+              <a:t>2/3/2018</a:t>
             </a:fld>
             <a:endParaRPr lang="en-US"/>
           </a:p>
@@ -4351,7 +4357,7 @@
           <a:p>
             <a:fld id="{699DC775-C286-4358-8C92-D7E584E969B3}" type="datetimeFigureOut">
               <a:rPr lang="en-US" smtClean="0"/>
-              <a:t>6/11/2015</a:t>
+              <a:t>2/3/2018</a:t>
             </a:fld>
             <a:endParaRPr lang="en-US"/>
           </a:p>
@@ -4647,7 +4653,7 @@
           <a:p>
             <a:fld id="{699DC775-C286-4358-8C92-D7E584E969B3}" type="datetimeFigureOut">
               <a:rPr lang="en-US" smtClean="0"/>
-              <a:t>6/11/2015</a:t>
+              <a:t>2/3/2018</a:t>
             </a:fld>
             <a:endParaRPr lang="en-US"/>
           </a:p>
@@ -5077,7 +5083,7 @@
           <a:p>
             <a:fld id="{699DC775-C286-4358-8C92-D7E584E969B3}" type="datetimeFigureOut">
               <a:rPr lang="en-US" smtClean="0"/>
-              <a:t>6/11/2015</a:t>
+              <a:t>2/3/2018</a:t>
             </a:fld>
             <a:endParaRPr lang="en-US"/>
           </a:p>
@@ -5203,7 +5209,7 @@
           <a:p>
             <a:fld id="{699DC775-C286-4358-8C92-D7E584E969B3}" type="datetimeFigureOut">
               <a:rPr lang="en-US" smtClean="0"/>
-              <a:t>6/11/2015</a:t>
+              <a:t>2/3/2018</a:t>
             </a:fld>
             <a:endParaRPr lang="en-US"/>
           </a:p>
@@ -5306,7 +5312,7 @@
           <a:p>
             <a:fld id="{699DC775-C286-4358-8C92-D7E584E969B3}" type="datetimeFigureOut">
               <a:rPr lang="en-US" smtClean="0"/>
-              <a:t>6/11/2015</a:t>
+              <a:t>2/3/2018</a:t>
             </a:fld>
             <a:endParaRPr lang="en-US"/>
           </a:p>
@@ -5552,7 +5558,7 @@
           <a:p>
             <a:fld id="{699DC775-C286-4358-8C92-D7E584E969B3}" type="datetimeFigureOut">
               <a:rPr lang="en-US" smtClean="0"/>
-              <a:t>6/11/2015</a:t>
+              <a:t>2/3/2018</a:t>
             </a:fld>
             <a:endParaRPr lang="en-US"/>
           </a:p>
@@ -5837,7 +5843,7 @@
           <a:p>
             <a:fld id="{699DC775-C286-4358-8C92-D7E584E969B3}" type="datetimeFigureOut">
               <a:rPr lang="en-US" smtClean="0"/>
-              <a:t>6/11/2015</a:t>
+              <a:t>2/3/2018</a:t>
             </a:fld>
             <a:endParaRPr lang="en-US"/>
           </a:p>
@@ -6098,7 +6104,7 @@
           <a:p>
             <a:fld id="{699DC775-C286-4358-8C92-D7E584E969B3}" type="datetimeFigureOut">
               <a:rPr lang="en-US" smtClean="0"/>
-              <a:t>6/11/2015</a:t>
+              <a:t>2/3/2018</a:t>
             </a:fld>
             <a:endParaRPr lang="en-US"/>
           </a:p>
@@ -6276,7 +6282,7 @@
           <a:p>
             <a:fld id="{699DC775-C286-4358-8C92-D7E584E969B3}" type="datetimeFigureOut">
               <a:rPr lang="en-US" smtClean="0"/>
-              <a:t>6/11/2015</a:t>
+              <a:t>2/3/2018</a:t>
             </a:fld>
             <a:endParaRPr lang="en-US"/>
           </a:p>
@@ -6464,7 +6470,7 @@
           <a:p>
             <a:fld id="{699DC775-C286-4358-8C92-D7E584E969B3}" type="datetimeFigureOut">
               <a:rPr lang="en-US" smtClean="0"/>
-              <a:t>6/11/2015</a:t>
+              <a:t>2/3/2018</a:t>
             </a:fld>
             <a:endParaRPr lang="en-US"/>
           </a:p>
@@ -6752,7 +6758,7 @@
           <a:p>
             <a:fld id="{699DC775-C286-4358-8C92-D7E584E969B3}" type="datetimeFigureOut">
               <a:rPr lang="en-US" smtClean="0"/>
-              <a:t>6/11/2015</a:t>
+              <a:t>2/3/2018</a:t>
             </a:fld>
             <a:endParaRPr lang="en-US"/>
           </a:p>
@@ -7174,7 +7180,7 @@
           <a:p>
             <a:fld id="{699DC775-C286-4358-8C92-D7E584E969B3}" type="datetimeFigureOut">
               <a:rPr lang="en-US" smtClean="0"/>
-              <a:t>6/11/2015</a:t>
+              <a:t>2/3/2018</a:t>
             </a:fld>
             <a:endParaRPr lang="en-US"/>
           </a:p>
@@ -7292,7 +7298,7 @@
           <a:p>
             <a:fld id="{699DC775-C286-4358-8C92-D7E584E969B3}" type="datetimeFigureOut">
               <a:rPr lang="en-US" smtClean="0"/>
-              <a:t>6/11/2015</a:t>
+              <a:t>2/3/2018</a:t>
             </a:fld>
             <a:endParaRPr lang="en-US"/>
           </a:p>
@@ -7387,7 +7393,7 @@
           <a:p>
             <a:fld id="{699DC775-C286-4358-8C92-D7E584E969B3}" type="datetimeFigureOut">
               <a:rPr lang="en-US" smtClean="0"/>
-              <a:t>6/11/2015</a:t>
+              <a:t>2/3/2018</a:t>
             </a:fld>
             <a:endParaRPr lang="en-US"/>
           </a:p>
@@ -7664,7 +7670,7 @@
           <a:p>
             <a:fld id="{699DC775-C286-4358-8C92-D7E584E969B3}" type="datetimeFigureOut">
               <a:rPr lang="en-US" smtClean="0"/>
-              <a:t>6/11/2015</a:t>
+              <a:t>2/3/2018</a:t>
             </a:fld>
             <a:endParaRPr lang="en-US"/>
           </a:p>
@@ -7917,7 +7923,7 @@
           <a:p>
             <a:fld id="{699DC775-C286-4358-8C92-D7E584E969B3}" type="datetimeFigureOut">
               <a:rPr lang="en-US" smtClean="0"/>
-              <a:t>6/11/2015</a:t>
+              <a:t>2/3/2018</a:t>
             </a:fld>
             <a:endParaRPr lang="en-US"/>
           </a:p>
@@ -8130,7 +8136,7 @@
           <a:p>
             <a:fld id="{699DC775-C286-4358-8C92-D7E584E969B3}" type="datetimeFigureOut">
               <a:rPr lang="en-US" smtClean="0"/>
-              <a:t>6/11/2015</a:t>
+              <a:t>2/3/2018</a:t>
             </a:fld>
             <a:endParaRPr lang="en-US"/>
           </a:p>
@@ -8645,7 +8651,7 @@
           <a:p>
             <a:fld id="{699DC775-C286-4358-8C92-D7E584E969B3}" type="datetimeFigureOut">
               <a:rPr lang="en-US" smtClean="0"/>
-              <a:t>6/11/2015</a:t>
+              <a:t>2/3/2018</a:t>
             </a:fld>
             <a:endParaRPr lang="en-US"/>
           </a:p>
@@ -9158,7 +9164,7 @@
           <a:p>
             <a:fld id="{699DC775-C286-4358-8C92-D7E584E969B3}" type="datetimeFigureOut">
               <a:rPr lang="en-US" smtClean="0"/>
-              <a:t>6/11/2015</a:t>
+              <a:t>2/3/2018</a:t>
             </a:fld>
             <a:endParaRPr lang="en-US"/>
           </a:p>
@@ -9713,6 +9719,407 @@
 </p:sld>
 </file>
 
+<file path=ppt/slides/slide10.xml><?xml version="1.0" encoding="utf-8"?>
+<p:sld xmlns:a="http://schemas.openxmlformats.org/drawingml/2006/main" xmlns:r="http://schemas.openxmlformats.org/officeDocument/2006/relationships" xmlns:p="http://schemas.openxmlformats.org/presentationml/2006/main">
+  <p:cSld>
+    <p:bg>
+      <p:bgPr>
+        <a:solidFill>
+          <a:schemeClr val="bg1"/>
+        </a:solidFill>
+        <a:effectLst/>
+      </p:bgPr>
+    </p:bg>
+    <p:spTree>
+      <p:nvGrpSpPr>
+        <p:cNvPr id="1" name=""/>
+        <p:cNvGrpSpPr/>
+        <p:nvPr/>
+      </p:nvGrpSpPr>
+      <p:grpSpPr>
+        <a:xfrm>
+          <a:off x="0" y="0"/>
+          <a:ext cx="0" cy="0"/>
+          <a:chOff x="0" y="0"/>
+          <a:chExt cx="0" cy="0"/>
+        </a:xfrm>
+      </p:grpSpPr>
+      <p:sp>
+        <p:nvSpPr>
+          <p:cNvPr id="3" name="pic"/>
+          <p:cNvSpPr/>
+          <p:nvPr/>
+        </p:nvSpPr>
+        <p:spPr>
+          <a:xfrm rot="7571245">
+            <a:off x="2125465" y="2452494"/>
+            <a:ext cx="1946355" cy="1534029"/>
+          </a:xfrm>
+          <a:prstGeom prst="ellipse">
+            <a:avLst/>
+          </a:prstGeom>
+          <a:solidFill>
+            <a:schemeClr val="accent2">
+              <a:alpha val="74000"/>
+            </a:schemeClr>
+          </a:solidFill>
+          <a:ln w="762000" cmpd="sng">
+            <a:gradFill>
+              <a:gsLst>
+                <a:gs pos="0">
+                  <a:schemeClr val="accent1">
+                    <a:lumMod val="5000"/>
+                    <a:lumOff val="95000"/>
+                  </a:schemeClr>
+                </a:gs>
+                <a:gs pos="74000">
+                  <a:schemeClr val="accent1">
+                    <a:lumMod val="45000"/>
+                    <a:lumOff val="55000"/>
+                  </a:schemeClr>
+                </a:gs>
+                <a:gs pos="83000">
+                  <a:schemeClr val="accent1">
+                    <a:lumMod val="45000"/>
+                    <a:lumOff val="55000"/>
+                  </a:schemeClr>
+                </a:gs>
+                <a:gs pos="100000">
+                  <a:schemeClr val="accent1">
+                    <a:lumMod val="30000"/>
+                    <a:lumOff val="70000"/>
+                  </a:schemeClr>
+                </a:gs>
+              </a:gsLst>
+              <a:lin ang="5400000" scaled="1"/>
+            </a:gradFill>
+          </a:ln>
+        </p:spPr>
+        <p:style>
+          <a:lnRef idx="2">
+            <a:schemeClr val="accent1">
+              <a:shade val="50000"/>
+            </a:schemeClr>
+          </a:lnRef>
+          <a:fillRef idx="1">
+            <a:schemeClr val="accent1"/>
+          </a:fillRef>
+          <a:effectRef idx="0">
+            <a:schemeClr val="accent1"/>
+          </a:effectRef>
+          <a:fontRef idx="minor">
+            <a:schemeClr val="lt1"/>
+          </a:fontRef>
+        </p:style>
+        <p:txBody>
+          <a:bodyPr rtlCol="0" anchor="ctr"/>
+          <a:lstStyle/>
+          <a:p>
+            <a:pPr algn="ctr"/>
+            <a:endParaRPr lang="en-US" sz="6000" dirty="0" smtClean="0"/>
+          </a:p>
+        </p:txBody>
+      </p:sp>
+      <p:pic>
+        <p:nvPicPr>
+          <p:cNvPr id="5" name="pictocopy"/>
+          <p:cNvPicPr>
+            <a:picLocks noChangeAspect="1"/>
+          </p:cNvPicPr>
+          <p:nvPr/>
+        </p:nvPicPr>
+        <p:blipFill>
+          <a:blip r:embed="rId2"/>
+          <a:stretch>
+            <a:fillRect/>
+          </a:stretch>
+        </p:blipFill>
+        <p:spPr>
+          <a:xfrm>
+            <a:off x="5722538" y="2066426"/>
+            <a:ext cx="1889924" cy="2725148"/>
+          </a:xfrm>
+          <a:prstGeom prst="rect">
+            <a:avLst/>
+          </a:prstGeom>
+        </p:spPr>
+      </p:pic>
+    </p:spTree>
+    <p:extLst>
+      <p:ext uri="{BB962C8B-B14F-4D97-AF65-F5344CB8AC3E}">
+        <p14:creationId xmlns:p14="http://schemas.microsoft.com/office/powerpoint/2010/main" val="790512211"/>
+      </p:ext>
+    </p:extLst>
+  </p:cSld>
+  <p:clrMapOvr>
+    <a:masterClrMapping/>
+  </p:clrMapOvr>
+  <p:timing>
+    <p:tnLst>
+      <p:par>
+        <p:cTn id="1" dur="indefinite" restart="never" nodeType="tmRoot"/>
+      </p:par>
+    </p:tnLst>
+  </p:timing>
+</p:sld>
+</file>
+
+<file path=ppt/slides/slide11.xml><?xml version="1.0" encoding="utf-8"?>
+<p:sld xmlns:a="http://schemas.openxmlformats.org/drawingml/2006/main" xmlns:r="http://schemas.openxmlformats.org/officeDocument/2006/relationships" xmlns:p="http://schemas.openxmlformats.org/presentationml/2006/main">
+  <p:cSld>
+    <p:bg>
+      <p:bgPr>
+        <a:solidFill>
+          <a:schemeClr val="bg1"/>
+        </a:solidFill>
+        <a:effectLst/>
+      </p:bgPr>
+    </p:bg>
+    <p:spTree>
+      <p:nvGrpSpPr>
+        <p:cNvPr id="1" name=""/>
+        <p:cNvGrpSpPr/>
+        <p:nvPr/>
+      </p:nvGrpSpPr>
+      <p:grpSpPr>
+        <a:xfrm>
+          <a:off x="0" y="0"/>
+          <a:ext cx="0" cy="0"/>
+          <a:chOff x="0" y="0"/>
+          <a:chExt cx="0" cy="0"/>
+        </a:xfrm>
+      </p:grpSpPr>
+      <p:pic>
+        <p:nvPicPr>
+          <p:cNvPr id="2" name="Picture 1"/>
+          <p:cNvPicPr>
+            <a:picLocks noChangeAspect="1"/>
+          </p:cNvPicPr>
+          <p:nvPr/>
+        </p:nvPicPr>
+        <p:blipFill>
+          <a:blip r:embed="rId2"/>
+          <a:stretch>
+            <a:fillRect/>
+          </a:stretch>
+        </p:blipFill>
+        <p:spPr>
+          <a:xfrm rot="7571245">
+            <a:off x="1745213" y="2070313"/>
+            <a:ext cx="2706859" cy="2298391"/>
+          </a:xfrm>
+          <a:prstGeom prst="rect">
+            <a:avLst/>
+          </a:prstGeom>
+        </p:spPr>
+      </p:pic>
+      <p:pic>
+        <p:nvPicPr>
+          <p:cNvPr id="5" name="pictocopy"/>
+          <p:cNvPicPr>
+            <a:picLocks noChangeAspect="1"/>
+          </p:cNvPicPr>
+          <p:nvPr/>
+        </p:nvPicPr>
+        <p:blipFill>
+          <a:blip r:embed="rId3"/>
+          <a:stretch>
+            <a:fillRect/>
+          </a:stretch>
+        </p:blipFill>
+        <p:spPr>
+          <a:xfrm>
+            <a:off x="5722538" y="2066426"/>
+            <a:ext cx="1889924" cy="2725148"/>
+          </a:xfrm>
+          <a:prstGeom prst="rect">
+            <a:avLst/>
+          </a:prstGeom>
+        </p:spPr>
+      </p:pic>
+      <p:pic>
+        <p:nvPicPr>
+          <p:cNvPr id="6" name="pictocopy"/>
+          <p:cNvPicPr>
+            <a:picLocks noChangeAspect="1"/>
+          </p:cNvPicPr>
+          <p:nvPr/>
+        </p:nvPicPr>
+        <p:blipFill>
+          <a:blip r:embed="rId3"/>
+          <a:stretch>
+            <a:fillRect/>
+          </a:stretch>
+        </p:blipFill>
+        <p:spPr>
+          <a:xfrm>
+            <a:off x="5874938" y="2218826"/>
+            <a:ext cx="1889924" cy="2725148"/>
+          </a:xfrm>
+          <a:prstGeom prst="rect">
+            <a:avLst/>
+          </a:prstGeom>
+        </p:spPr>
+      </p:pic>
+      <p:sp>
+        <p:nvSpPr>
+          <p:cNvPr id="7" name="text 3"/>
+          <p:cNvSpPr txBox="1"/>
+          <p:nvPr/>
+        </p:nvSpPr>
+        <p:spPr>
+          <a:xfrm>
+            <a:off x="953869" y="6096000"/>
+            <a:ext cx="7742761" cy="523220"/>
+          </a:xfrm>
+          <a:prstGeom prst="rect">
+            <a:avLst/>
+          </a:prstGeom>
+          <a:noFill/>
+        </p:spPr>
+        <p:txBody>
+          <a:bodyPr wrap="none" rtlCol="0">
+            <a:spAutoFit/>
+          </a:bodyPr>
+          <a:lstStyle/>
+          <a:p>
+            <a:r>
+              <a:rPr lang="en-US" sz="2800" b="1" dirty="0" smtClean="0">
+                <a:solidFill>
+                  <a:schemeClr val="accent1"/>
+                </a:solidFill>
+              </a:rPr>
+              <a:t>Expected Output </a:t>
+            </a:r>
+            <a:r>
+              <a:rPr lang="en-US" sz="2800" b="1" dirty="0" smtClean="0">
+                <a:solidFill>
+                  <a:schemeClr val="accent1"/>
+                </a:solidFill>
+              </a:rPr>
+              <a:t>(pasted object is the right shape )</a:t>
+            </a:r>
+            <a:endParaRPr lang="en-SG" sz="2800" b="1" dirty="0">
+              <a:solidFill>
+                <a:schemeClr val="accent1"/>
+              </a:solidFill>
+            </a:endParaRPr>
+          </a:p>
+        </p:txBody>
+      </p:sp>
+    </p:spTree>
+    <p:extLst>
+      <p:ext uri="{BB962C8B-B14F-4D97-AF65-F5344CB8AC3E}">
+        <p14:creationId xmlns:p14="http://schemas.microsoft.com/office/powerpoint/2010/main" val="2560272120"/>
+      </p:ext>
+    </p:extLst>
+  </p:cSld>
+  <p:clrMapOvr>
+    <a:masterClrMapping/>
+  </p:clrMapOvr>
+  <p:timing>
+    <p:tnLst>
+      <p:par>
+        <p:cTn id="1" dur="indefinite" restart="never" nodeType="tmRoot"/>
+      </p:par>
+    </p:tnLst>
+  </p:timing>
+</p:sld>
+</file>
+
+<file path=ppt/slides/slide12.xml><?xml version="1.0" encoding="utf-8"?>
+<p:sld xmlns:a="http://schemas.openxmlformats.org/drawingml/2006/main" xmlns:r="http://schemas.openxmlformats.org/officeDocument/2006/relationships" xmlns:p="http://schemas.openxmlformats.org/presentationml/2006/main" show="0">
+  <p:cSld name="PPAck201403240026082737">
+    <p:spTree>
+      <p:nvGrpSpPr>
+        <p:cNvPr id="1" name=""/>
+        <p:cNvGrpSpPr/>
+        <p:nvPr/>
+      </p:nvGrpSpPr>
+      <p:grpSpPr>
+        <a:xfrm>
+          <a:off x="0" y="0"/>
+          <a:ext cx="0" cy="0"/>
+          <a:chOff x="0" y="0"/>
+          <a:chExt cx="0" cy="0"/>
+        </a:xfrm>
+      </p:grpSpPr>
+      <p:sp>
+        <p:nvSpPr>
+          <p:cNvPr id="2" name="标题 1"/>
+          <p:cNvSpPr>
+            <a:spLocks noGrp="1"/>
+          </p:cNvSpPr>
+          <p:nvPr>
+            <p:ph type="title"/>
+          </p:nvPr>
+        </p:nvSpPr>
+        <p:spPr/>
+        <p:txBody>
+          <a:bodyPr/>
+          <a:lstStyle/>
+          <a:p>
+            <a:endParaRPr lang="en-SG"/>
+          </a:p>
+        </p:txBody>
+      </p:sp>
+      <p:pic>
+        <p:nvPicPr>
+          <p:cNvPr id="4" name="内容占位符 3"/>
+          <p:cNvPicPr>
+            <a:picLocks noGrp="1"/>
+          </p:cNvPicPr>
+          <p:nvPr>
+            <p:ph idx="1"/>
+          </p:nvPr>
+        </p:nvPicPr>
+        <p:blipFill>
+          <a:blip r:embed="rId2">
+            <a:extLst>
+              <a:ext uri="{28A0092B-C50C-407E-A947-70E740481C1C}">
+                <a14:useLocalDpi xmlns:a14="http://schemas.microsoft.com/office/drawing/2010/main" val="0"/>
+              </a:ext>
+            </a:extLst>
+          </a:blip>
+          <a:stretch>
+            <a:fillRect/>
+          </a:stretch>
+        </p:blipFill>
+        <p:spPr>
+          <a:xfrm>
+            <a:off x="1074665" y="1600200"/>
+            <a:ext cx="6994670" cy="4525963"/>
+          </a:xfrm>
+        </p:spPr>
+      </p:pic>
+    </p:spTree>
+    <p:extLst>
+      <p:ext uri="{BB962C8B-B14F-4D97-AF65-F5344CB8AC3E}">
+        <p14:creationId xmlns:p14="http://schemas.microsoft.com/office/powerpoint/2010/main" val="2306293579"/>
+      </p:ext>
+    </p:extLst>
+  </p:cSld>
+  <p:clrMapOvr>
+    <a:masterClrMapping/>
+  </p:clrMapOvr>
+  <mc:AlternateContent xmlns:mc="http://schemas.openxmlformats.org/markup-compatibility/2006" xmlns:p14="http://schemas.microsoft.com/office/powerpoint/2010/main">
+    <mc:Choice Requires="p14">
+      <p:transition spd="slow" p14:dur="2000"/>
+    </mc:Choice>
+    <mc:Fallback xmlns="">
+      <p:transition spd="slow"/>
+    </mc:Fallback>
+  </mc:AlternateContent>
+  <p:timing>
+    <p:tnLst>
+      <p:par>
+        <p:cTn id="1" dur="indefinite" restart="never" nodeType="tmRoot"/>
+      </p:par>
+    </p:tnLst>
+  </p:timing>
+</p:sld>
+</file>
+
 <file path=ppt/slides/slide2.xml><?xml version="1.0" encoding="utf-8"?>
 <p:sld xmlns:a="http://schemas.openxmlformats.org/drawingml/2006/main" xmlns:r="http://schemas.openxmlformats.org/officeDocument/2006/relationships" xmlns:p="http://schemas.openxmlformats.org/presentationml/2006/main">
   <p:cSld>
@@ -10009,6 +10416,13 @@
   <p:clrMapOvr>
     <a:masterClrMapping/>
   </p:clrMapOvr>
+  <p:timing>
+    <p:tnLst>
+      <p:par>
+        <p:cTn id="1" dur="indefinite" restart="never" nodeType="tmRoot"/>
+      </p:par>
+    </p:tnLst>
+  </p:timing>
 </p:sld>
 </file>
 
@@ -10109,6 +10523,13 @@
   <p:clrMapOvr>
     <a:masterClrMapping/>
   </p:clrMapOvr>
+  <p:timing>
+    <p:tnLst>
+      <p:par>
+        <p:cTn id="1" dur="indefinite" restart="never" nodeType="tmRoot"/>
+      </p:par>
+    </p:tnLst>
+  </p:timing>
 </p:sld>
 </file>
 
@@ -10697,8 +11118,8 @@
 </file>
 
 <file path=ppt/slides/slide9.xml><?xml version="1.0" encoding="utf-8"?>
-<p:sld xmlns:a="http://schemas.openxmlformats.org/drawingml/2006/main" xmlns:r="http://schemas.openxmlformats.org/officeDocument/2006/relationships" xmlns:p="http://schemas.openxmlformats.org/presentationml/2006/main" show="0">
-  <p:cSld name="PPAck201403240026082737">
+<p:sld xmlns:a="http://schemas.openxmlformats.org/drawingml/2006/main" xmlns:r="http://schemas.openxmlformats.org/officeDocument/2006/relationships" xmlns:p="http://schemas.openxmlformats.org/presentationml/2006/main">
+  <p:cSld>
     <p:spTree>
       <p:nvGrpSpPr>
         <p:cNvPr id="1" name=""/>
@@ -10715,7 +11136,7 @@
       </p:grpSpPr>
       <p:sp>
         <p:nvSpPr>
-          <p:cNvPr id="2" name="标题 1"/>
+          <p:cNvPr id="2" name="Title 1"/>
           <p:cNvSpPr>
             <a:spLocks noGrp="1"/>
           </p:cNvSpPr>
@@ -10728,57 +11149,24 @@
           <a:bodyPr/>
           <a:lstStyle/>
           <a:p>
-            <a:endParaRPr lang="en-SG"/>
-          </a:p>
-        </p:txBody>
-      </p:sp>
-      <p:pic>
-        <p:nvPicPr>
-          <p:cNvPr id="4" name="内容占位符 3"/>
-          <p:cNvPicPr>
-            <a:picLocks noGrp="1"/>
-          </p:cNvPicPr>
-          <p:nvPr>
-            <p:ph idx="1"/>
-          </p:nvPr>
-        </p:nvPicPr>
-        <p:blipFill>
-          <a:blip r:embed="rId2">
-            <a:extLst>
-              <a:ext uri="{28A0092B-C50C-407E-A947-70E740481C1C}">
-                <a14:useLocalDpi xmlns:a14="http://schemas.microsoft.com/office/drawing/2010/main" val="0"/>
-              </a:ext>
-            </a:extLst>
-          </a:blip>
-          <a:stretch>
-            <a:fillRect/>
-          </a:stretch>
-        </p:blipFill>
-        <p:spPr>
-          <a:xfrm>
-            <a:off x="1074665" y="1600200"/>
-            <a:ext cx="6994670" cy="4525963"/>
-          </a:xfrm>
-        </p:spPr>
-      </p:pic>
+            <a:r>
+              <a:rPr lang="en-US" dirty="0" smtClean="0"/>
+              <a:t>Convert to Picture:: check if clipboard is restored</a:t>
+            </a:r>
+            <a:endParaRPr lang="en-SG" dirty="0"/>
+          </a:p>
+        </p:txBody>
+      </p:sp>
     </p:spTree>
     <p:extLst>
       <p:ext uri="{BB962C8B-B14F-4D97-AF65-F5344CB8AC3E}">
-        <p14:creationId xmlns:p14="http://schemas.microsoft.com/office/powerpoint/2010/main" val="2306293579"/>
+        <p14:creationId xmlns:p14="http://schemas.microsoft.com/office/powerpoint/2010/main" val="408108558"/>
       </p:ext>
     </p:extLst>
   </p:cSld>
   <p:clrMapOvr>
     <a:masterClrMapping/>
   </p:clrMapOvr>
-  <mc:AlternateContent xmlns:mc="http://schemas.openxmlformats.org/markup-compatibility/2006" xmlns:p14="http://schemas.microsoft.com/office/powerpoint/2010/main">
-    <mc:Choice Requires="p14">
-      <p:transition spd="slow" p14:dur="2000"/>
-    </mc:Choice>
-    <mc:Fallback xmlns="">
-      <p:transition spd="slow"/>
-    </mc:Fallback>
-  </mc:AlternateContent>
   <p:timing>
     <p:tnLst>
       <p:par>

</xml_diff>

<commit_message>
Extend support to restore clipboard for actions that return a value Fix flakiness of clipboard test
</commit_message>
<xml_diff>
--- a/doc/test/ShortcutsLab/ConvertToPicture.pptx
+++ b/doc/test/ShortcutsLab/ConvertToPicture.pptx
@@ -245,7 +245,7 @@
           <a:p>
             <a:fld id="{26004F41-C1A1-4B0D-9EEE-5E3F0E5BC108}" type="datetimeFigureOut">
               <a:rPr lang="en-SG" smtClean="0"/>
-              <a:t>3/2/2018</a:t>
+              <a:t>8/3/2018</a:t>
             </a:fld>
             <a:endParaRPr lang="en-SG"/>
           </a:p>
@@ -694,7 +694,7 @@
           <a:p>
             <a:fld id="{699DC775-C286-4358-8C92-D7E584E969B3}" type="datetimeFigureOut">
               <a:rPr lang="en-US" smtClean="0"/>
-              <a:t>2/3/2018</a:t>
+              <a:t>3/8/2018</a:t>
             </a:fld>
             <a:endParaRPr lang="en-US"/>
           </a:p>
@@ -864,7 +864,7 @@
           <a:p>
             <a:fld id="{699DC775-C286-4358-8C92-D7E584E969B3}" type="datetimeFigureOut">
               <a:rPr lang="en-US" smtClean="0"/>
-              <a:t>2/3/2018</a:t>
+              <a:t>3/8/2018</a:t>
             </a:fld>
             <a:endParaRPr lang="en-US"/>
           </a:p>
@@ -1044,7 +1044,7 @@
           <a:p>
             <a:fld id="{699DC775-C286-4358-8C92-D7E584E969B3}" type="datetimeFigureOut">
               <a:rPr lang="en-US" smtClean="0"/>
-              <a:t>2/3/2018</a:t>
+              <a:t>3/8/2018</a:t>
             </a:fld>
             <a:endParaRPr lang="en-US"/>
           </a:p>
@@ -1286,7 +1286,7 @@
           <a:p>
             <a:fld id="{699DC775-C286-4358-8C92-D7E584E969B3}" type="datetimeFigureOut">
               <a:rPr lang="en-US" smtClean="0"/>
-              <a:t>2/3/2018</a:t>
+              <a:t>3/8/2018</a:t>
             </a:fld>
             <a:endParaRPr lang="en-US"/>
           </a:p>
@@ -1456,7 +1456,7 @@
           <a:p>
             <a:fld id="{699DC775-C286-4358-8C92-D7E584E969B3}" type="datetimeFigureOut">
               <a:rPr lang="en-US" smtClean="0"/>
-              <a:t>2/3/2018</a:t>
+              <a:t>3/8/2018</a:t>
             </a:fld>
             <a:endParaRPr lang="en-US"/>
           </a:p>
@@ -1702,7 +1702,7 @@
           <a:p>
             <a:fld id="{699DC775-C286-4358-8C92-D7E584E969B3}" type="datetimeFigureOut">
               <a:rPr lang="en-US" smtClean="0"/>
-              <a:t>2/3/2018</a:t>
+              <a:t>3/8/2018</a:t>
             </a:fld>
             <a:endParaRPr lang="en-US"/>
           </a:p>
@@ -1990,7 +1990,7 @@
           <a:p>
             <a:fld id="{699DC775-C286-4358-8C92-D7E584E969B3}" type="datetimeFigureOut">
               <a:rPr lang="en-US" smtClean="0"/>
-              <a:t>2/3/2018</a:t>
+              <a:t>3/8/2018</a:t>
             </a:fld>
             <a:endParaRPr lang="en-US"/>
           </a:p>
@@ -2412,7 +2412,7 @@
           <a:p>
             <a:fld id="{699DC775-C286-4358-8C92-D7E584E969B3}" type="datetimeFigureOut">
               <a:rPr lang="en-US" smtClean="0"/>
-              <a:t>2/3/2018</a:t>
+              <a:t>3/8/2018</a:t>
             </a:fld>
             <a:endParaRPr lang="en-US"/>
           </a:p>
@@ -2530,7 +2530,7 @@
           <a:p>
             <a:fld id="{699DC775-C286-4358-8C92-D7E584E969B3}" type="datetimeFigureOut">
               <a:rPr lang="en-US" smtClean="0"/>
-              <a:t>2/3/2018</a:t>
+              <a:t>3/8/2018</a:t>
             </a:fld>
             <a:endParaRPr lang="en-US"/>
           </a:p>
@@ -2625,7 +2625,7 @@
           <a:p>
             <a:fld id="{699DC775-C286-4358-8C92-D7E584E969B3}" type="datetimeFigureOut">
               <a:rPr lang="en-US" smtClean="0"/>
-              <a:t>2/3/2018</a:t>
+              <a:t>3/8/2018</a:t>
             </a:fld>
             <a:endParaRPr lang="en-US"/>
           </a:p>
@@ -2902,7 +2902,7 @@
           <a:p>
             <a:fld id="{699DC775-C286-4358-8C92-D7E584E969B3}" type="datetimeFigureOut">
               <a:rPr lang="en-US" smtClean="0"/>
-              <a:t>2/3/2018</a:t>
+              <a:t>3/8/2018</a:t>
             </a:fld>
             <a:endParaRPr lang="en-US"/>
           </a:p>
@@ -3072,7 +3072,7 @@
           <a:p>
             <a:fld id="{699DC775-C286-4358-8C92-D7E584E969B3}" type="datetimeFigureOut">
               <a:rPr lang="en-US" smtClean="0"/>
-              <a:t>2/3/2018</a:t>
+              <a:t>3/8/2018</a:t>
             </a:fld>
             <a:endParaRPr lang="en-US"/>
           </a:p>
@@ -3325,7 +3325,7 @@
           <a:p>
             <a:fld id="{699DC775-C286-4358-8C92-D7E584E969B3}" type="datetimeFigureOut">
               <a:rPr lang="en-US" smtClean="0"/>
-              <a:t>2/3/2018</a:t>
+              <a:t>3/8/2018</a:t>
             </a:fld>
             <a:endParaRPr lang="en-US"/>
           </a:p>
@@ -3495,7 +3495,7 @@
           <a:p>
             <a:fld id="{699DC775-C286-4358-8C92-D7E584E969B3}" type="datetimeFigureOut">
               <a:rPr lang="en-US" smtClean="0"/>
-              <a:t>2/3/2018</a:t>
+              <a:t>3/8/2018</a:t>
             </a:fld>
             <a:endParaRPr lang="en-US"/>
           </a:p>
@@ -3675,7 +3675,7 @@
           <a:p>
             <a:fld id="{699DC775-C286-4358-8C92-D7E584E969B3}" type="datetimeFigureOut">
               <a:rPr lang="en-US" smtClean="0"/>
-              <a:t>2/3/2018</a:t>
+              <a:t>3/8/2018</a:t>
             </a:fld>
             <a:endParaRPr lang="en-US"/>
           </a:p>
@@ -3925,7 +3925,7 @@
           <a:p>
             <a:fld id="{699DC775-C286-4358-8C92-D7E584E969B3}" type="datetimeFigureOut">
               <a:rPr lang="en-US" smtClean="0"/>
-              <a:t>2/3/2018</a:t>
+              <a:t>3/8/2018</a:t>
             </a:fld>
             <a:endParaRPr lang="en-US"/>
           </a:p>
@@ -4103,7 +4103,7 @@
           <a:p>
             <a:fld id="{699DC775-C286-4358-8C92-D7E584E969B3}" type="datetimeFigureOut">
               <a:rPr lang="en-US" smtClean="0"/>
-              <a:t>2/3/2018</a:t>
+              <a:t>3/8/2018</a:t>
             </a:fld>
             <a:endParaRPr lang="en-US"/>
           </a:p>
@@ -4357,7 +4357,7 @@
           <a:p>
             <a:fld id="{699DC775-C286-4358-8C92-D7E584E969B3}" type="datetimeFigureOut">
               <a:rPr lang="en-US" smtClean="0"/>
-              <a:t>2/3/2018</a:t>
+              <a:t>3/8/2018</a:t>
             </a:fld>
             <a:endParaRPr lang="en-US"/>
           </a:p>
@@ -4653,7 +4653,7 @@
           <a:p>
             <a:fld id="{699DC775-C286-4358-8C92-D7E584E969B3}" type="datetimeFigureOut">
               <a:rPr lang="en-US" smtClean="0"/>
-              <a:t>2/3/2018</a:t>
+              <a:t>3/8/2018</a:t>
             </a:fld>
             <a:endParaRPr lang="en-US"/>
           </a:p>
@@ -5083,7 +5083,7 @@
           <a:p>
             <a:fld id="{699DC775-C286-4358-8C92-D7E584E969B3}" type="datetimeFigureOut">
               <a:rPr lang="en-US" smtClean="0"/>
-              <a:t>2/3/2018</a:t>
+              <a:t>3/8/2018</a:t>
             </a:fld>
             <a:endParaRPr lang="en-US"/>
           </a:p>
@@ -5209,7 +5209,7 @@
           <a:p>
             <a:fld id="{699DC775-C286-4358-8C92-D7E584E969B3}" type="datetimeFigureOut">
               <a:rPr lang="en-US" smtClean="0"/>
-              <a:t>2/3/2018</a:t>
+              <a:t>3/8/2018</a:t>
             </a:fld>
             <a:endParaRPr lang="en-US"/>
           </a:p>
@@ -5312,7 +5312,7 @@
           <a:p>
             <a:fld id="{699DC775-C286-4358-8C92-D7E584E969B3}" type="datetimeFigureOut">
               <a:rPr lang="en-US" smtClean="0"/>
-              <a:t>2/3/2018</a:t>
+              <a:t>3/8/2018</a:t>
             </a:fld>
             <a:endParaRPr lang="en-US"/>
           </a:p>
@@ -5558,7 +5558,7 @@
           <a:p>
             <a:fld id="{699DC775-C286-4358-8C92-D7E584E969B3}" type="datetimeFigureOut">
               <a:rPr lang="en-US" smtClean="0"/>
-              <a:t>2/3/2018</a:t>
+              <a:t>3/8/2018</a:t>
             </a:fld>
             <a:endParaRPr lang="en-US"/>
           </a:p>
@@ -5843,7 +5843,7 @@
           <a:p>
             <a:fld id="{699DC775-C286-4358-8C92-D7E584E969B3}" type="datetimeFigureOut">
               <a:rPr lang="en-US" smtClean="0"/>
-              <a:t>2/3/2018</a:t>
+              <a:t>3/8/2018</a:t>
             </a:fld>
             <a:endParaRPr lang="en-US"/>
           </a:p>
@@ -6104,7 +6104,7 @@
           <a:p>
             <a:fld id="{699DC775-C286-4358-8C92-D7E584E969B3}" type="datetimeFigureOut">
               <a:rPr lang="en-US" smtClean="0"/>
-              <a:t>2/3/2018</a:t>
+              <a:t>3/8/2018</a:t>
             </a:fld>
             <a:endParaRPr lang="en-US"/>
           </a:p>
@@ -6282,7 +6282,7 @@
           <a:p>
             <a:fld id="{699DC775-C286-4358-8C92-D7E584E969B3}" type="datetimeFigureOut">
               <a:rPr lang="en-US" smtClean="0"/>
-              <a:t>2/3/2018</a:t>
+              <a:t>3/8/2018</a:t>
             </a:fld>
             <a:endParaRPr lang="en-US"/>
           </a:p>
@@ -6470,7 +6470,7 @@
           <a:p>
             <a:fld id="{699DC775-C286-4358-8C92-D7E584E969B3}" type="datetimeFigureOut">
               <a:rPr lang="en-US" smtClean="0"/>
-              <a:t>2/3/2018</a:t>
+              <a:t>3/8/2018</a:t>
             </a:fld>
             <a:endParaRPr lang="en-US"/>
           </a:p>
@@ -6758,7 +6758,7 @@
           <a:p>
             <a:fld id="{699DC775-C286-4358-8C92-D7E584E969B3}" type="datetimeFigureOut">
               <a:rPr lang="en-US" smtClean="0"/>
-              <a:t>2/3/2018</a:t>
+              <a:t>3/8/2018</a:t>
             </a:fld>
             <a:endParaRPr lang="en-US"/>
           </a:p>
@@ -7180,7 +7180,7 @@
           <a:p>
             <a:fld id="{699DC775-C286-4358-8C92-D7E584E969B3}" type="datetimeFigureOut">
               <a:rPr lang="en-US" smtClean="0"/>
-              <a:t>2/3/2018</a:t>
+              <a:t>3/8/2018</a:t>
             </a:fld>
             <a:endParaRPr lang="en-US"/>
           </a:p>
@@ -7298,7 +7298,7 @@
           <a:p>
             <a:fld id="{699DC775-C286-4358-8C92-D7E584E969B3}" type="datetimeFigureOut">
               <a:rPr lang="en-US" smtClean="0"/>
-              <a:t>2/3/2018</a:t>
+              <a:t>3/8/2018</a:t>
             </a:fld>
             <a:endParaRPr lang="en-US"/>
           </a:p>
@@ -7393,7 +7393,7 @@
           <a:p>
             <a:fld id="{699DC775-C286-4358-8C92-D7E584E969B3}" type="datetimeFigureOut">
               <a:rPr lang="en-US" smtClean="0"/>
-              <a:t>2/3/2018</a:t>
+              <a:t>3/8/2018</a:t>
             </a:fld>
             <a:endParaRPr lang="en-US"/>
           </a:p>
@@ -7670,7 +7670,7 @@
           <a:p>
             <a:fld id="{699DC775-C286-4358-8C92-D7E584E969B3}" type="datetimeFigureOut">
               <a:rPr lang="en-US" smtClean="0"/>
-              <a:t>2/3/2018</a:t>
+              <a:t>3/8/2018</a:t>
             </a:fld>
             <a:endParaRPr lang="en-US"/>
           </a:p>
@@ -7923,7 +7923,7 @@
           <a:p>
             <a:fld id="{699DC775-C286-4358-8C92-D7E584E969B3}" type="datetimeFigureOut">
               <a:rPr lang="en-US" smtClean="0"/>
-              <a:t>2/3/2018</a:t>
+              <a:t>3/8/2018</a:t>
             </a:fld>
             <a:endParaRPr lang="en-US"/>
           </a:p>
@@ -8136,7 +8136,7 @@
           <a:p>
             <a:fld id="{699DC775-C286-4358-8C92-D7E584E969B3}" type="datetimeFigureOut">
               <a:rPr lang="en-US" smtClean="0"/>
-              <a:t>2/3/2018</a:t>
+              <a:t>3/8/2018</a:t>
             </a:fld>
             <a:endParaRPr lang="en-US"/>
           </a:p>
@@ -8651,7 +8651,7 @@
           <a:p>
             <a:fld id="{699DC775-C286-4358-8C92-D7E584E969B3}" type="datetimeFigureOut">
               <a:rPr lang="en-US" smtClean="0"/>
-              <a:t>2/3/2018</a:t>
+              <a:t>3/8/2018</a:t>
             </a:fld>
             <a:endParaRPr lang="en-US"/>
           </a:p>
@@ -9164,7 +9164,7 @@
           <a:p>
             <a:fld id="{699DC775-C286-4358-8C92-D7E584E969B3}" type="datetimeFigureOut">
               <a:rPr lang="en-US" smtClean="0"/>
-              <a:t>2/3/2018</a:t>
+              <a:t>3/8/2018</a:t>
             </a:fld>
             <a:endParaRPr lang="en-US"/>
           </a:p>
@@ -9939,7 +9939,7 @@
       </p:pic>
       <p:pic>
         <p:nvPicPr>
-          <p:cNvPr id="6" name="pictocopy"/>
+          <p:cNvPr id="6" name="copied"/>
           <p:cNvPicPr>
             <a:picLocks noChangeAspect="1"/>
           </p:cNvPicPr>
@@ -9989,15 +9989,7 @@
                   <a:schemeClr val="accent1"/>
                 </a:solidFill>
               </a:rPr>
-              <a:t>Expected Output </a:t>
-            </a:r>
-            <a:r>
-              <a:rPr lang="en-US" sz="2800" b="1" dirty="0" smtClean="0">
-                <a:solidFill>
-                  <a:schemeClr val="accent1"/>
-                </a:solidFill>
-              </a:rPr>
-              <a:t>(pasted object is the right shape )</a:t>
+              <a:t>Expected Output (pasted object is the right shape )</a:t>
             </a:r>
             <a:endParaRPr lang="en-SG" sz="2800" b="1" dirty="0">
               <a:solidFill>

</xml_diff>

<commit_message>
#1626 Extend restore clipboard for actions that return a value (#1627)
* Extend support to restore clipboard for actions that return a value
Fix flakiness of clipboard test

* Fix convert to picture test

* Set new shape location instead
</commit_message>
<xml_diff>
--- a/doc/test/ShortcutsLab/ConvertToPicture.pptx
+++ b/doc/test/ShortcutsLab/ConvertToPicture.pptx
@@ -245,7 +245,7 @@
           <a:p>
             <a:fld id="{26004F41-C1A1-4B0D-9EEE-5E3F0E5BC108}" type="datetimeFigureOut">
               <a:rPr lang="en-SG" smtClean="0"/>
-              <a:t>3/2/2018</a:t>
+              <a:t>8/3/2018</a:t>
             </a:fld>
             <a:endParaRPr lang="en-SG"/>
           </a:p>
@@ -694,7 +694,7 @@
           <a:p>
             <a:fld id="{699DC775-C286-4358-8C92-D7E584E969B3}" type="datetimeFigureOut">
               <a:rPr lang="en-US" smtClean="0"/>
-              <a:t>2/3/2018</a:t>
+              <a:t>3/8/2018</a:t>
             </a:fld>
             <a:endParaRPr lang="en-US"/>
           </a:p>
@@ -864,7 +864,7 @@
           <a:p>
             <a:fld id="{699DC775-C286-4358-8C92-D7E584E969B3}" type="datetimeFigureOut">
               <a:rPr lang="en-US" smtClean="0"/>
-              <a:t>2/3/2018</a:t>
+              <a:t>3/8/2018</a:t>
             </a:fld>
             <a:endParaRPr lang="en-US"/>
           </a:p>
@@ -1044,7 +1044,7 @@
           <a:p>
             <a:fld id="{699DC775-C286-4358-8C92-D7E584E969B3}" type="datetimeFigureOut">
               <a:rPr lang="en-US" smtClean="0"/>
-              <a:t>2/3/2018</a:t>
+              <a:t>3/8/2018</a:t>
             </a:fld>
             <a:endParaRPr lang="en-US"/>
           </a:p>
@@ -1286,7 +1286,7 @@
           <a:p>
             <a:fld id="{699DC775-C286-4358-8C92-D7E584E969B3}" type="datetimeFigureOut">
               <a:rPr lang="en-US" smtClean="0"/>
-              <a:t>2/3/2018</a:t>
+              <a:t>3/8/2018</a:t>
             </a:fld>
             <a:endParaRPr lang="en-US"/>
           </a:p>
@@ -1456,7 +1456,7 @@
           <a:p>
             <a:fld id="{699DC775-C286-4358-8C92-D7E584E969B3}" type="datetimeFigureOut">
               <a:rPr lang="en-US" smtClean="0"/>
-              <a:t>2/3/2018</a:t>
+              <a:t>3/8/2018</a:t>
             </a:fld>
             <a:endParaRPr lang="en-US"/>
           </a:p>
@@ -1702,7 +1702,7 @@
           <a:p>
             <a:fld id="{699DC775-C286-4358-8C92-D7E584E969B3}" type="datetimeFigureOut">
               <a:rPr lang="en-US" smtClean="0"/>
-              <a:t>2/3/2018</a:t>
+              <a:t>3/8/2018</a:t>
             </a:fld>
             <a:endParaRPr lang="en-US"/>
           </a:p>
@@ -1990,7 +1990,7 @@
           <a:p>
             <a:fld id="{699DC775-C286-4358-8C92-D7E584E969B3}" type="datetimeFigureOut">
               <a:rPr lang="en-US" smtClean="0"/>
-              <a:t>2/3/2018</a:t>
+              <a:t>3/8/2018</a:t>
             </a:fld>
             <a:endParaRPr lang="en-US"/>
           </a:p>
@@ -2412,7 +2412,7 @@
           <a:p>
             <a:fld id="{699DC775-C286-4358-8C92-D7E584E969B3}" type="datetimeFigureOut">
               <a:rPr lang="en-US" smtClean="0"/>
-              <a:t>2/3/2018</a:t>
+              <a:t>3/8/2018</a:t>
             </a:fld>
             <a:endParaRPr lang="en-US"/>
           </a:p>
@@ -2530,7 +2530,7 @@
           <a:p>
             <a:fld id="{699DC775-C286-4358-8C92-D7E584E969B3}" type="datetimeFigureOut">
               <a:rPr lang="en-US" smtClean="0"/>
-              <a:t>2/3/2018</a:t>
+              <a:t>3/8/2018</a:t>
             </a:fld>
             <a:endParaRPr lang="en-US"/>
           </a:p>
@@ -2625,7 +2625,7 @@
           <a:p>
             <a:fld id="{699DC775-C286-4358-8C92-D7E584E969B3}" type="datetimeFigureOut">
               <a:rPr lang="en-US" smtClean="0"/>
-              <a:t>2/3/2018</a:t>
+              <a:t>3/8/2018</a:t>
             </a:fld>
             <a:endParaRPr lang="en-US"/>
           </a:p>
@@ -2902,7 +2902,7 @@
           <a:p>
             <a:fld id="{699DC775-C286-4358-8C92-D7E584E969B3}" type="datetimeFigureOut">
               <a:rPr lang="en-US" smtClean="0"/>
-              <a:t>2/3/2018</a:t>
+              <a:t>3/8/2018</a:t>
             </a:fld>
             <a:endParaRPr lang="en-US"/>
           </a:p>
@@ -3072,7 +3072,7 @@
           <a:p>
             <a:fld id="{699DC775-C286-4358-8C92-D7E584E969B3}" type="datetimeFigureOut">
               <a:rPr lang="en-US" smtClean="0"/>
-              <a:t>2/3/2018</a:t>
+              <a:t>3/8/2018</a:t>
             </a:fld>
             <a:endParaRPr lang="en-US"/>
           </a:p>
@@ -3325,7 +3325,7 @@
           <a:p>
             <a:fld id="{699DC775-C286-4358-8C92-D7E584E969B3}" type="datetimeFigureOut">
               <a:rPr lang="en-US" smtClean="0"/>
-              <a:t>2/3/2018</a:t>
+              <a:t>3/8/2018</a:t>
             </a:fld>
             <a:endParaRPr lang="en-US"/>
           </a:p>
@@ -3495,7 +3495,7 @@
           <a:p>
             <a:fld id="{699DC775-C286-4358-8C92-D7E584E969B3}" type="datetimeFigureOut">
               <a:rPr lang="en-US" smtClean="0"/>
-              <a:t>2/3/2018</a:t>
+              <a:t>3/8/2018</a:t>
             </a:fld>
             <a:endParaRPr lang="en-US"/>
           </a:p>
@@ -3675,7 +3675,7 @@
           <a:p>
             <a:fld id="{699DC775-C286-4358-8C92-D7E584E969B3}" type="datetimeFigureOut">
               <a:rPr lang="en-US" smtClean="0"/>
-              <a:t>2/3/2018</a:t>
+              <a:t>3/8/2018</a:t>
             </a:fld>
             <a:endParaRPr lang="en-US"/>
           </a:p>
@@ -3925,7 +3925,7 @@
           <a:p>
             <a:fld id="{699DC775-C286-4358-8C92-D7E584E969B3}" type="datetimeFigureOut">
               <a:rPr lang="en-US" smtClean="0"/>
-              <a:t>2/3/2018</a:t>
+              <a:t>3/8/2018</a:t>
             </a:fld>
             <a:endParaRPr lang="en-US"/>
           </a:p>
@@ -4103,7 +4103,7 @@
           <a:p>
             <a:fld id="{699DC775-C286-4358-8C92-D7E584E969B3}" type="datetimeFigureOut">
               <a:rPr lang="en-US" smtClean="0"/>
-              <a:t>2/3/2018</a:t>
+              <a:t>3/8/2018</a:t>
             </a:fld>
             <a:endParaRPr lang="en-US"/>
           </a:p>
@@ -4357,7 +4357,7 @@
           <a:p>
             <a:fld id="{699DC775-C286-4358-8C92-D7E584E969B3}" type="datetimeFigureOut">
               <a:rPr lang="en-US" smtClean="0"/>
-              <a:t>2/3/2018</a:t>
+              <a:t>3/8/2018</a:t>
             </a:fld>
             <a:endParaRPr lang="en-US"/>
           </a:p>
@@ -4653,7 +4653,7 @@
           <a:p>
             <a:fld id="{699DC775-C286-4358-8C92-D7E584E969B3}" type="datetimeFigureOut">
               <a:rPr lang="en-US" smtClean="0"/>
-              <a:t>2/3/2018</a:t>
+              <a:t>3/8/2018</a:t>
             </a:fld>
             <a:endParaRPr lang="en-US"/>
           </a:p>
@@ -5083,7 +5083,7 @@
           <a:p>
             <a:fld id="{699DC775-C286-4358-8C92-D7E584E969B3}" type="datetimeFigureOut">
               <a:rPr lang="en-US" smtClean="0"/>
-              <a:t>2/3/2018</a:t>
+              <a:t>3/8/2018</a:t>
             </a:fld>
             <a:endParaRPr lang="en-US"/>
           </a:p>
@@ -5209,7 +5209,7 @@
           <a:p>
             <a:fld id="{699DC775-C286-4358-8C92-D7E584E969B3}" type="datetimeFigureOut">
               <a:rPr lang="en-US" smtClean="0"/>
-              <a:t>2/3/2018</a:t>
+              <a:t>3/8/2018</a:t>
             </a:fld>
             <a:endParaRPr lang="en-US"/>
           </a:p>
@@ -5312,7 +5312,7 @@
           <a:p>
             <a:fld id="{699DC775-C286-4358-8C92-D7E584E969B3}" type="datetimeFigureOut">
               <a:rPr lang="en-US" smtClean="0"/>
-              <a:t>2/3/2018</a:t>
+              <a:t>3/8/2018</a:t>
             </a:fld>
             <a:endParaRPr lang="en-US"/>
           </a:p>
@@ -5558,7 +5558,7 @@
           <a:p>
             <a:fld id="{699DC775-C286-4358-8C92-D7E584E969B3}" type="datetimeFigureOut">
               <a:rPr lang="en-US" smtClean="0"/>
-              <a:t>2/3/2018</a:t>
+              <a:t>3/8/2018</a:t>
             </a:fld>
             <a:endParaRPr lang="en-US"/>
           </a:p>
@@ -5843,7 +5843,7 @@
           <a:p>
             <a:fld id="{699DC775-C286-4358-8C92-D7E584E969B3}" type="datetimeFigureOut">
               <a:rPr lang="en-US" smtClean="0"/>
-              <a:t>2/3/2018</a:t>
+              <a:t>3/8/2018</a:t>
             </a:fld>
             <a:endParaRPr lang="en-US"/>
           </a:p>
@@ -6104,7 +6104,7 @@
           <a:p>
             <a:fld id="{699DC775-C286-4358-8C92-D7E584E969B3}" type="datetimeFigureOut">
               <a:rPr lang="en-US" smtClean="0"/>
-              <a:t>2/3/2018</a:t>
+              <a:t>3/8/2018</a:t>
             </a:fld>
             <a:endParaRPr lang="en-US"/>
           </a:p>
@@ -6282,7 +6282,7 @@
           <a:p>
             <a:fld id="{699DC775-C286-4358-8C92-D7E584E969B3}" type="datetimeFigureOut">
               <a:rPr lang="en-US" smtClean="0"/>
-              <a:t>2/3/2018</a:t>
+              <a:t>3/8/2018</a:t>
             </a:fld>
             <a:endParaRPr lang="en-US"/>
           </a:p>
@@ -6470,7 +6470,7 @@
           <a:p>
             <a:fld id="{699DC775-C286-4358-8C92-D7E584E969B3}" type="datetimeFigureOut">
               <a:rPr lang="en-US" smtClean="0"/>
-              <a:t>2/3/2018</a:t>
+              <a:t>3/8/2018</a:t>
             </a:fld>
             <a:endParaRPr lang="en-US"/>
           </a:p>
@@ -6758,7 +6758,7 @@
           <a:p>
             <a:fld id="{699DC775-C286-4358-8C92-D7E584E969B3}" type="datetimeFigureOut">
               <a:rPr lang="en-US" smtClean="0"/>
-              <a:t>2/3/2018</a:t>
+              <a:t>3/8/2018</a:t>
             </a:fld>
             <a:endParaRPr lang="en-US"/>
           </a:p>
@@ -7180,7 +7180,7 @@
           <a:p>
             <a:fld id="{699DC775-C286-4358-8C92-D7E584E969B3}" type="datetimeFigureOut">
               <a:rPr lang="en-US" smtClean="0"/>
-              <a:t>2/3/2018</a:t>
+              <a:t>3/8/2018</a:t>
             </a:fld>
             <a:endParaRPr lang="en-US"/>
           </a:p>
@@ -7298,7 +7298,7 @@
           <a:p>
             <a:fld id="{699DC775-C286-4358-8C92-D7E584E969B3}" type="datetimeFigureOut">
               <a:rPr lang="en-US" smtClean="0"/>
-              <a:t>2/3/2018</a:t>
+              <a:t>3/8/2018</a:t>
             </a:fld>
             <a:endParaRPr lang="en-US"/>
           </a:p>
@@ -7393,7 +7393,7 @@
           <a:p>
             <a:fld id="{699DC775-C286-4358-8C92-D7E584E969B3}" type="datetimeFigureOut">
               <a:rPr lang="en-US" smtClean="0"/>
-              <a:t>2/3/2018</a:t>
+              <a:t>3/8/2018</a:t>
             </a:fld>
             <a:endParaRPr lang="en-US"/>
           </a:p>
@@ -7670,7 +7670,7 @@
           <a:p>
             <a:fld id="{699DC775-C286-4358-8C92-D7E584E969B3}" type="datetimeFigureOut">
               <a:rPr lang="en-US" smtClean="0"/>
-              <a:t>2/3/2018</a:t>
+              <a:t>3/8/2018</a:t>
             </a:fld>
             <a:endParaRPr lang="en-US"/>
           </a:p>
@@ -7923,7 +7923,7 @@
           <a:p>
             <a:fld id="{699DC775-C286-4358-8C92-D7E584E969B3}" type="datetimeFigureOut">
               <a:rPr lang="en-US" smtClean="0"/>
-              <a:t>2/3/2018</a:t>
+              <a:t>3/8/2018</a:t>
             </a:fld>
             <a:endParaRPr lang="en-US"/>
           </a:p>
@@ -8136,7 +8136,7 @@
           <a:p>
             <a:fld id="{699DC775-C286-4358-8C92-D7E584E969B3}" type="datetimeFigureOut">
               <a:rPr lang="en-US" smtClean="0"/>
-              <a:t>2/3/2018</a:t>
+              <a:t>3/8/2018</a:t>
             </a:fld>
             <a:endParaRPr lang="en-US"/>
           </a:p>
@@ -8651,7 +8651,7 @@
           <a:p>
             <a:fld id="{699DC775-C286-4358-8C92-D7E584E969B3}" type="datetimeFigureOut">
               <a:rPr lang="en-US" smtClean="0"/>
-              <a:t>2/3/2018</a:t>
+              <a:t>3/8/2018</a:t>
             </a:fld>
             <a:endParaRPr lang="en-US"/>
           </a:p>
@@ -9164,7 +9164,7 @@
           <a:p>
             <a:fld id="{699DC775-C286-4358-8C92-D7E584E969B3}" type="datetimeFigureOut">
               <a:rPr lang="en-US" smtClean="0"/>
-              <a:t>2/3/2018</a:t>
+              <a:t>3/8/2018</a:t>
             </a:fld>
             <a:endParaRPr lang="en-US"/>
           </a:p>
@@ -9939,7 +9939,7 @@
       </p:pic>
       <p:pic>
         <p:nvPicPr>
-          <p:cNvPr id="6" name="pictocopy"/>
+          <p:cNvPr id="6" name="copied"/>
           <p:cNvPicPr>
             <a:picLocks noChangeAspect="1"/>
           </p:cNvPicPr>
@@ -9989,15 +9989,7 @@
                   <a:schemeClr val="accent1"/>
                 </a:solidFill>
               </a:rPr>
-              <a:t>Expected Output </a:t>
-            </a:r>
-            <a:r>
-              <a:rPr lang="en-US" sz="2800" b="1" dirty="0" smtClean="0">
-                <a:solidFill>
-                  <a:schemeClr val="accent1"/>
-                </a:solidFill>
-              </a:rPr>
-              <a:t>(pasted object is the right shape )</a:t>
+              <a:t>Expected Output (pasted object is the right shape )</a:t>
             </a:r>
             <a:endParaRPr lang="en-SG" sz="2800" b="1" dirty="0">
               <a:solidFill>

</xml_diff>

<commit_message>
Fix bug for single shape from group selected
</commit_message>
<xml_diff>
--- a/doc/test/ShortcutsLab/ConvertToPicture.pptx
+++ b/doc/test/ShortcutsLab/ConvertToPicture.pptx
@@ -251,7 +251,7 @@
           <a:p>
             <a:fld id="{26004F41-C1A1-4B0D-9EEE-5E3F0E5BC108}" type="datetimeFigureOut">
               <a:rPr lang="en-SG" smtClean="0"/>
-              <a:t>9/7/2019</a:t>
+              <a:t>21/7/2019</a:t>
             </a:fld>
             <a:endParaRPr lang="en-SG"/>
           </a:p>
@@ -698,7 +698,7 @@
           <a:p>
             <a:fld id="{699DC775-C286-4358-8C92-D7E584E969B3}" type="datetimeFigureOut">
               <a:rPr lang="en-US" smtClean="0"/>
-              <a:t>7/9/2019</a:t>
+              <a:t>7/21/2019</a:t>
             </a:fld>
             <a:endParaRPr lang="en-US"/>
           </a:p>
@@ -866,7 +866,7 @@
           <a:p>
             <a:fld id="{699DC775-C286-4358-8C92-D7E584E969B3}" type="datetimeFigureOut">
               <a:rPr lang="en-US" smtClean="0"/>
-              <a:t>7/9/2019</a:t>
+              <a:t>7/21/2019</a:t>
             </a:fld>
             <a:endParaRPr lang="en-US"/>
           </a:p>
@@ -1044,7 +1044,7 @@
           <a:p>
             <a:fld id="{699DC775-C286-4358-8C92-D7E584E969B3}" type="datetimeFigureOut">
               <a:rPr lang="en-US" smtClean="0"/>
-              <a:t>7/9/2019</a:t>
+              <a:t>7/21/2019</a:t>
             </a:fld>
             <a:endParaRPr lang="en-US"/>
           </a:p>
@@ -1284,7 +1284,7 @@
           <a:p>
             <a:fld id="{699DC775-C286-4358-8C92-D7E584E969B3}" type="datetimeFigureOut">
               <a:rPr lang="en-US" smtClean="0"/>
-              <a:t>7/9/2019</a:t>
+              <a:t>7/21/2019</a:t>
             </a:fld>
             <a:endParaRPr lang="en-US"/>
           </a:p>
@@ -1452,7 +1452,7 @@
           <a:p>
             <a:fld id="{699DC775-C286-4358-8C92-D7E584E969B3}" type="datetimeFigureOut">
               <a:rPr lang="en-US" smtClean="0"/>
-              <a:t>7/9/2019</a:t>
+              <a:t>7/21/2019</a:t>
             </a:fld>
             <a:endParaRPr lang="en-US"/>
           </a:p>
@@ -1697,7 +1697,7 @@
           <a:p>
             <a:fld id="{699DC775-C286-4358-8C92-D7E584E969B3}" type="datetimeFigureOut">
               <a:rPr lang="en-US" smtClean="0"/>
-              <a:t>7/9/2019</a:t>
+              <a:t>7/21/2019</a:t>
             </a:fld>
             <a:endParaRPr lang="en-US"/>
           </a:p>
@@ -1982,7 +1982,7 @@
           <a:p>
             <a:fld id="{699DC775-C286-4358-8C92-D7E584E969B3}" type="datetimeFigureOut">
               <a:rPr lang="en-US" smtClean="0"/>
-              <a:t>7/9/2019</a:t>
+              <a:t>7/21/2019</a:t>
             </a:fld>
             <a:endParaRPr lang="en-US"/>
           </a:p>
@@ -2401,7 +2401,7 @@
           <a:p>
             <a:fld id="{699DC775-C286-4358-8C92-D7E584E969B3}" type="datetimeFigureOut">
               <a:rPr lang="en-US" smtClean="0"/>
-              <a:t>7/9/2019</a:t>
+              <a:t>7/21/2019</a:t>
             </a:fld>
             <a:endParaRPr lang="en-US"/>
           </a:p>
@@ -2518,7 +2518,7 @@
           <a:p>
             <a:fld id="{699DC775-C286-4358-8C92-D7E584E969B3}" type="datetimeFigureOut">
               <a:rPr lang="en-US" smtClean="0"/>
-              <a:t>7/9/2019</a:t>
+              <a:t>7/21/2019</a:t>
             </a:fld>
             <a:endParaRPr lang="en-US"/>
           </a:p>
@@ -2613,7 +2613,7 @@
           <a:p>
             <a:fld id="{699DC775-C286-4358-8C92-D7E584E969B3}" type="datetimeFigureOut">
               <a:rPr lang="en-US" smtClean="0"/>
-              <a:t>7/9/2019</a:t>
+              <a:t>7/21/2019</a:t>
             </a:fld>
             <a:endParaRPr lang="en-US"/>
           </a:p>
@@ -2888,7 +2888,7 @@
           <a:p>
             <a:fld id="{699DC775-C286-4358-8C92-D7E584E969B3}" type="datetimeFigureOut">
               <a:rPr lang="en-US" smtClean="0"/>
-              <a:t>7/9/2019</a:t>
+              <a:t>7/21/2019</a:t>
             </a:fld>
             <a:endParaRPr lang="en-US"/>
           </a:p>
@@ -3056,7 +3056,7 @@
           <a:p>
             <a:fld id="{699DC775-C286-4358-8C92-D7E584E969B3}" type="datetimeFigureOut">
               <a:rPr lang="en-US" smtClean="0"/>
-              <a:t>7/9/2019</a:t>
+              <a:t>7/21/2019</a:t>
             </a:fld>
             <a:endParaRPr lang="en-US"/>
           </a:p>
@@ -3308,7 +3308,7 @@
           <a:p>
             <a:fld id="{699DC775-C286-4358-8C92-D7E584E969B3}" type="datetimeFigureOut">
               <a:rPr lang="en-US" smtClean="0"/>
-              <a:t>7/9/2019</a:t>
+              <a:t>7/21/2019</a:t>
             </a:fld>
             <a:endParaRPr lang="en-US"/>
           </a:p>
@@ -3476,7 +3476,7 @@
           <a:p>
             <a:fld id="{699DC775-C286-4358-8C92-D7E584E969B3}" type="datetimeFigureOut">
               <a:rPr lang="en-US" smtClean="0"/>
-              <a:t>7/9/2019</a:t>
+              <a:t>7/21/2019</a:t>
             </a:fld>
             <a:endParaRPr lang="en-US"/>
           </a:p>
@@ -3654,7 +3654,7 @@
           <a:p>
             <a:fld id="{699DC775-C286-4358-8C92-D7E584E969B3}" type="datetimeFigureOut">
               <a:rPr lang="en-US" smtClean="0"/>
-              <a:t>7/9/2019</a:t>
+              <a:t>7/21/2019</a:t>
             </a:fld>
             <a:endParaRPr lang="en-US"/>
           </a:p>
@@ -3902,7 +3902,7 @@
           <a:p>
             <a:fld id="{699DC775-C286-4358-8C92-D7E584E969B3}" type="datetimeFigureOut">
               <a:rPr lang="en-US" smtClean="0"/>
-              <a:t>7/9/2019</a:t>
+              <a:t>7/21/2019</a:t>
             </a:fld>
             <a:endParaRPr lang="en-US"/>
           </a:p>
@@ -4078,7 +4078,7 @@
           <a:p>
             <a:fld id="{699DC775-C286-4358-8C92-D7E584E969B3}" type="datetimeFigureOut">
               <a:rPr lang="en-US" smtClean="0"/>
-              <a:t>7/9/2019</a:t>
+              <a:t>7/21/2019</a:t>
             </a:fld>
             <a:endParaRPr lang="en-US"/>
           </a:p>
@@ -4331,7 +4331,7 @@
           <a:p>
             <a:fld id="{699DC775-C286-4358-8C92-D7E584E969B3}" type="datetimeFigureOut">
               <a:rPr lang="en-US" smtClean="0"/>
-              <a:t>7/9/2019</a:t>
+              <a:t>7/21/2019</a:t>
             </a:fld>
             <a:endParaRPr lang="en-US"/>
           </a:p>
@@ -4624,7 +4624,7 @@
           <a:p>
             <a:fld id="{699DC775-C286-4358-8C92-D7E584E969B3}" type="datetimeFigureOut">
               <a:rPr lang="en-US" smtClean="0"/>
-              <a:t>7/9/2019</a:t>
+              <a:t>7/21/2019</a:t>
             </a:fld>
             <a:endParaRPr lang="en-US"/>
           </a:p>
@@ -5051,7 +5051,7 @@
           <a:p>
             <a:fld id="{699DC775-C286-4358-8C92-D7E584E969B3}" type="datetimeFigureOut">
               <a:rPr lang="en-US" smtClean="0"/>
-              <a:t>7/9/2019</a:t>
+              <a:t>7/21/2019</a:t>
             </a:fld>
             <a:endParaRPr lang="en-US"/>
           </a:p>
@@ -5176,7 +5176,7 @@
           <a:p>
             <a:fld id="{699DC775-C286-4358-8C92-D7E584E969B3}" type="datetimeFigureOut">
               <a:rPr lang="en-US" smtClean="0"/>
-              <a:t>7/9/2019</a:t>
+              <a:t>7/21/2019</a:t>
             </a:fld>
             <a:endParaRPr lang="en-US"/>
           </a:p>
@@ -5279,7 +5279,7 @@
           <a:p>
             <a:fld id="{699DC775-C286-4358-8C92-D7E584E969B3}" type="datetimeFigureOut">
               <a:rPr lang="en-US" smtClean="0"/>
-              <a:t>7/9/2019</a:t>
+              <a:t>7/21/2019</a:t>
             </a:fld>
             <a:endParaRPr lang="en-US"/>
           </a:p>
@@ -5524,7 +5524,7 @@
           <a:p>
             <a:fld id="{699DC775-C286-4358-8C92-D7E584E969B3}" type="datetimeFigureOut">
               <a:rPr lang="en-US" smtClean="0"/>
-              <a:t>7/9/2019</a:t>
+              <a:t>7/21/2019</a:t>
             </a:fld>
             <a:endParaRPr lang="en-US"/>
           </a:p>
@@ -5807,7 +5807,7 @@
           <a:p>
             <a:fld id="{699DC775-C286-4358-8C92-D7E584E969B3}" type="datetimeFigureOut">
               <a:rPr lang="en-US" smtClean="0"/>
-              <a:t>7/9/2019</a:t>
+              <a:t>7/21/2019</a:t>
             </a:fld>
             <a:endParaRPr lang="en-US"/>
           </a:p>
@@ -6067,7 +6067,7 @@
           <a:p>
             <a:fld id="{699DC775-C286-4358-8C92-D7E584E969B3}" type="datetimeFigureOut">
               <a:rPr lang="en-US" smtClean="0"/>
-              <a:t>7/9/2019</a:t>
+              <a:t>7/21/2019</a:t>
             </a:fld>
             <a:endParaRPr lang="en-US"/>
           </a:p>
@@ -6243,7 +6243,7 @@
           <a:p>
             <a:fld id="{699DC775-C286-4358-8C92-D7E584E969B3}" type="datetimeFigureOut">
               <a:rPr lang="en-US" smtClean="0"/>
-              <a:t>7/9/2019</a:t>
+              <a:t>7/21/2019</a:t>
             </a:fld>
             <a:endParaRPr lang="en-US"/>
           </a:p>
@@ -6429,7 +6429,7 @@
           <a:p>
             <a:fld id="{699DC775-C286-4358-8C92-D7E584E969B3}" type="datetimeFigureOut">
               <a:rPr lang="en-US" smtClean="0"/>
-              <a:t>7/9/2019</a:t>
+              <a:t>7/21/2019</a:t>
             </a:fld>
             <a:endParaRPr lang="en-US"/>
           </a:p>
@@ -6714,7 +6714,7 @@
           <a:p>
             <a:fld id="{699DC775-C286-4358-8C92-D7E584E969B3}" type="datetimeFigureOut">
               <a:rPr lang="en-US" smtClean="0"/>
-              <a:t>7/9/2019</a:t>
+              <a:t>7/21/2019</a:t>
             </a:fld>
             <a:endParaRPr lang="en-US"/>
           </a:p>
@@ -7133,7 +7133,7 @@
           <a:p>
             <a:fld id="{699DC775-C286-4358-8C92-D7E584E969B3}" type="datetimeFigureOut">
               <a:rPr lang="en-US" smtClean="0"/>
-              <a:t>7/9/2019</a:t>
+              <a:t>7/21/2019</a:t>
             </a:fld>
             <a:endParaRPr lang="en-US"/>
           </a:p>
@@ -7250,7 +7250,7 @@
           <a:p>
             <a:fld id="{699DC775-C286-4358-8C92-D7E584E969B3}" type="datetimeFigureOut">
               <a:rPr lang="en-US" smtClean="0"/>
-              <a:t>7/9/2019</a:t>
+              <a:t>7/21/2019</a:t>
             </a:fld>
             <a:endParaRPr lang="en-US"/>
           </a:p>
@@ -7345,7 +7345,7 @@
           <a:p>
             <a:fld id="{699DC775-C286-4358-8C92-D7E584E969B3}" type="datetimeFigureOut">
               <a:rPr lang="en-US" smtClean="0"/>
-              <a:t>7/9/2019</a:t>
+              <a:t>7/21/2019</a:t>
             </a:fld>
             <a:endParaRPr lang="en-US"/>
           </a:p>
@@ -7620,7 +7620,7 @@
           <a:p>
             <a:fld id="{699DC775-C286-4358-8C92-D7E584E969B3}" type="datetimeFigureOut">
               <a:rPr lang="en-US" smtClean="0"/>
-              <a:t>7/9/2019</a:t>
+              <a:t>7/21/2019</a:t>
             </a:fld>
             <a:endParaRPr lang="en-US"/>
           </a:p>
@@ -7872,7 +7872,7 @@
           <a:p>
             <a:fld id="{699DC775-C286-4358-8C92-D7E584E969B3}" type="datetimeFigureOut">
               <a:rPr lang="en-US" smtClean="0"/>
-              <a:t>7/9/2019</a:t>
+              <a:t>7/21/2019</a:t>
             </a:fld>
             <a:endParaRPr lang="en-US"/>
           </a:p>
@@ -8083,7 +8083,7 @@
           <a:p>
             <a:fld id="{699DC775-C286-4358-8C92-D7E584E969B3}" type="datetimeFigureOut">
               <a:rPr lang="en-US" smtClean="0"/>
-              <a:t>7/9/2019</a:t>
+              <a:t>7/21/2019</a:t>
             </a:fld>
             <a:endParaRPr lang="en-US"/>
           </a:p>
@@ -8596,7 +8596,7 @@
           <a:p>
             <a:fld id="{699DC775-C286-4358-8C92-D7E584E969B3}" type="datetimeFigureOut">
               <a:rPr lang="en-US" smtClean="0"/>
-              <a:t>7/9/2019</a:t>
+              <a:t>7/21/2019</a:t>
             </a:fld>
             <a:endParaRPr lang="en-US"/>
           </a:p>
@@ -9107,7 +9107,7 @@
           <a:p>
             <a:fld id="{699DC775-C286-4358-8C92-D7E584E969B3}" type="datetimeFigureOut">
               <a:rPr lang="en-US" smtClean="0"/>
-              <a:t>7/9/2019</a:t>
+              <a:t>7/21/2019</a:t>
             </a:fld>
             <a:endParaRPr lang="en-US"/>
           </a:p>
@@ -10192,12 +10192,56 @@
           <a:chExt cx="0" cy="0"/>
         </a:xfrm>
       </p:grpSpPr>
+      <p:sp>
+        <p:nvSpPr>
+          <p:cNvPr id="11" name="text 3">
+            <a:extLst>
+              <a:ext uri="{FF2B5EF4-FFF2-40B4-BE49-F238E27FC236}">
+                <a16:creationId xmlns:a16="http://schemas.microsoft.com/office/drawing/2014/main" id="{26742310-A731-46F6-91AA-B3348EA4301B}"/>
+              </a:ext>
+            </a:extLst>
+          </p:cNvPr>
+          <p:cNvSpPr txBox="1"/>
+          <p:nvPr/>
+        </p:nvSpPr>
+        <p:spPr>
+          <a:xfrm>
+            <a:off x="2057400" y="6019800"/>
+            <a:ext cx="5328318" cy="523220"/>
+          </a:xfrm>
+          <a:prstGeom prst="rect">
+            <a:avLst/>
+          </a:prstGeom>
+          <a:noFill/>
+        </p:spPr>
+        <p:txBody>
+          <a:bodyPr wrap="none" rtlCol="0">
+            <a:spAutoFit/>
+          </a:bodyPr>
+          <a:lstStyle/>
+          <a:p>
+            <a:r>
+              <a:rPr lang="en-US" sz="2800" b="1" dirty="0">
+                <a:solidFill>
+                  <a:schemeClr val="accent1"/>
+                </a:solidFill>
+              </a:rPr>
+              <a:t>Expected Output (a picture object)</a:t>
+            </a:r>
+            <a:endParaRPr lang="en-SG" sz="2800" b="1" dirty="0">
+              <a:solidFill>
+                <a:schemeClr val="accent1"/>
+              </a:solidFill>
+            </a:endParaRPr>
+          </a:p>
+        </p:txBody>
+      </p:sp>
       <p:grpSp>
         <p:nvGrpSpPr>
-          <p:cNvPr id="3" name="Group 2">
+          <p:cNvPr id="5" name="Group 4">
             <a:extLst>
               <a:ext uri="{FF2B5EF4-FFF2-40B4-BE49-F238E27FC236}">
-                <a16:creationId xmlns:a16="http://schemas.microsoft.com/office/drawing/2014/main" id="{825C8DB4-B782-4F8B-BE2D-090F70802994}"/>
+                <a16:creationId xmlns:a16="http://schemas.microsoft.com/office/drawing/2014/main" id="{71B9AD9C-CECE-421B-B9AC-4CC3BAF01965}"/>
               </a:ext>
             </a:extLst>
           </p:cNvPr>
@@ -10207,14 +10251,20 @@
         <p:grpSpPr>
           <a:xfrm>
             <a:off x="1000858" y="1888984"/>
-            <a:ext cx="5699347" cy="2348714"/>
+            <a:ext cx="5699347" cy="2822098"/>
             <a:chOff x="1000858" y="1888984"/>
-            <a:chExt cx="5699347" cy="2348714"/>
+            <a:chExt cx="5699347" cy="2822098"/>
           </a:xfrm>
         </p:grpSpPr>
         <p:sp>
           <p:nvSpPr>
-            <p:cNvPr id="7" name="Flowchart: Process 6"/>
+            <p:cNvPr id="13" name="Flowchart: Process 12">
+              <a:extLst>
+                <a:ext uri="{FF2B5EF4-FFF2-40B4-BE49-F238E27FC236}">
+                  <a16:creationId xmlns:a16="http://schemas.microsoft.com/office/drawing/2014/main" id="{F8395762-69D4-4D50-A1FB-D0875A9BED30}"/>
+                </a:ext>
+              </a:extLst>
+            </p:cNvPr>
             <p:cNvSpPr/>
             <p:nvPr/>
           </p:nvSpPr>
@@ -10254,7 +10304,59 @@
         </p:sp>
         <p:sp>
           <p:nvSpPr>
-            <p:cNvPr id="9" name="Flowchart: Process 8"/>
+            <p:cNvPr id="14" name="pic">
+              <a:extLst>
+                <a:ext uri="{FF2B5EF4-FFF2-40B4-BE49-F238E27FC236}">
+                  <a16:creationId xmlns:a16="http://schemas.microsoft.com/office/drawing/2014/main" id="{49FA4136-4760-4313-AAA4-EDF1A630441A}"/>
+                </a:ext>
+              </a:extLst>
+            </p:cNvPr>
+            <p:cNvSpPr/>
+            <p:nvPr/>
+          </p:nvSpPr>
+          <p:spPr>
+            <a:xfrm>
+              <a:off x="3344035" y="3770383"/>
+              <a:ext cx="1341254" cy="940699"/>
+            </a:xfrm>
+            <a:prstGeom prst="rect">
+              <a:avLst/>
+            </a:prstGeom>
+          </p:spPr>
+          <p:style>
+            <a:lnRef idx="2">
+              <a:schemeClr val="accent1">
+                <a:shade val="50000"/>
+              </a:schemeClr>
+            </a:lnRef>
+            <a:fillRef idx="1">
+              <a:schemeClr val="accent1"/>
+            </a:fillRef>
+            <a:effectRef idx="0">
+              <a:schemeClr val="accent1"/>
+            </a:effectRef>
+            <a:fontRef idx="minor">
+              <a:schemeClr val="lt1"/>
+            </a:fontRef>
+          </p:style>
+          <p:txBody>
+            <a:bodyPr rtlCol="0" anchor="ctr"/>
+            <a:lstStyle/>
+            <a:p>
+              <a:pPr algn="ctr"/>
+              <a:endParaRPr lang="en-US" sz="1350"/>
+            </a:p>
+          </p:txBody>
+        </p:sp>
+        <p:sp>
+          <p:nvSpPr>
+            <p:cNvPr id="15" name="Flowchart: Process 14">
+              <a:extLst>
+                <a:ext uri="{FF2B5EF4-FFF2-40B4-BE49-F238E27FC236}">
+                  <a16:creationId xmlns:a16="http://schemas.microsoft.com/office/drawing/2014/main" id="{9572CBCF-E487-4007-AEDD-764617AE6B40}"/>
+                </a:ext>
+              </a:extLst>
+            </p:cNvPr>
             <p:cNvSpPr/>
             <p:nvPr/>
           </p:nvSpPr>
@@ -10294,7 +10396,13 @@
         </p:sp>
         <p:sp>
           <p:nvSpPr>
-            <p:cNvPr id="10" name="Flowchart: Process 9"/>
+            <p:cNvPr id="16" name="Flowchart: Process 15">
+              <a:extLst>
+                <a:ext uri="{FF2B5EF4-FFF2-40B4-BE49-F238E27FC236}">
+                  <a16:creationId xmlns:a16="http://schemas.microsoft.com/office/drawing/2014/main" id="{4F727C1F-600C-4C39-949B-723C0B33DB64}"/>
+                </a:ext>
+              </a:extLst>
+            </p:cNvPr>
             <p:cNvSpPr/>
             <p:nvPr/>
           </p:nvSpPr>
@@ -10335,10 +10443,10 @@
       </p:grpSp>
       <p:pic>
         <p:nvPicPr>
-          <p:cNvPr id="4" name="Picture 3">
+          <p:cNvPr id="6" name="Picture 5">
             <a:extLst>
               <a:ext uri="{FF2B5EF4-FFF2-40B4-BE49-F238E27FC236}">
-                <a16:creationId xmlns:a16="http://schemas.microsoft.com/office/drawing/2014/main" id="{9FDA14D2-E31B-484D-8627-E2C3823C4235}"/>
+                <a16:creationId xmlns:a16="http://schemas.microsoft.com/office/drawing/2014/main" id="{26309744-667B-4D5D-B37D-C375A66033C1}"/>
               </a:ext>
             </a:extLst>
           </p:cNvPr>
@@ -10355,7 +10463,7 @@
         </p:blipFill>
         <p:spPr>
           <a:xfrm>
-            <a:off x="3331851" y="3759107"/>
+            <a:off x="3484251" y="3911507"/>
             <a:ext cx="1365622" cy="963251"/>
           </a:xfrm>
           <a:prstGeom prst="rect">
@@ -10363,50 +10471,6 @@
           </a:prstGeom>
         </p:spPr>
       </p:pic>
-      <p:sp>
-        <p:nvSpPr>
-          <p:cNvPr id="11" name="text 3">
-            <a:extLst>
-              <a:ext uri="{FF2B5EF4-FFF2-40B4-BE49-F238E27FC236}">
-                <a16:creationId xmlns:a16="http://schemas.microsoft.com/office/drawing/2014/main" id="{26742310-A731-46F6-91AA-B3348EA4301B}"/>
-              </a:ext>
-            </a:extLst>
-          </p:cNvPr>
-          <p:cNvSpPr txBox="1"/>
-          <p:nvPr/>
-        </p:nvSpPr>
-        <p:spPr>
-          <a:xfrm>
-            <a:off x="2057400" y="6019800"/>
-            <a:ext cx="5328318" cy="523220"/>
-          </a:xfrm>
-          <a:prstGeom prst="rect">
-            <a:avLst/>
-          </a:prstGeom>
-          <a:noFill/>
-        </p:spPr>
-        <p:txBody>
-          <a:bodyPr wrap="none" rtlCol="0">
-            <a:spAutoFit/>
-          </a:bodyPr>
-          <a:lstStyle/>
-          <a:p>
-            <a:r>
-              <a:rPr lang="en-US" sz="2800" b="1" dirty="0">
-                <a:solidFill>
-                  <a:schemeClr val="accent1"/>
-                </a:solidFill>
-              </a:rPr>
-              <a:t>Expected Output (a picture object)</a:t>
-            </a:r>
-            <a:endParaRPr lang="en-SG" sz="2800" b="1" dirty="0">
-              <a:solidFill>
-                <a:schemeClr val="accent1"/>
-              </a:solidFill>
-            </a:endParaRPr>
-          </a:p>
-        </p:txBody>
-      </p:sp>
     </p:spTree>
     <p:extLst>
       <p:ext uri="{BB962C8B-B14F-4D97-AF65-F5344CB8AC3E}">

</xml_diff>

<commit_message>
#1531 convert to picture for shapes in a group (#1966)
* Modify shape retrieval to use child shape range

* Add fix for multiple shapes in shapegroup.

* add test

* fix multi-select implementation

* Fix bug for single shape from group selected

* handle null reference for selectionsingleshape
remove unneccessary code

* fix 2010 childshaperange bug
</commit_message>
<xml_diff>
--- a/doc/test/ShortcutsLab/ConvertToPicture.pptx
+++ b/doc/test/ShortcutsLab/ConvertToPicture.pptx
@@ -7,7 +7,7 @@
     <p:sldMasterId id="2147483672" r:id="rId3"/>
   </p:sldMasterIdLst>
   <p:notesMasterIdLst>
-    <p:notesMasterId r:id="rId16"/>
+    <p:notesMasterId r:id="rId19"/>
   </p:notesMasterIdLst>
   <p:sldIdLst>
     <p:sldId id="287" r:id="rId4"/>
@@ -21,7 +21,10 @@
     <p:sldId id="298" r:id="rId12"/>
     <p:sldId id="299" r:id="rId13"/>
     <p:sldId id="300" r:id="rId14"/>
-    <p:sldId id="274" r:id="rId15"/>
+    <p:sldId id="301" r:id="rId15"/>
+    <p:sldId id="257" r:id="rId16"/>
+    <p:sldId id="302" r:id="rId17"/>
+    <p:sldId id="274" r:id="rId18"/>
   </p:sldIdLst>
   <p:sldSz cx="9144000" cy="6858000" type="screen4x3"/>
   <p:notesSz cx="6858000" cy="9144000"/>
@@ -140,6 +143,9 @@
             <p14:sldId id="298"/>
             <p14:sldId id="299"/>
             <p14:sldId id="300"/>
+            <p14:sldId id="301"/>
+            <p14:sldId id="257"/>
+            <p14:sldId id="302"/>
             <p14:sldId id="274"/>
           </p14:sldIdLst>
         </p14:section>
@@ -245,7 +251,7 @@
           <a:p>
             <a:fld id="{26004F41-C1A1-4B0D-9EEE-5E3F0E5BC108}" type="datetimeFigureOut">
               <a:rPr lang="en-SG" smtClean="0"/>
-              <a:t>8/3/2018</a:t>
+              <a:t>21/7/2019</a:t>
             </a:fld>
             <a:endParaRPr lang="en-SG"/>
           </a:p>
@@ -309,35 +315,35 @@
           <a:p>
             <a:pPr lvl="0"/>
             <a:r>
-              <a:rPr lang="zh-CN" altLang="en-US" smtClean="0"/>
+              <a:rPr lang="zh-CN" altLang="en-US"/>
               <a:t>单击此处编辑母版文本样式</a:t>
             </a:r>
           </a:p>
           <a:p>
             <a:pPr lvl="1"/>
             <a:r>
-              <a:rPr lang="zh-CN" altLang="en-US" smtClean="0"/>
+              <a:rPr lang="zh-CN" altLang="en-US"/>
               <a:t>第二级</a:t>
             </a:r>
           </a:p>
           <a:p>
             <a:pPr lvl="2"/>
             <a:r>
-              <a:rPr lang="zh-CN" altLang="en-US" smtClean="0"/>
+              <a:rPr lang="zh-CN" altLang="en-US"/>
               <a:t>第三级</a:t>
             </a:r>
           </a:p>
           <a:p>
             <a:pPr lvl="3"/>
             <a:r>
-              <a:rPr lang="zh-CN" altLang="en-US" smtClean="0"/>
+              <a:rPr lang="zh-CN" altLang="en-US"/>
               <a:t>第四级</a:t>
             </a:r>
           </a:p>
           <a:p>
             <a:pPr lvl="4"/>
             <a:r>
-              <a:rPr lang="zh-CN" altLang="en-US" smtClean="0"/>
+              <a:rPr lang="zh-CN" altLang="en-US"/>
               <a:t>第五级</a:t>
             </a:r>
             <a:endParaRPr lang="en-SG"/>
@@ -551,10 +557,9 @@
           <a:lstStyle/>
           <a:p>
             <a:r>
-              <a:rPr lang="en-US" smtClean="0"/>
+              <a:rPr lang="en-US"/>
               <a:t>Click to edit Master title style</a:t>
             </a:r>
-            <a:endParaRPr lang="en-US"/>
           </a:p>
         </p:txBody>
       </p:sp>
@@ -670,10 +675,9 @@
           </a:lstStyle>
           <a:p>
             <a:r>
-              <a:rPr lang="en-US" smtClean="0"/>
+              <a:rPr lang="en-US"/>
               <a:t>Click to edit Master subtitle style</a:t>
             </a:r>
-            <a:endParaRPr lang="en-US"/>
           </a:p>
         </p:txBody>
       </p:sp>
@@ -694,7 +698,7 @@
           <a:p>
             <a:fld id="{699DC775-C286-4358-8C92-D7E584E969B3}" type="datetimeFigureOut">
               <a:rPr lang="en-US" smtClean="0"/>
-              <a:t>3/8/2018</a:t>
+              <a:t>7/21/2019</a:t>
             </a:fld>
             <a:endParaRPr lang="en-US"/>
           </a:p>
@@ -788,10 +792,9 @@
           <a:lstStyle/>
           <a:p>
             <a:r>
-              <a:rPr lang="en-US" smtClean="0"/>
+              <a:rPr lang="en-US"/>
               <a:t>Click to edit Master title style</a:t>
             </a:r>
-            <a:endParaRPr lang="en-US"/>
           </a:p>
         </p:txBody>
       </p:sp>
@@ -812,38 +815,37 @@
           <a:p>
             <a:pPr lvl="0"/>
             <a:r>
-              <a:rPr lang="en-US" smtClean="0"/>
+              <a:rPr lang="en-US"/>
               <a:t>Click to edit Master text styles</a:t>
             </a:r>
           </a:p>
           <a:p>
             <a:pPr lvl="1"/>
             <a:r>
-              <a:rPr lang="en-US" smtClean="0"/>
+              <a:rPr lang="en-US"/>
               <a:t>Second level</a:t>
             </a:r>
           </a:p>
           <a:p>
             <a:pPr lvl="2"/>
             <a:r>
-              <a:rPr lang="en-US" smtClean="0"/>
+              <a:rPr lang="en-US"/>
               <a:t>Third level</a:t>
             </a:r>
           </a:p>
           <a:p>
             <a:pPr lvl="3"/>
             <a:r>
-              <a:rPr lang="en-US" smtClean="0"/>
+              <a:rPr lang="en-US"/>
               <a:t>Fourth level</a:t>
             </a:r>
           </a:p>
           <a:p>
             <a:pPr lvl="4"/>
             <a:r>
-              <a:rPr lang="en-US" smtClean="0"/>
+              <a:rPr lang="en-US"/>
               <a:t>Fifth level</a:t>
             </a:r>
-            <a:endParaRPr lang="en-US"/>
           </a:p>
         </p:txBody>
       </p:sp>
@@ -864,7 +866,7 @@
           <a:p>
             <a:fld id="{699DC775-C286-4358-8C92-D7E584E969B3}" type="datetimeFigureOut">
               <a:rPr lang="en-US" smtClean="0"/>
-              <a:t>3/8/2018</a:t>
+              <a:t>7/21/2019</a:t>
             </a:fld>
             <a:endParaRPr lang="en-US"/>
           </a:p>
@@ -963,10 +965,9 @@
           <a:lstStyle/>
           <a:p>
             <a:r>
-              <a:rPr lang="en-US" smtClean="0"/>
+              <a:rPr lang="en-US"/>
               <a:t>Click to edit Master title style</a:t>
             </a:r>
-            <a:endParaRPr lang="en-US"/>
           </a:p>
         </p:txBody>
       </p:sp>
@@ -992,38 +993,37 @@
           <a:p>
             <a:pPr lvl="0"/>
             <a:r>
-              <a:rPr lang="en-US" smtClean="0"/>
+              <a:rPr lang="en-US"/>
               <a:t>Click to edit Master text styles</a:t>
             </a:r>
           </a:p>
           <a:p>
             <a:pPr lvl="1"/>
             <a:r>
-              <a:rPr lang="en-US" smtClean="0"/>
+              <a:rPr lang="en-US"/>
               <a:t>Second level</a:t>
             </a:r>
           </a:p>
           <a:p>
             <a:pPr lvl="2"/>
             <a:r>
-              <a:rPr lang="en-US" smtClean="0"/>
+              <a:rPr lang="en-US"/>
               <a:t>Third level</a:t>
             </a:r>
           </a:p>
           <a:p>
             <a:pPr lvl="3"/>
             <a:r>
-              <a:rPr lang="en-US" smtClean="0"/>
+              <a:rPr lang="en-US"/>
               <a:t>Fourth level</a:t>
             </a:r>
           </a:p>
           <a:p>
             <a:pPr lvl="4"/>
             <a:r>
-              <a:rPr lang="en-US" smtClean="0"/>
+              <a:rPr lang="en-US"/>
               <a:t>Fifth level</a:t>
             </a:r>
-            <a:endParaRPr lang="en-US"/>
           </a:p>
         </p:txBody>
       </p:sp>
@@ -1044,7 +1044,7 @@
           <a:p>
             <a:fld id="{699DC775-C286-4358-8C92-D7E584E969B3}" type="datetimeFigureOut">
               <a:rPr lang="en-US" smtClean="0"/>
-              <a:t>3/8/2018</a:t>
+              <a:t>7/21/2019</a:t>
             </a:fld>
             <a:endParaRPr lang="en-US"/>
           </a:p>
@@ -1143,10 +1143,9 @@
           <a:lstStyle/>
           <a:p>
             <a:r>
-              <a:rPr lang="en-US" smtClean="0"/>
+              <a:rPr lang="en-US"/>
               <a:t>Click to edit Master title style</a:t>
             </a:r>
-            <a:endParaRPr lang="en-US"/>
           </a:p>
         </p:txBody>
       </p:sp>
@@ -1262,10 +1261,9 @@
           </a:lstStyle>
           <a:p>
             <a:r>
-              <a:rPr lang="en-US" smtClean="0"/>
+              <a:rPr lang="en-US"/>
               <a:t>Click to edit Master subtitle style</a:t>
             </a:r>
-            <a:endParaRPr lang="en-US"/>
           </a:p>
         </p:txBody>
       </p:sp>
@@ -1286,7 +1284,7 @@
           <a:p>
             <a:fld id="{699DC775-C286-4358-8C92-D7E584E969B3}" type="datetimeFigureOut">
               <a:rPr lang="en-US" smtClean="0"/>
-              <a:t>3/8/2018</a:t>
+              <a:t>7/21/2019</a:t>
             </a:fld>
             <a:endParaRPr lang="en-US"/>
           </a:p>
@@ -1380,10 +1378,9 @@
           <a:lstStyle/>
           <a:p>
             <a:r>
-              <a:rPr lang="en-US" smtClean="0"/>
+              <a:rPr lang="en-US"/>
               <a:t>Click to edit Master title style</a:t>
             </a:r>
-            <a:endParaRPr lang="en-US"/>
           </a:p>
         </p:txBody>
       </p:sp>
@@ -1404,38 +1401,37 @@
           <a:p>
             <a:pPr lvl="0"/>
             <a:r>
-              <a:rPr lang="en-US" smtClean="0"/>
+              <a:rPr lang="en-US"/>
               <a:t>Click to edit Master text styles</a:t>
             </a:r>
           </a:p>
           <a:p>
             <a:pPr lvl="1"/>
             <a:r>
-              <a:rPr lang="en-US" smtClean="0"/>
+              <a:rPr lang="en-US"/>
               <a:t>Second level</a:t>
             </a:r>
           </a:p>
           <a:p>
             <a:pPr lvl="2"/>
             <a:r>
-              <a:rPr lang="en-US" smtClean="0"/>
+              <a:rPr lang="en-US"/>
               <a:t>Third level</a:t>
             </a:r>
           </a:p>
           <a:p>
             <a:pPr lvl="3"/>
             <a:r>
-              <a:rPr lang="en-US" smtClean="0"/>
+              <a:rPr lang="en-US"/>
               <a:t>Fourth level</a:t>
             </a:r>
           </a:p>
           <a:p>
             <a:pPr lvl="4"/>
             <a:r>
-              <a:rPr lang="en-US" smtClean="0"/>
+              <a:rPr lang="en-US"/>
               <a:t>Fifth level</a:t>
             </a:r>
-            <a:endParaRPr lang="en-US"/>
           </a:p>
         </p:txBody>
       </p:sp>
@@ -1456,7 +1452,7 @@
           <a:p>
             <a:fld id="{699DC775-C286-4358-8C92-D7E584E969B3}" type="datetimeFigureOut">
               <a:rPr lang="en-US" smtClean="0"/>
-              <a:t>3/8/2018</a:t>
+              <a:t>7/21/2019</a:t>
             </a:fld>
             <a:endParaRPr lang="en-US"/>
           </a:p>
@@ -1559,10 +1555,9 @@
           </a:lstStyle>
           <a:p>
             <a:r>
-              <a:rPr lang="en-US" smtClean="0"/>
+              <a:rPr lang="en-US"/>
               <a:t>Click to edit Master title style</a:t>
             </a:r>
-            <a:endParaRPr lang="en-US"/>
           </a:p>
         </p:txBody>
       </p:sp>
@@ -1679,7 +1674,7 @@
           <a:p>
             <a:pPr lvl="0"/>
             <a:r>
-              <a:rPr lang="en-US" smtClean="0"/>
+              <a:rPr lang="en-US"/>
               <a:t>Click to edit Master text styles</a:t>
             </a:r>
           </a:p>
@@ -1702,7 +1697,7 @@
           <a:p>
             <a:fld id="{699DC775-C286-4358-8C92-D7E584E969B3}" type="datetimeFigureOut">
               <a:rPr lang="en-US" smtClean="0"/>
-              <a:t>3/8/2018</a:t>
+              <a:t>7/21/2019</a:t>
             </a:fld>
             <a:endParaRPr lang="en-US"/>
           </a:p>
@@ -1796,10 +1791,9 @@
           <a:lstStyle/>
           <a:p>
             <a:r>
-              <a:rPr lang="en-US" smtClean="0"/>
+              <a:rPr lang="en-US"/>
               <a:t>Click to edit Master title style</a:t>
             </a:r>
-            <a:endParaRPr lang="en-US"/>
           </a:p>
         </p:txBody>
       </p:sp>
@@ -1853,38 +1847,37 @@
           <a:p>
             <a:pPr lvl="0"/>
             <a:r>
-              <a:rPr lang="en-US" smtClean="0"/>
+              <a:rPr lang="en-US"/>
               <a:t>Click to edit Master text styles</a:t>
             </a:r>
           </a:p>
           <a:p>
             <a:pPr lvl="1"/>
             <a:r>
-              <a:rPr lang="en-US" smtClean="0"/>
+              <a:rPr lang="en-US"/>
               <a:t>Second level</a:t>
             </a:r>
           </a:p>
           <a:p>
             <a:pPr lvl="2"/>
             <a:r>
-              <a:rPr lang="en-US" smtClean="0"/>
+              <a:rPr lang="en-US"/>
               <a:t>Third level</a:t>
             </a:r>
           </a:p>
           <a:p>
             <a:pPr lvl="3"/>
             <a:r>
-              <a:rPr lang="en-US" smtClean="0"/>
+              <a:rPr lang="en-US"/>
               <a:t>Fourth level</a:t>
             </a:r>
           </a:p>
           <a:p>
             <a:pPr lvl="4"/>
             <a:r>
-              <a:rPr lang="en-US" smtClean="0"/>
+              <a:rPr lang="en-US"/>
               <a:t>Fifth level</a:t>
             </a:r>
-            <a:endParaRPr lang="en-US"/>
           </a:p>
         </p:txBody>
       </p:sp>
@@ -1938,38 +1931,37 @@
           <a:p>
             <a:pPr lvl="0"/>
             <a:r>
-              <a:rPr lang="en-US" smtClean="0"/>
+              <a:rPr lang="en-US"/>
               <a:t>Click to edit Master text styles</a:t>
             </a:r>
           </a:p>
           <a:p>
             <a:pPr lvl="1"/>
             <a:r>
-              <a:rPr lang="en-US" smtClean="0"/>
+              <a:rPr lang="en-US"/>
               <a:t>Second level</a:t>
             </a:r>
           </a:p>
           <a:p>
             <a:pPr lvl="2"/>
             <a:r>
-              <a:rPr lang="en-US" smtClean="0"/>
+              <a:rPr lang="en-US"/>
               <a:t>Third level</a:t>
             </a:r>
           </a:p>
           <a:p>
             <a:pPr lvl="3"/>
             <a:r>
-              <a:rPr lang="en-US" smtClean="0"/>
+              <a:rPr lang="en-US"/>
               <a:t>Fourth level</a:t>
             </a:r>
           </a:p>
           <a:p>
             <a:pPr lvl="4"/>
             <a:r>
-              <a:rPr lang="en-US" smtClean="0"/>
+              <a:rPr lang="en-US"/>
               <a:t>Fifth level</a:t>
             </a:r>
-            <a:endParaRPr lang="en-US"/>
           </a:p>
         </p:txBody>
       </p:sp>
@@ -1990,7 +1982,7 @@
           <a:p>
             <a:fld id="{699DC775-C286-4358-8C92-D7E584E969B3}" type="datetimeFigureOut">
               <a:rPr lang="en-US" smtClean="0"/>
-              <a:t>3/8/2018</a:t>
+              <a:t>7/21/2019</a:t>
             </a:fld>
             <a:endParaRPr lang="en-US"/>
           </a:p>
@@ -2088,10 +2080,9 @@
           </a:lstStyle>
           <a:p>
             <a:r>
-              <a:rPr lang="en-US" smtClean="0"/>
+              <a:rPr lang="en-US"/>
               <a:t>Click to edit Master title style</a:t>
             </a:r>
-            <a:endParaRPr lang="en-US"/>
           </a:p>
         </p:txBody>
       </p:sp>
@@ -2154,7 +2145,7 @@
           <a:p>
             <a:pPr lvl="0"/>
             <a:r>
-              <a:rPr lang="en-US" smtClean="0"/>
+              <a:rPr lang="en-US"/>
               <a:t>Click to edit Master text styles</a:t>
             </a:r>
           </a:p>
@@ -2210,38 +2201,37 @@
           <a:p>
             <a:pPr lvl="0"/>
             <a:r>
-              <a:rPr lang="en-US" smtClean="0"/>
+              <a:rPr lang="en-US"/>
               <a:t>Click to edit Master text styles</a:t>
             </a:r>
           </a:p>
           <a:p>
             <a:pPr lvl="1"/>
             <a:r>
-              <a:rPr lang="en-US" smtClean="0"/>
+              <a:rPr lang="en-US"/>
               <a:t>Second level</a:t>
             </a:r>
           </a:p>
           <a:p>
             <a:pPr lvl="2"/>
             <a:r>
-              <a:rPr lang="en-US" smtClean="0"/>
+              <a:rPr lang="en-US"/>
               <a:t>Third level</a:t>
             </a:r>
           </a:p>
           <a:p>
             <a:pPr lvl="3"/>
             <a:r>
-              <a:rPr lang="en-US" smtClean="0"/>
+              <a:rPr lang="en-US"/>
               <a:t>Fourth level</a:t>
             </a:r>
           </a:p>
           <a:p>
             <a:pPr lvl="4"/>
             <a:r>
-              <a:rPr lang="en-US" smtClean="0"/>
+              <a:rPr lang="en-US"/>
               <a:t>Fifth level</a:t>
             </a:r>
-            <a:endParaRPr lang="en-US"/>
           </a:p>
         </p:txBody>
       </p:sp>
@@ -2304,7 +2294,7 @@
           <a:p>
             <a:pPr lvl="0"/>
             <a:r>
-              <a:rPr lang="en-US" smtClean="0"/>
+              <a:rPr lang="en-US"/>
               <a:t>Click to edit Master text styles</a:t>
             </a:r>
           </a:p>
@@ -2360,38 +2350,37 @@
           <a:p>
             <a:pPr lvl="0"/>
             <a:r>
-              <a:rPr lang="en-US" smtClean="0"/>
+              <a:rPr lang="en-US"/>
               <a:t>Click to edit Master text styles</a:t>
             </a:r>
           </a:p>
           <a:p>
             <a:pPr lvl="1"/>
             <a:r>
-              <a:rPr lang="en-US" smtClean="0"/>
+              <a:rPr lang="en-US"/>
               <a:t>Second level</a:t>
             </a:r>
           </a:p>
           <a:p>
             <a:pPr lvl="2"/>
             <a:r>
-              <a:rPr lang="en-US" smtClean="0"/>
+              <a:rPr lang="en-US"/>
               <a:t>Third level</a:t>
             </a:r>
           </a:p>
           <a:p>
             <a:pPr lvl="3"/>
             <a:r>
-              <a:rPr lang="en-US" smtClean="0"/>
+              <a:rPr lang="en-US"/>
               <a:t>Fourth level</a:t>
             </a:r>
           </a:p>
           <a:p>
             <a:pPr lvl="4"/>
             <a:r>
-              <a:rPr lang="en-US" smtClean="0"/>
+              <a:rPr lang="en-US"/>
               <a:t>Fifth level</a:t>
             </a:r>
-            <a:endParaRPr lang="en-US"/>
           </a:p>
         </p:txBody>
       </p:sp>
@@ -2412,7 +2401,7 @@
           <a:p>
             <a:fld id="{699DC775-C286-4358-8C92-D7E584E969B3}" type="datetimeFigureOut">
               <a:rPr lang="en-US" smtClean="0"/>
-              <a:t>3/8/2018</a:t>
+              <a:t>7/21/2019</a:t>
             </a:fld>
             <a:endParaRPr lang="en-US"/>
           </a:p>
@@ -2506,10 +2495,9 @@
           <a:lstStyle/>
           <a:p>
             <a:r>
-              <a:rPr lang="en-US" smtClean="0"/>
+              <a:rPr lang="en-US"/>
               <a:t>Click to edit Master title style</a:t>
             </a:r>
-            <a:endParaRPr lang="en-US"/>
           </a:p>
         </p:txBody>
       </p:sp>
@@ -2530,7 +2518,7 @@
           <a:p>
             <a:fld id="{699DC775-C286-4358-8C92-D7E584E969B3}" type="datetimeFigureOut">
               <a:rPr lang="en-US" smtClean="0"/>
-              <a:t>3/8/2018</a:t>
+              <a:t>7/21/2019</a:t>
             </a:fld>
             <a:endParaRPr lang="en-US"/>
           </a:p>
@@ -2625,7 +2613,7 @@
           <a:p>
             <a:fld id="{699DC775-C286-4358-8C92-D7E584E969B3}" type="datetimeFigureOut">
               <a:rPr lang="en-US" smtClean="0"/>
-              <a:t>3/8/2018</a:t>
+              <a:t>7/21/2019</a:t>
             </a:fld>
             <a:endParaRPr lang="en-US"/>
           </a:p>
@@ -2728,10 +2716,9 @@
           </a:lstStyle>
           <a:p>
             <a:r>
-              <a:rPr lang="en-US" smtClean="0"/>
+              <a:rPr lang="en-US"/>
               <a:t>Click to edit Master title style</a:t>
             </a:r>
-            <a:endParaRPr lang="en-US"/>
           </a:p>
         </p:txBody>
       </p:sp>
@@ -2785,38 +2772,37 @@
           <a:p>
             <a:pPr lvl="0"/>
             <a:r>
-              <a:rPr lang="en-US" smtClean="0"/>
+              <a:rPr lang="en-US"/>
               <a:t>Click to edit Master text styles</a:t>
             </a:r>
           </a:p>
           <a:p>
             <a:pPr lvl="1"/>
             <a:r>
-              <a:rPr lang="en-US" smtClean="0"/>
+              <a:rPr lang="en-US"/>
               <a:t>Second level</a:t>
             </a:r>
           </a:p>
           <a:p>
             <a:pPr lvl="2"/>
             <a:r>
-              <a:rPr lang="en-US" smtClean="0"/>
+              <a:rPr lang="en-US"/>
               <a:t>Third level</a:t>
             </a:r>
           </a:p>
           <a:p>
             <a:pPr lvl="3"/>
             <a:r>
-              <a:rPr lang="en-US" smtClean="0"/>
+              <a:rPr lang="en-US"/>
               <a:t>Fourth level</a:t>
             </a:r>
           </a:p>
           <a:p>
             <a:pPr lvl="4"/>
             <a:r>
-              <a:rPr lang="en-US" smtClean="0"/>
+              <a:rPr lang="en-US"/>
               <a:t>Fifth level</a:t>
             </a:r>
-            <a:endParaRPr lang="en-US"/>
           </a:p>
         </p:txBody>
       </p:sp>
@@ -2879,7 +2865,7 @@
           <a:p>
             <a:pPr lvl="0"/>
             <a:r>
-              <a:rPr lang="en-US" smtClean="0"/>
+              <a:rPr lang="en-US"/>
               <a:t>Click to edit Master text styles</a:t>
             </a:r>
           </a:p>
@@ -2902,7 +2888,7 @@
           <a:p>
             <a:fld id="{699DC775-C286-4358-8C92-D7E584E969B3}" type="datetimeFigureOut">
               <a:rPr lang="en-US" smtClean="0"/>
-              <a:t>3/8/2018</a:t>
+              <a:t>7/21/2019</a:t>
             </a:fld>
             <a:endParaRPr lang="en-US"/>
           </a:p>
@@ -2996,10 +2982,9 @@
           <a:lstStyle/>
           <a:p>
             <a:r>
-              <a:rPr lang="en-US" smtClean="0"/>
+              <a:rPr lang="en-US"/>
               <a:t>Click to edit Master title style</a:t>
             </a:r>
-            <a:endParaRPr lang="en-US"/>
           </a:p>
         </p:txBody>
       </p:sp>
@@ -3020,38 +3005,37 @@
           <a:p>
             <a:pPr lvl="0"/>
             <a:r>
-              <a:rPr lang="en-US" smtClean="0"/>
+              <a:rPr lang="en-US"/>
               <a:t>Click to edit Master text styles</a:t>
             </a:r>
           </a:p>
           <a:p>
             <a:pPr lvl="1"/>
             <a:r>
-              <a:rPr lang="en-US" smtClean="0"/>
+              <a:rPr lang="en-US"/>
               <a:t>Second level</a:t>
             </a:r>
           </a:p>
           <a:p>
             <a:pPr lvl="2"/>
             <a:r>
-              <a:rPr lang="en-US" smtClean="0"/>
+              <a:rPr lang="en-US"/>
               <a:t>Third level</a:t>
             </a:r>
           </a:p>
           <a:p>
             <a:pPr lvl="3"/>
             <a:r>
-              <a:rPr lang="en-US" smtClean="0"/>
+              <a:rPr lang="en-US"/>
               <a:t>Fourth level</a:t>
             </a:r>
           </a:p>
           <a:p>
             <a:pPr lvl="4"/>
             <a:r>
-              <a:rPr lang="en-US" smtClean="0"/>
+              <a:rPr lang="en-US"/>
               <a:t>Fifth level</a:t>
             </a:r>
-            <a:endParaRPr lang="en-US"/>
           </a:p>
         </p:txBody>
       </p:sp>
@@ -3072,7 +3056,7 @@
           <a:p>
             <a:fld id="{699DC775-C286-4358-8C92-D7E584E969B3}" type="datetimeFigureOut">
               <a:rPr lang="en-US" smtClean="0"/>
-              <a:t>3/8/2018</a:t>
+              <a:t>7/21/2019</a:t>
             </a:fld>
             <a:endParaRPr lang="en-US"/>
           </a:p>
@@ -3175,10 +3159,9 @@
           </a:lstStyle>
           <a:p>
             <a:r>
-              <a:rPr lang="en-US" smtClean="0"/>
+              <a:rPr lang="en-US"/>
               <a:t>Click to edit Master title style</a:t>
             </a:r>
-            <a:endParaRPr lang="en-US"/>
           </a:p>
         </p:txBody>
       </p:sp>
@@ -3302,7 +3285,7 @@
           <a:p>
             <a:pPr lvl="0"/>
             <a:r>
-              <a:rPr lang="en-US" smtClean="0"/>
+              <a:rPr lang="en-US"/>
               <a:t>Click to edit Master text styles</a:t>
             </a:r>
           </a:p>
@@ -3325,7 +3308,7 @@
           <a:p>
             <a:fld id="{699DC775-C286-4358-8C92-D7E584E969B3}" type="datetimeFigureOut">
               <a:rPr lang="en-US" smtClean="0"/>
-              <a:t>3/8/2018</a:t>
+              <a:t>7/21/2019</a:t>
             </a:fld>
             <a:endParaRPr lang="en-US"/>
           </a:p>
@@ -3419,10 +3402,9 @@
           <a:lstStyle/>
           <a:p>
             <a:r>
-              <a:rPr lang="en-US" smtClean="0"/>
+              <a:rPr lang="en-US"/>
               <a:t>Click to edit Master title style</a:t>
             </a:r>
-            <a:endParaRPr lang="en-US"/>
           </a:p>
         </p:txBody>
       </p:sp>
@@ -3443,38 +3425,37 @@
           <a:p>
             <a:pPr lvl="0"/>
             <a:r>
-              <a:rPr lang="en-US" smtClean="0"/>
+              <a:rPr lang="en-US"/>
               <a:t>Click to edit Master text styles</a:t>
             </a:r>
           </a:p>
           <a:p>
             <a:pPr lvl="1"/>
             <a:r>
-              <a:rPr lang="en-US" smtClean="0"/>
+              <a:rPr lang="en-US"/>
               <a:t>Second level</a:t>
             </a:r>
           </a:p>
           <a:p>
             <a:pPr lvl="2"/>
             <a:r>
-              <a:rPr lang="en-US" smtClean="0"/>
+              <a:rPr lang="en-US"/>
               <a:t>Third level</a:t>
             </a:r>
           </a:p>
           <a:p>
             <a:pPr lvl="3"/>
             <a:r>
-              <a:rPr lang="en-US" smtClean="0"/>
+              <a:rPr lang="en-US"/>
               <a:t>Fourth level</a:t>
             </a:r>
           </a:p>
           <a:p>
             <a:pPr lvl="4"/>
             <a:r>
-              <a:rPr lang="en-US" smtClean="0"/>
+              <a:rPr lang="en-US"/>
               <a:t>Fifth level</a:t>
             </a:r>
-            <a:endParaRPr lang="en-US"/>
           </a:p>
         </p:txBody>
       </p:sp>
@@ -3495,7 +3476,7 @@
           <a:p>
             <a:fld id="{699DC775-C286-4358-8C92-D7E584E969B3}" type="datetimeFigureOut">
               <a:rPr lang="en-US" smtClean="0"/>
-              <a:t>3/8/2018</a:t>
+              <a:t>7/21/2019</a:t>
             </a:fld>
             <a:endParaRPr lang="en-US"/>
           </a:p>
@@ -3594,10 +3575,9 @@
           <a:lstStyle/>
           <a:p>
             <a:r>
-              <a:rPr lang="en-US" smtClean="0"/>
+              <a:rPr lang="en-US"/>
               <a:t>Click to edit Master title style</a:t>
             </a:r>
-            <a:endParaRPr lang="en-US"/>
           </a:p>
         </p:txBody>
       </p:sp>
@@ -3623,38 +3603,37 @@
           <a:p>
             <a:pPr lvl="0"/>
             <a:r>
-              <a:rPr lang="en-US" smtClean="0"/>
+              <a:rPr lang="en-US"/>
               <a:t>Click to edit Master text styles</a:t>
             </a:r>
           </a:p>
           <a:p>
             <a:pPr lvl="1"/>
             <a:r>
-              <a:rPr lang="en-US" smtClean="0"/>
+              <a:rPr lang="en-US"/>
               <a:t>Second level</a:t>
             </a:r>
           </a:p>
           <a:p>
             <a:pPr lvl="2"/>
             <a:r>
-              <a:rPr lang="en-US" smtClean="0"/>
+              <a:rPr lang="en-US"/>
               <a:t>Third level</a:t>
             </a:r>
           </a:p>
           <a:p>
             <a:pPr lvl="3"/>
             <a:r>
-              <a:rPr lang="en-US" smtClean="0"/>
+              <a:rPr lang="en-US"/>
               <a:t>Fourth level</a:t>
             </a:r>
           </a:p>
           <a:p>
             <a:pPr lvl="4"/>
             <a:r>
-              <a:rPr lang="en-US" smtClean="0"/>
+              <a:rPr lang="en-US"/>
               <a:t>Fifth level</a:t>
             </a:r>
-            <a:endParaRPr lang="en-US"/>
           </a:p>
         </p:txBody>
       </p:sp>
@@ -3675,7 +3654,7 @@
           <a:p>
             <a:fld id="{699DC775-C286-4358-8C92-D7E584E969B3}" type="datetimeFigureOut">
               <a:rPr lang="en-US" smtClean="0"/>
-              <a:t>3/8/2018</a:t>
+              <a:t>7/21/2019</a:t>
             </a:fld>
             <a:endParaRPr lang="en-US"/>
           </a:p>
@@ -3782,10 +3761,9 @@
           <a:lstStyle/>
           <a:p>
             <a:r>
-              <a:rPr lang="en-US" smtClean="0"/>
+              <a:rPr lang="en-US"/>
               <a:t>Click to edit Master title style</a:t>
             </a:r>
-            <a:endParaRPr lang="en-US"/>
           </a:p>
         </p:txBody>
       </p:sp>
@@ -3901,10 +3879,9 @@
           </a:lstStyle>
           <a:p>
             <a:r>
-              <a:rPr lang="en-US" smtClean="0"/>
+              <a:rPr lang="en-US"/>
               <a:t>Click to edit Master subtitle style</a:t>
             </a:r>
-            <a:endParaRPr lang="en-US"/>
           </a:p>
         </p:txBody>
       </p:sp>
@@ -3925,7 +3902,7 @@
           <a:p>
             <a:fld id="{699DC775-C286-4358-8C92-D7E584E969B3}" type="datetimeFigureOut">
               <a:rPr lang="en-US" smtClean="0"/>
-              <a:t>3/8/2018</a:t>
+              <a:t>7/21/2019</a:t>
             </a:fld>
             <a:endParaRPr lang="en-US"/>
           </a:p>
@@ -4027,10 +4004,9 @@
           <a:lstStyle/>
           <a:p>
             <a:r>
-              <a:rPr lang="en-US" smtClean="0"/>
+              <a:rPr lang="en-US"/>
               <a:t>Click to edit Master title style</a:t>
             </a:r>
-            <a:endParaRPr lang="en-US"/>
           </a:p>
         </p:txBody>
       </p:sp>
@@ -4051,38 +4027,37 @@
           <a:p>
             <a:pPr lvl="0"/>
             <a:r>
-              <a:rPr lang="en-US" smtClean="0"/>
+              <a:rPr lang="en-US"/>
               <a:t>Click to edit Master text styles</a:t>
             </a:r>
           </a:p>
           <a:p>
             <a:pPr lvl="1"/>
             <a:r>
-              <a:rPr lang="en-US" smtClean="0"/>
+              <a:rPr lang="en-US"/>
               <a:t>Second level</a:t>
             </a:r>
           </a:p>
           <a:p>
             <a:pPr lvl="2"/>
             <a:r>
-              <a:rPr lang="en-US" smtClean="0"/>
+              <a:rPr lang="en-US"/>
               <a:t>Third level</a:t>
             </a:r>
           </a:p>
           <a:p>
             <a:pPr lvl="3"/>
             <a:r>
-              <a:rPr lang="en-US" smtClean="0"/>
+              <a:rPr lang="en-US"/>
               <a:t>Fourth level</a:t>
             </a:r>
           </a:p>
           <a:p>
             <a:pPr lvl="4"/>
             <a:r>
-              <a:rPr lang="en-US" smtClean="0"/>
+              <a:rPr lang="en-US"/>
               <a:t>Fifth level</a:t>
             </a:r>
-            <a:endParaRPr lang="en-US"/>
           </a:p>
         </p:txBody>
       </p:sp>
@@ -4103,7 +4078,7 @@
           <a:p>
             <a:fld id="{699DC775-C286-4358-8C92-D7E584E969B3}" type="datetimeFigureOut">
               <a:rPr lang="en-US" smtClean="0"/>
-              <a:t>3/8/2018</a:t>
+              <a:t>7/21/2019</a:t>
             </a:fld>
             <a:endParaRPr lang="en-US"/>
           </a:p>
@@ -4214,10 +4189,9 @@
           </a:lstStyle>
           <a:p>
             <a:r>
-              <a:rPr lang="en-US" smtClean="0"/>
+              <a:rPr lang="en-US"/>
               <a:t>Click to edit Master title style</a:t>
             </a:r>
-            <a:endParaRPr lang="en-US"/>
           </a:p>
         </p:txBody>
       </p:sp>
@@ -4334,7 +4308,7 @@
           <a:p>
             <a:pPr lvl="0"/>
             <a:r>
-              <a:rPr lang="en-US" smtClean="0"/>
+              <a:rPr lang="en-US"/>
               <a:t>Click to edit Master text styles</a:t>
             </a:r>
           </a:p>
@@ -4357,7 +4331,7 @@
           <a:p>
             <a:fld id="{699DC775-C286-4358-8C92-D7E584E969B3}" type="datetimeFigureOut">
               <a:rPr lang="en-US" smtClean="0"/>
-              <a:t>3/8/2018</a:t>
+              <a:t>7/21/2019</a:t>
             </a:fld>
             <a:endParaRPr lang="en-US"/>
           </a:p>
@@ -4459,10 +4433,9 @@
           <a:lstStyle/>
           <a:p>
             <a:r>
-              <a:rPr lang="en-US" smtClean="0"/>
+              <a:rPr lang="en-US"/>
               <a:t>Click to edit Master title style</a:t>
             </a:r>
-            <a:endParaRPr lang="en-US"/>
           </a:p>
         </p:txBody>
       </p:sp>
@@ -4516,38 +4489,37 @@
           <a:p>
             <a:pPr lvl="0"/>
             <a:r>
-              <a:rPr lang="en-US" smtClean="0"/>
+              <a:rPr lang="en-US"/>
               <a:t>Click to edit Master text styles</a:t>
             </a:r>
           </a:p>
           <a:p>
             <a:pPr lvl="1"/>
             <a:r>
-              <a:rPr lang="en-US" smtClean="0"/>
+              <a:rPr lang="en-US"/>
               <a:t>Second level</a:t>
             </a:r>
           </a:p>
           <a:p>
             <a:pPr lvl="2"/>
             <a:r>
-              <a:rPr lang="en-US" smtClean="0"/>
+              <a:rPr lang="en-US"/>
               <a:t>Third level</a:t>
             </a:r>
           </a:p>
           <a:p>
             <a:pPr lvl="3"/>
             <a:r>
-              <a:rPr lang="en-US" smtClean="0"/>
+              <a:rPr lang="en-US"/>
               <a:t>Fourth level</a:t>
             </a:r>
           </a:p>
           <a:p>
             <a:pPr lvl="4"/>
             <a:r>
-              <a:rPr lang="en-US" smtClean="0"/>
+              <a:rPr lang="en-US"/>
               <a:t>Fifth level</a:t>
             </a:r>
-            <a:endParaRPr lang="en-US"/>
           </a:p>
         </p:txBody>
       </p:sp>
@@ -4601,38 +4573,37 @@
           <a:p>
             <a:pPr lvl="0"/>
             <a:r>
-              <a:rPr lang="en-US" smtClean="0"/>
+              <a:rPr lang="en-US"/>
               <a:t>Click to edit Master text styles</a:t>
             </a:r>
           </a:p>
           <a:p>
             <a:pPr lvl="1"/>
             <a:r>
-              <a:rPr lang="en-US" smtClean="0"/>
+              <a:rPr lang="en-US"/>
               <a:t>Second level</a:t>
             </a:r>
           </a:p>
           <a:p>
             <a:pPr lvl="2"/>
             <a:r>
-              <a:rPr lang="en-US" smtClean="0"/>
+              <a:rPr lang="en-US"/>
               <a:t>Third level</a:t>
             </a:r>
           </a:p>
           <a:p>
             <a:pPr lvl="3"/>
             <a:r>
-              <a:rPr lang="en-US" smtClean="0"/>
+              <a:rPr lang="en-US"/>
               <a:t>Fourth level</a:t>
             </a:r>
           </a:p>
           <a:p>
             <a:pPr lvl="4"/>
             <a:r>
-              <a:rPr lang="en-US" smtClean="0"/>
+              <a:rPr lang="en-US"/>
               <a:t>Fifth level</a:t>
             </a:r>
-            <a:endParaRPr lang="en-US"/>
           </a:p>
         </p:txBody>
       </p:sp>
@@ -4653,7 +4624,7 @@
           <a:p>
             <a:fld id="{699DC775-C286-4358-8C92-D7E584E969B3}" type="datetimeFigureOut">
               <a:rPr lang="en-US" smtClean="0"/>
-              <a:t>3/8/2018</a:t>
+              <a:t>7/21/2019</a:t>
             </a:fld>
             <a:endParaRPr lang="en-US"/>
           </a:p>
@@ -4759,10 +4730,9 @@
           </a:lstStyle>
           <a:p>
             <a:r>
-              <a:rPr lang="en-US" smtClean="0"/>
+              <a:rPr lang="en-US"/>
               <a:t>Click to edit Master title style</a:t>
             </a:r>
-            <a:endParaRPr lang="en-US"/>
           </a:p>
         </p:txBody>
       </p:sp>
@@ -4825,7 +4795,7 @@
           <a:p>
             <a:pPr lvl="0"/>
             <a:r>
-              <a:rPr lang="en-US" smtClean="0"/>
+              <a:rPr lang="en-US"/>
               <a:t>Click to edit Master text styles</a:t>
             </a:r>
           </a:p>
@@ -4881,38 +4851,37 @@
           <a:p>
             <a:pPr lvl="0"/>
             <a:r>
-              <a:rPr lang="en-US" smtClean="0"/>
+              <a:rPr lang="en-US"/>
               <a:t>Click to edit Master text styles</a:t>
             </a:r>
           </a:p>
           <a:p>
             <a:pPr lvl="1"/>
             <a:r>
-              <a:rPr lang="en-US" smtClean="0"/>
+              <a:rPr lang="en-US"/>
               <a:t>Second level</a:t>
             </a:r>
           </a:p>
           <a:p>
             <a:pPr lvl="2"/>
             <a:r>
-              <a:rPr lang="en-US" smtClean="0"/>
+              <a:rPr lang="en-US"/>
               <a:t>Third level</a:t>
             </a:r>
           </a:p>
           <a:p>
             <a:pPr lvl="3"/>
             <a:r>
-              <a:rPr lang="en-US" smtClean="0"/>
+              <a:rPr lang="en-US"/>
               <a:t>Fourth level</a:t>
             </a:r>
           </a:p>
           <a:p>
             <a:pPr lvl="4"/>
             <a:r>
-              <a:rPr lang="en-US" smtClean="0"/>
+              <a:rPr lang="en-US"/>
               <a:t>Fifth level</a:t>
             </a:r>
-            <a:endParaRPr lang="en-US"/>
           </a:p>
         </p:txBody>
       </p:sp>
@@ -4975,7 +4944,7 @@
           <a:p>
             <a:pPr lvl="0"/>
             <a:r>
-              <a:rPr lang="en-US" smtClean="0"/>
+              <a:rPr lang="en-US"/>
               <a:t>Click to edit Master text styles</a:t>
             </a:r>
           </a:p>
@@ -5031,38 +5000,37 @@
           <a:p>
             <a:pPr lvl="0"/>
             <a:r>
-              <a:rPr lang="en-US" smtClean="0"/>
+              <a:rPr lang="en-US"/>
               <a:t>Click to edit Master text styles</a:t>
             </a:r>
           </a:p>
           <a:p>
             <a:pPr lvl="1"/>
             <a:r>
-              <a:rPr lang="en-US" smtClean="0"/>
+              <a:rPr lang="en-US"/>
               <a:t>Second level</a:t>
             </a:r>
           </a:p>
           <a:p>
             <a:pPr lvl="2"/>
             <a:r>
-              <a:rPr lang="en-US" smtClean="0"/>
+              <a:rPr lang="en-US"/>
               <a:t>Third level</a:t>
             </a:r>
           </a:p>
           <a:p>
             <a:pPr lvl="3"/>
             <a:r>
-              <a:rPr lang="en-US" smtClean="0"/>
+              <a:rPr lang="en-US"/>
               <a:t>Fourth level</a:t>
             </a:r>
           </a:p>
           <a:p>
             <a:pPr lvl="4"/>
             <a:r>
-              <a:rPr lang="en-US" smtClean="0"/>
+              <a:rPr lang="en-US"/>
               <a:t>Fifth level</a:t>
             </a:r>
-            <a:endParaRPr lang="en-US"/>
           </a:p>
         </p:txBody>
       </p:sp>
@@ -5083,7 +5051,7 @@
           <a:p>
             <a:fld id="{699DC775-C286-4358-8C92-D7E584E969B3}" type="datetimeFigureOut">
               <a:rPr lang="en-US" smtClean="0"/>
-              <a:t>3/8/2018</a:t>
+              <a:t>7/21/2019</a:t>
             </a:fld>
             <a:endParaRPr lang="en-US"/>
           </a:p>
@@ -5185,10 +5153,9 @@
           <a:lstStyle/>
           <a:p>
             <a:r>
-              <a:rPr lang="en-US" smtClean="0"/>
+              <a:rPr lang="en-US"/>
               <a:t>Click to edit Master title style</a:t>
             </a:r>
-            <a:endParaRPr lang="en-US"/>
           </a:p>
         </p:txBody>
       </p:sp>
@@ -5209,7 +5176,7 @@
           <a:p>
             <a:fld id="{699DC775-C286-4358-8C92-D7E584E969B3}" type="datetimeFigureOut">
               <a:rPr lang="en-US" smtClean="0"/>
-              <a:t>3/8/2018</a:t>
+              <a:t>7/21/2019</a:t>
             </a:fld>
             <a:endParaRPr lang="en-US"/>
           </a:p>
@@ -5312,7 +5279,7 @@
           <a:p>
             <a:fld id="{699DC775-C286-4358-8C92-D7E584E969B3}" type="datetimeFigureOut">
               <a:rPr lang="en-US" smtClean="0"/>
-              <a:t>3/8/2018</a:t>
+              <a:t>7/21/2019</a:t>
             </a:fld>
             <a:endParaRPr lang="en-US"/>
           </a:p>
@@ -5415,10 +5382,9 @@
           </a:lstStyle>
           <a:p>
             <a:r>
-              <a:rPr lang="en-US" smtClean="0"/>
+              <a:rPr lang="en-US"/>
               <a:t>Click to edit Master title style</a:t>
             </a:r>
-            <a:endParaRPr lang="en-US"/>
           </a:p>
         </p:txBody>
       </p:sp>
@@ -5535,7 +5501,7 @@
           <a:p>
             <a:pPr lvl="0"/>
             <a:r>
-              <a:rPr lang="en-US" smtClean="0"/>
+              <a:rPr lang="en-US"/>
               <a:t>Click to edit Master text styles</a:t>
             </a:r>
           </a:p>
@@ -5558,7 +5524,7 @@
           <a:p>
             <a:fld id="{699DC775-C286-4358-8C92-D7E584E969B3}" type="datetimeFigureOut">
               <a:rPr lang="en-US" smtClean="0"/>
-              <a:t>3/8/2018</a:t>
+              <a:t>7/21/2019</a:t>
             </a:fld>
             <a:endParaRPr lang="en-US"/>
           </a:p>
@@ -5669,10 +5635,9 @@
           </a:lstStyle>
           <a:p>
             <a:r>
-              <a:rPr lang="en-US" smtClean="0"/>
+              <a:rPr lang="en-US"/>
               <a:t>Click to edit Master title style</a:t>
             </a:r>
-            <a:endParaRPr lang="en-US"/>
           </a:p>
         </p:txBody>
       </p:sp>
@@ -5726,38 +5691,37 @@
           <a:p>
             <a:pPr lvl="0"/>
             <a:r>
-              <a:rPr lang="en-US" smtClean="0"/>
+              <a:rPr lang="en-US"/>
               <a:t>Click to edit Master text styles</a:t>
             </a:r>
           </a:p>
           <a:p>
             <a:pPr lvl="1"/>
             <a:r>
-              <a:rPr lang="en-US" smtClean="0"/>
+              <a:rPr lang="en-US"/>
               <a:t>Second level</a:t>
             </a:r>
           </a:p>
           <a:p>
             <a:pPr lvl="2"/>
             <a:r>
-              <a:rPr lang="en-US" smtClean="0"/>
+              <a:rPr lang="en-US"/>
               <a:t>Third level</a:t>
             </a:r>
           </a:p>
           <a:p>
             <a:pPr lvl="3"/>
             <a:r>
-              <a:rPr lang="en-US" smtClean="0"/>
+              <a:rPr lang="en-US"/>
               <a:t>Fourth level</a:t>
             </a:r>
           </a:p>
           <a:p>
             <a:pPr lvl="4"/>
             <a:r>
-              <a:rPr lang="en-US" smtClean="0"/>
+              <a:rPr lang="en-US"/>
               <a:t>Fifth level</a:t>
             </a:r>
-            <a:endParaRPr lang="en-US"/>
           </a:p>
         </p:txBody>
       </p:sp>
@@ -5820,7 +5784,7 @@
           <a:p>
             <a:pPr lvl="0"/>
             <a:r>
-              <a:rPr lang="en-US" smtClean="0"/>
+              <a:rPr lang="en-US"/>
               <a:t>Click to edit Master text styles</a:t>
             </a:r>
           </a:p>
@@ -5843,7 +5807,7 @@
           <a:p>
             <a:fld id="{699DC775-C286-4358-8C92-D7E584E969B3}" type="datetimeFigureOut">
               <a:rPr lang="en-US" smtClean="0"/>
-              <a:t>3/8/2018</a:t>
+              <a:t>7/21/2019</a:t>
             </a:fld>
             <a:endParaRPr lang="en-US"/>
           </a:p>
@@ -5954,10 +5918,9 @@
           </a:lstStyle>
           <a:p>
             <a:r>
-              <a:rPr lang="en-US" smtClean="0"/>
+              <a:rPr lang="en-US"/>
               <a:t>Click to edit Master title style</a:t>
             </a:r>
-            <a:endParaRPr lang="en-US"/>
           </a:p>
         </p:txBody>
       </p:sp>
@@ -6081,7 +6044,7 @@
           <a:p>
             <a:pPr lvl="0"/>
             <a:r>
-              <a:rPr lang="en-US" smtClean="0"/>
+              <a:rPr lang="en-US"/>
               <a:t>Click to edit Master text styles</a:t>
             </a:r>
           </a:p>
@@ -6104,7 +6067,7 @@
           <a:p>
             <a:fld id="{699DC775-C286-4358-8C92-D7E584E969B3}" type="datetimeFigureOut">
               <a:rPr lang="en-US" smtClean="0"/>
-              <a:t>3/8/2018</a:t>
+              <a:t>7/21/2019</a:t>
             </a:fld>
             <a:endParaRPr lang="en-US"/>
           </a:p>
@@ -6206,10 +6169,9 @@
           <a:lstStyle/>
           <a:p>
             <a:r>
-              <a:rPr lang="en-US" smtClean="0"/>
+              <a:rPr lang="en-US"/>
               <a:t>Click to edit Master title style</a:t>
             </a:r>
-            <a:endParaRPr lang="en-US"/>
           </a:p>
         </p:txBody>
       </p:sp>
@@ -6230,38 +6192,37 @@
           <a:p>
             <a:pPr lvl="0"/>
             <a:r>
-              <a:rPr lang="en-US" smtClean="0"/>
+              <a:rPr lang="en-US"/>
               <a:t>Click to edit Master text styles</a:t>
             </a:r>
           </a:p>
           <a:p>
             <a:pPr lvl="1"/>
             <a:r>
-              <a:rPr lang="en-US" smtClean="0"/>
+              <a:rPr lang="en-US"/>
               <a:t>Second level</a:t>
             </a:r>
           </a:p>
           <a:p>
             <a:pPr lvl="2"/>
             <a:r>
-              <a:rPr lang="en-US" smtClean="0"/>
+              <a:rPr lang="en-US"/>
               <a:t>Third level</a:t>
             </a:r>
           </a:p>
           <a:p>
             <a:pPr lvl="3"/>
             <a:r>
-              <a:rPr lang="en-US" smtClean="0"/>
+              <a:rPr lang="en-US"/>
               <a:t>Fourth level</a:t>
             </a:r>
           </a:p>
           <a:p>
             <a:pPr lvl="4"/>
             <a:r>
-              <a:rPr lang="en-US" smtClean="0"/>
+              <a:rPr lang="en-US"/>
               <a:t>Fifth level</a:t>
             </a:r>
-            <a:endParaRPr lang="en-US"/>
           </a:p>
         </p:txBody>
       </p:sp>
@@ -6282,7 +6243,7 @@
           <a:p>
             <a:fld id="{699DC775-C286-4358-8C92-D7E584E969B3}" type="datetimeFigureOut">
               <a:rPr lang="en-US" smtClean="0"/>
-              <a:t>3/8/2018</a:t>
+              <a:t>7/21/2019</a:t>
             </a:fld>
             <a:endParaRPr lang="en-US"/>
           </a:p>
@@ -6389,10 +6350,9 @@
           <a:lstStyle/>
           <a:p>
             <a:r>
-              <a:rPr lang="en-US" smtClean="0"/>
+              <a:rPr lang="en-US"/>
               <a:t>Click to edit Master title style</a:t>
             </a:r>
-            <a:endParaRPr lang="en-US"/>
           </a:p>
         </p:txBody>
       </p:sp>
@@ -6418,38 +6378,37 @@
           <a:p>
             <a:pPr lvl="0"/>
             <a:r>
-              <a:rPr lang="en-US" smtClean="0"/>
+              <a:rPr lang="en-US"/>
               <a:t>Click to edit Master text styles</a:t>
             </a:r>
           </a:p>
           <a:p>
             <a:pPr lvl="1"/>
             <a:r>
-              <a:rPr lang="en-US" smtClean="0"/>
+              <a:rPr lang="en-US"/>
               <a:t>Second level</a:t>
             </a:r>
           </a:p>
           <a:p>
             <a:pPr lvl="2"/>
             <a:r>
-              <a:rPr lang="en-US" smtClean="0"/>
+              <a:rPr lang="en-US"/>
               <a:t>Third level</a:t>
             </a:r>
           </a:p>
           <a:p>
             <a:pPr lvl="3"/>
             <a:r>
-              <a:rPr lang="en-US" smtClean="0"/>
+              <a:rPr lang="en-US"/>
               <a:t>Fourth level</a:t>
             </a:r>
           </a:p>
           <a:p>
             <a:pPr lvl="4"/>
             <a:r>
-              <a:rPr lang="en-US" smtClean="0"/>
+              <a:rPr lang="en-US"/>
               <a:t>Fifth level</a:t>
             </a:r>
-            <a:endParaRPr lang="en-US"/>
           </a:p>
         </p:txBody>
       </p:sp>
@@ -6470,7 +6429,7 @@
           <a:p>
             <a:fld id="{699DC775-C286-4358-8C92-D7E584E969B3}" type="datetimeFigureOut">
               <a:rPr lang="en-US" smtClean="0"/>
-              <a:t>3/8/2018</a:t>
+              <a:t>7/21/2019</a:t>
             </a:fld>
             <a:endParaRPr lang="en-US"/>
           </a:p>
@@ -6564,10 +6523,9 @@
           <a:lstStyle/>
           <a:p>
             <a:r>
-              <a:rPr lang="en-US" smtClean="0"/>
+              <a:rPr lang="en-US"/>
               <a:t>Click to edit Master title style</a:t>
             </a:r>
-            <a:endParaRPr lang="en-US"/>
           </a:p>
         </p:txBody>
       </p:sp>
@@ -6621,38 +6579,37 @@
           <a:p>
             <a:pPr lvl="0"/>
             <a:r>
-              <a:rPr lang="en-US" smtClean="0"/>
+              <a:rPr lang="en-US"/>
               <a:t>Click to edit Master text styles</a:t>
             </a:r>
           </a:p>
           <a:p>
             <a:pPr lvl="1"/>
             <a:r>
-              <a:rPr lang="en-US" smtClean="0"/>
+              <a:rPr lang="en-US"/>
               <a:t>Second level</a:t>
             </a:r>
           </a:p>
           <a:p>
             <a:pPr lvl="2"/>
             <a:r>
-              <a:rPr lang="en-US" smtClean="0"/>
+              <a:rPr lang="en-US"/>
               <a:t>Third level</a:t>
             </a:r>
           </a:p>
           <a:p>
             <a:pPr lvl="3"/>
             <a:r>
-              <a:rPr lang="en-US" smtClean="0"/>
+              <a:rPr lang="en-US"/>
               <a:t>Fourth level</a:t>
             </a:r>
           </a:p>
           <a:p>
             <a:pPr lvl="4"/>
             <a:r>
-              <a:rPr lang="en-US" smtClean="0"/>
+              <a:rPr lang="en-US"/>
               <a:t>Fifth level</a:t>
             </a:r>
-            <a:endParaRPr lang="en-US"/>
           </a:p>
         </p:txBody>
       </p:sp>
@@ -6706,38 +6663,37 @@
           <a:p>
             <a:pPr lvl="0"/>
             <a:r>
-              <a:rPr lang="en-US" smtClean="0"/>
+              <a:rPr lang="en-US"/>
               <a:t>Click to edit Master text styles</a:t>
             </a:r>
           </a:p>
           <a:p>
             <a:pPr lvl="1"/>
             <a:r>
-              <a:rPr lang="en-US" smtClean="0"/>
+              <a:rPr lang="en-US"/>
               <a:t>Second level</a:t>
             </a:r>
           </a:p>
           <a:p>
             <a:pPr lvl="2"/>
             <a:r>
-              <a:rPr lang="en-US" smtClean="0"/>
+              <a:rPr lang="en-US"/>
               <a:t>Third level</a:t>
             </a:r>
           </a:p>
           <a:p>
             <a:pPr lvl="3"/>
             <a:r>
-              <a:rPr lang="en-US" smtClean="0"/>
+              <a:rPr lang="en-US"/>
               <a:t>Fourth level</a:t>
             </a:r>
           </a:p>
           <a:p>
             <a:pPr lvl="4"/>
             <a:r>
-              <a:rPr lang="en-US" smtClean="0"/>
+              <a:rPr lang="en-US"/>
               <a:t>Fifth level</a:t>
             </a:r>
-            <a:endParaRPr lang="en-US"/>
           </a:p>
         </p:txBody>
       </p:sp>
@@ -6758,7 +6714,7 @@
           <a:p>
             <a:fld id="{699DC775-C286-4358-8C92-D7E584E969B3}" type="datetimeFigureOut">
               <a:rPr lang="en-US" smtClean="0"/>
-              <a:t>3/8/2018</a:t>
+              <a:t>7/21/2019</a:t>
             </a:fld>
             <a:endParaRPr lang="en-US"/>
           </a:p>
@@ -6856,10 +6812,9 @@
           </a:lstStyle>
           <a:p>
             <a:r>
-              <a:rPr lang="en-US" smtClean="0"/>
+              <a:rPr lang="en-US"/>
               <a:t>Click to edit Master title style</a:t>
             </a:r>
-            <a:endParaRPr lang="en-US"/>
           </a:p>
         </p:txBody>
       </p:sp>
@@ -6922,7 +6877,7 @@
           <a:p>
             <a:pPr lvl="0"/>
             <a:r>
-              <a:rPr lang="en-US" smtClean="0"/>
+              <a:rPr lang="en-US"/>
               <a:t>Click to edit Master text styles</a:t>
             </a:r>
           </a:p>
@@ -6978,38 +6933,37 @@
           <a:p>
             <a:pPr lvl="0"/>
             <a:r>
-              <a:rPr lang="en-US" smtClean="0"/>
+              <a:rPr lang="en-US"/>
               <a:t>Click to edit Master text styles</a:t>
             </a:r>
           </a:p>
           <a:p>
             <a:pPr lvl="1"/>
             <a:r>
-              <a:rPr lang="en-US" smtClean="0"/>
+              <a:rPr lang="en-US"/>
               <a:t>Second level</a:t>
             </a:r>
           </a:p>
           <a:p>
             <a:pPr lvl="2"/>
             <a:r>
-              <a:rPr lang="en-US" smtClean="0"/>
+              <a:rPr lang="en-US"/>
               <a:t>Third level</a:t>
             </a:r>
           </a:p>
           <a:p>
             <a:pPr lvl="3"/>
             <a:r>
-              <a:rPr lang="en-US" smtClean="0"/>
+              <a:rPr lang="en-US"/>
               <a:t>Fourth level</a:t>
             </a:r>
           </a:p>
           <a:p>
             <a:pPr lvl="4"/>
             <a:r>
-              <a:rPr lang="en-US" smtClean="0"/>
+              <a:rPr lang="en-US"/>
               <a:t>Fifth level</a:t>
             </a:r>
-            <a:endParaRPr lang="en-US"/>
           </a:p>
         </p:txBody>
       </p:sp>
@@ -7072,7 +7026,7 @@
           <a:p>
             <a:pPr lvl="0"/>
             <a:r>
-              <a:rPr lang="en-US" smtClean="0"/>
+              <a:rPr lang="en-US"/>
               <a:t>Click to edit Master text styles</a:t>
             </a:r>
           </a:p>
@@ -7128,38 +7082,37 @@
           <a:p>
             <a:pPr lvl="0"/>
             <a:r>
-              <a:rPr lang="en-US" smtClean="0"/>
+              <a:rPr lang="en-US"/>
               <a:t>Click to edit Master text styles</a:t>
             </a:r>
           </a:p>
           <a:p>
             <a:pPr lvl="1"/>
             <a:r>
-              <a:rPr lang="en-US" smtClean="0"/>
+              <a:rPr lang="en-US"/>
               <a:t>Second level</a:t>
             </a:r>
           </a:p>
           <a:p>
             <a:pPr lvl="2"/>
             <a:r>
-              <a:rPr lang="en-US" smtClean="0"/>
+              <a:rPr lang="en-US"/>
               <a:t>Third level</a:t>
             </a:r>
           </a:p>
           <a:p>
             <a:pPr lvl="3"/>
             <a:r>
-              <a:rPr lang="en-US" smtClean="0"/>
+              <a:rPr lang="en-US"/>
               <a:t>Fourth level</a:t>
             </a:r>
           </a:p>
           <a:p>
             <a:pPr lvl="4"/>
             <a:r>
-              <a:rPr lang="en-US" smtClean="0"/>
+              <a:rPr lang="en-US"/>
               <a:t>Fifth level</a:t>
             </a:r>
-            <a:endParaRPr lang="en-US"/>
           </a:p>
         </p:txBody>
       </p:sp>
@@ -7180,7 +7133,7 @@
           <a:p>
             <a:fld id="{699DC775-C286-4358-8C92-D7E584E969B3}" type="datetimeFigureOut">
               <a:rPr lang="en-US" smtClean="0"/>
-              <a:t>3/8/2018</a:t>
+              <a:t>7/21/2019</a:t>
             </a:fld>
             <a:endParaRPr lang="en-US"/>
           </a:p>
@@ -7274,10 +7227,9 @@
           <a:lstStyle/>
           <a:p>
             <a:r>
-              <a:rPr lang="en-US" smtClean="0"/>
+              <a:rPr lang="en-US"/>
               <a:t>Click to edit Master title style</a:t>
             </a:r>
-            <a:endParaRPr lang="en-US"/>
           </a:p>
         </p:txBody>
       </p:sp>
@@ -7298,7 +7250,7 @@
           <a:p>
             <a:fld id="{699DC775-C286-4358-8C92-D7E584E969B3}" type="datetimeFigureOut">
               <a:rPr lang="en-US" smtClean="0"/>
-              <a:t>3/8/2018</a:t>
+              <a:t>7/21/2019</a:t>
             </a:fld>
             <a:endParaRPr lang="en-US"/>
           </a:p>
@@ -7393,7 +7345,7 @@
           <a:p>
             <a:fld id="{699DC775-C286-4358-8C92-D7E584E969B3}" type="datetimeFigureOut">
               <a:rPr lang="en-US" smtClean="0"/>
-              <a:t>3/8/2018</a:t>
+              <a:t>7/21/2019</a:t>
             </a:fld>
             <a:endParaRPr lang="en-US"/>
           </a:p>
@@ -7496,10 +7448,9 @@
           </a:lstStyle>
           <a:p>
             <a:r>
-              <a:rPr lang="en-US" smtClean="0"/>
+              <a:rPr lang="en-US"/>
               <a:t>Click to edit Master title style</a:t>
             </a:r>
-            <a:endParaRPr lang="en-US"/>
           </a:p>
         </p:txBody>
       </p:sp>
@@ -7553,38 +7504,37 @@
           <a:p>
             <a:pPr lvl="0"/>
             <a:r>
-              <a:rPr lang="en-US" smtClean="0"/>
+              <a:rPr lang="en-US"/>
               <a:t>Click to edit Master text styles</a:t>
             </a:r>
           </a:p>
           <a:p>
             <a:pPr lvl="1"/>
             <a:r>
-              <a:rPr lang="en-US" smtClean="0"/>
+              <a:rPr lang="en-US"/>
               <a:t>Second level</a:t>
             </a:r>
           </a:p>
           <a:p>
             <a:pPr lvl="2"/>
             <a:r>
-              <a:rPr lang="en-US" smtClean="0"/>
+              <a:rPr lang="en-US"/>
               <a:t>Third level</a:t>
             </a:r>
           </a:p>
           <a:p>
             <a:pPr lvl="3"/>
             <a:r>
-              <a:rPr lang="en-US" smtClean="0"/>
+              <a:rPr lang="en-US"/>
               <a:t>Fourth level</a:t>
             </a:r>
           </a:p>
           <a:p>
             <a:pPr lvl="4"/>
             <a:r>
-              <a:rPr lang="en-US" smtClean="0"/>
+              <a:rPr lang="en-US"/>
               <a:t>Fifth level</a:t>
             </a:r>
-            <a:endParaRPr lang="en-US"/>
           </a:p>
         </p:txBody>
       </p:sp>
@@ -7647,7 +7597,7 @@
           <a:p>
             <a:pPr lvl="0"/>
             <a:r>
-              <a:rPr lang="en-US" smtClean="0"/>
+              <a:rPr lang="en-US"/>
               <a:t>Click to edit Master text styles</a:t>
             </a:r>
           </a:p>
@@ -7670,7 +7620,7 @@
           <a:p>
             <a:fld id="{699DC775-C286-4358-8C92-D7E584E969B3}" type="datetimeFigureOut">
               <a:rPr lang="en-US" smtClean="0"/>
-              <a:t>3/8/2018</a:t>
+              <a:t>7/21/2019</a:t>
             </a:fld>
             <a:endParaRPr lang="en-US"/>
           </a:p>
@@ -7773,10 +7723,9 @@
           </a:lstStyle>
           <a:p>
             <a:r>
-              <a:rPr lang="en-US" smtClean="0"/>
+              <a:rPr lang="en-US"/>
               <a:t>Click to edit Master title style</a:t>
             </a:r>
-            <a:endParaRPr lang="en-US"/>
           </a:p>
         </p:txBody>
       </p:sp>
@@ -7900,7 +7849,7 @@
           <a:p>
             <a:pPr lvl="0"/>
             <a:r>
-              <a:rPr lang="en-US" smtClean="0"/>
+              <a:rPr lang="en-US"/>
               <a:t>Click to edit Master text styles</a:t>
             </a:r>
           </a:p>
@@ -7923,7 +7872,7 @@
           <a:p>
             <a:fld id="{699DC775-C286-4358-8C92-D7E584E969B3}" type="datetimeFigureOut">
               <a:rPr lang="en-US" smtClean="0"/>
-              <a:t>3/8/2018</a:t>
+              <a:t>7/21/2019</a:t>
             </a:fld>
             <a:endParaRPr lang="en-US"/>
           </a:p>
@@ -8032,10 +7981,9 @@
           <a:lstStyle/>
           <a:p>
             <a:r>
-              <a:rPr lang="en-US" smtClean="0"/>
+              <a:rPr lang="en-US"/>
               <a:t>Click to edit Master title style</a:t>
             </a:r>
-            <a:endParaRPr lang="en-US"/>
           </a:p>
         </p:txBody>
       </p:sp>
@@ -8066,38 +8014,37 @@
           <a:p>
             <a:pPr lvl="0"/>
             <a:r>
-              <a:rPr lang="en-US" smtClean="0"/>
+              <a:rPr lang="en-US"/>
               <a:t>Click to edit Master text styles</a:t>
             </a:r>
           </a:p>
           <a:p>
             <a:pPr lvl="1"/>
             <a:r>
-              <a:rPr lang="en-US" smtClean="0"/>
+              <a:rPr lang="en-US"/>
               <a:t>Second level</a:t>
             </a:r>
           </a:p>
           <a:p>
             <a:pPr lvl="2"/>
             <a:r>
-              <a:rPr lang="en-US" smtClean="0"/>
+              <a:rPr lang="en-US"/>
               <a:t>Third level</a:t>
             </a:r>
           </a:p>
           <a:p>
             <a:pPr lvl="3"/>
             <a:r>
-              <a:rPr lang="en-US" smtClean="0"/>
+              <a:rPr lang="en-US"/>
               <a:t>Fourth level</a:t>
             </a:r>
           </a:p>
           <a:p>
             <a:pPr lvl="4"/>
             <a:r>
-              <a:rPr lang="en-US" smtClean="0"/>
+              <a:rPr lang="en-US"/>
               <a:t>Fifth level</a:t>
             </a:r>
-            <a:endParaRPr lang="en-US"/>
           </a:p>
         </p:txBody>
       </p:sp>
@@ -8136,7 +8083,7 @@
           <a:p>
             <a:fld id="{699DC775-C286-4358-8C92-D7E584E969B3}" type="datetimeFigureOut">
               <a:rPr lang="en-US" smtClean="0"/>
-              <a:t>3/8/2018</a:t>
+              <a:t>7/21/2019</a:t>
             </a:fld>
             <a:endParaRPr lang="en-US"/>
           </a:p>
@@ -8547,10 +8494,9 @@
           <a:lstStyle/>
           <a:p>
             <a:r>
-              <a:rPr lang="en-US" smtClean="0"/>
+              <a:rPr lang="en-US"/>
               <a:t>Click to edit Master title style</a:t>
             </a:r>
-            <a:endParaRPr lang="en-US"/>
           </a:p>
         </p:txBody>
       </p:sp>
@@ -8581,38 +8527,37 @@
           <a:p>
             <a:pPr lvl="0"/>
             <a:r>
-              <a:rPr lang="en-US" smtClean="0"/>
+              <a:rPr lang="en-US"/>
               <a:t>Click to edit Master text styles</a:t>
             </a:r>
           </a:p>
           <a:p>
             <a:pPr lvl="1"/>
             <a:r>
-              <a:rPr lang="en-US" smtClean="0"/>
+              <a:rPr lang="en-US"/>
               <a:t>Second level</a:t>
             </a:r>
           </a:p>
           <a:p>
             <a:pPr lvl="2"/>
             <a:r>
-              <a:rPr lang="en-US" smtClean="0"/>
+              <a:rPr lang="en-US"/>
               <a:t>Third level</a:t>
             </a:r>
           </a:p>
           <a:p>
             <a:pPr lvl="3"/>
             <a:r>
-              <a:rPr lang="en-US" smtClean="0"/>
+              <a:rPr lang="en-US"/>
               <a:t>Fourth level</a:t>
             </a:r>
           </a:p>
           <a:p>
             <a:pPr lvl="4"/>
             <a:r>
-              <a:rPr lang="en-US" smtClean="0"/>
+              <a:rPr lang="en-US"/>
               <a:t>Fifth level</a:t>
             </a:r>
-            <a:endParaRPr lang="en-US"/>
           </a:p>
         </p:txBody>
       </p:sp>
@@ -8651,7 +8596,7 @@
           <a:p>
             <a:fld id="{699DC775-C286-4358-8C92-D7E584E969B3}" type="datetimeFigureOut">
               <a:rPr lang="en-US" smtClean="0"/>
-              <a:t>3/8/2018</a:t>
+              <a:t>7/21/2019</a:t>
             </a:fld>
             <a:endParaRPr lang="en-US"/>
           </a:p>
@@ -9060,10 +9005,9 @@
           <a:lstStyle/>
           <a:p>
             <a:r>
-              <a:rPr lang="en-US" dirty="0" smtClean="0"/>
+              <a:rPr lang="en-US" dirty="0"/>
               <a:t>Click to edit Master title style</a:t>
             </a:r>
-            <a:endParaRPr lang="en-US" dirty="0"/>
           </a:p>
         </p:txBody>
       </p:sp>
@@ -9094,38 +9038,37 @@
           <a:p>
             <a:pPr lvl="0"/>
             <a:r>
-              <a:rPr lang="en-US" smtClean="0"/>
+              <a:rPr lang="en-US"/>
               <a:t>Click to edit Master text styles</a:t>
             </a:r>
           </a:p>
           <a:p>
             <a:pPr lvl="1"/>
             <a:r>
-              <a:rPr lang="en-US" smtClean="0"/>
+              <a:rPr lang="en-US"/>
               <a:t>Second level</a:t>
             </a:r>
           </a:p>
           <a:p>
             <a:pPr lvl="2"/>
             <a:r>
-              <a:rPr lang="en-US" smtClean="0"/>
+              <a:rPr lang="en-US"/>
               <a:t>Third level</a:t>
             </a:r>
           </a:p>
           <a:p>
             <a:pPr lvl="3"/>
             <a:r>
-              <a:rPr lang="en-US" smtClean="0"/>
+              <a:rPr lang="en-US"/>
               <a:t>Fourth level</a:t>
             </a:r>
           </a:p>
           <a:p>
             <a:pPr lvl="4"/>
             <a:r>
-              <a:rPr lang="en-US" smtClean="0"/>
+              <a:rPr lang="en-US"/>
               <a:t>Fifth level</a:t>
             </a:r>
-            <a:endParaRPr lang="en-US"/>
           </a:p>
         </p:txBody>
       </p:sp>
@@ -9164,7 +9107,7 @@
           <a:p>
             <a:fld id="{699DC775-C286-4358-8C92-D7E584E969B3}" type="datetimeFigureOut">
               <a:rPr lang="en-US" smtClean="0"/>
-              <a:t>3/8/2018</a:t>
+              <a:t>7/21/2019</a:t>
             </a:fld>
             <a:endParaRPr lang="en-US"/>
           </a:p>
@@ -9557,7 +9500,7 @@
           <a:lstStyle/>
           <a:p>
             <a:r>
-              <a:rPr lang="en-US" sz="5400" b="1" dirty="0" err="1" smtClean="0">
+              <a:rPr lang="en-US" sz="5400" b="1" dirty="0" err="1">
                 <a:solidFill>
                   <a:schemeClr val="accent6">
                     <a:lumMod val="75000"/>
@@ -9567,7 +9510,7 @@
               <a:t>PowerPointLabs</a:t>
             </a:r>
             <a:r>
-              <a:rPr lang="en-US" sz="5400" b="1" dirty="0" smtClean="0">
+              <a:rPr lang="en-US" sz="5400" b="1" dirty="0">
                 <a:solidFill>
                   <a:schemeClr val="accent6">
                     <a:lumMod val="75000"/>
@@ -9605,7 +9548,7 @@
               <a:buNone/>
             </a:pPr>
             <a:r>
-              <a:rPr lang="en-US" b="1" dirty="0" smtClean="0">
+              <a:rPr lang="en-US" b="1" dirty="0">
                 <a:solidFill>
                   <a:srgbClr val="0070C0"/>
                 </a:solidFill>
@@ -9616,34 +9559,21 @@
           <a:p>
             <a:pPr marL="285750" indent="-285750"/>
             <a:r>
-              <a:rPr lang="en-US" b="1" dirty="0" smtClean="0">
-                <a:solidFill>
-                  <a:srgbClr val="0070C0"/>
-                </a:solidFill>
-              </a:rPr>
-              <a:t>DO </a:t>
-            </a:r>
-            <a:r>
               <a:rPr lang="en-US" b="1" dirty="0">
                 <a:solidFill>
                   <a:srgbClr val="0070C0"/>
                 </a:solidFill>
               </a:rPr>
-              <a:t>NOT SAVE </a:t>
-            </a:r>
-            <a:r>
-              <a:rPr lang="en-US" dirty="0" smtClean="0">
+              <a:t>DO NOT SAVE </a:t>
+            </a:r>
+            <a:r>
+              <a:rPr lang="en-US" dirty="0">
                 <a:solidFill>
                   <a:srgbClr val="0070C0"/>
                 </a:solidFill>
               </a:rPr>
               <a:t>these slides after testing. Keep this file in its original form.</a:t>
             </a:r>
-            <a:endParaRPr lang="en-US" dirty="0">
-              <a:solidFill>
-                <a:srgbClr val="0070C0"/>
-              </a:solidFill>
-            </a:endParaRPr>
           </a:p>
           <a:p>
             <a:pPr marL="285750" indent="-285750"/>
@@ -9653,47 +9583,7 @@
                   <a:srgbClr val="0070C0"/>
                 </a:solidFill>
               </a:rPr>
-              <a:t>If </a:t>
-            </a:r>
-            <a:r>
-              <a:rPr lang="en-US" dirty="0" smtClean="0">
-                <a:solidFill>
-                  <a:srgbClr val="0070C0"/>
-                </a:solidFill>
-              </a:rPr>
-              <a:t>your </a:t>
-            </a:r>
-            <a:r>
-              <a:rPr lang="en-US" dirty="0">
-                <a:solidFill>
-                  <a:srgbClr val="0070C0"/>
-                </a:solidFill>
-              </a:rPr>
-              <a:t>result </a:t>
-            </a:r>
-            <a:r>
-              <a:rPr lang="en-US" dirty="0" smtClean="0">
-                <a:solidFill>
-                  <a:srgbClr val="0070C0"/>
-                </a:solidFill>
-              </a:rPr>
-              <a:t>is different from the </a:t>
-            </a:r>
-            <a:r>
-              <a:rPr lang="en-US" dirty="0">
-                <a:solidFill>
-                  <a:srgbClr val="0070C0"/>
-                </a:solidFill>
-              </a:rPr>
-              <a:t>expected output, </a:t>
-            </a:r>
-            <a:r>
-              <a:rPr lang="en-US" dirty="0" smtClean="0">
-                <a:solidFill>
-                  <a:srgbClr val="0070C0"/>
-                </a:solidFill>
-              </a:rPr>
-              <a:t>please submit a bug report (attach slides/screenshots as necessary).</a:t>
+              <a:t>If your result is different from the expected output, please submit a bug report (attach slides/screenshots as necessary).</a:t>
             </a:r>
             <a:endParaRPr lang="en-SG" dirty="0">
               <a:solidFill>
@@ -9816,7 +9706,7 @@
           <a:lstStyle/>
           <a:p>
             <a:pPr algn="ctr"/>
-            <a:endParaRPr lang="en-US" sz="6000" dirty="0" smtClean="0"/>
+            <a:endParaRPr lang="en-US" sz="6000" dirty="0"/>
           </a:p>
         </p:txBody>
       </p:sp>
@@ -9854,13 +9744,6 @@
   <p:clrMapOvr>
     <a:masterClrMapping/>
   </p:clrMapOvr>
-  <p:timing>
-    <p:tnLst>
-      <p:par>
-        <p:cTn id="1" dur="indefinite" restart="never" nodeType="tmRoot"/>
-      </p:par>
-    </p:tnLst>
-  </p:timing>
 </p:sld>
 </file>
 
@@ -9984,7 +9867,7 @@
           <a:lstStyle/>
           <a:p>
             <a:r>
-              <a:rPr lang="en-US" sz="2800" b="1" dirty="0" smtClean="0">
+              <a:rPr lang="en-US" sz="2800" b="1" dirty="0">
                 <a:solidFill>
                   <a:schemeClr val="accent1"/>
                 </a:solidFill>
@@ -10009,17 +9892,599 @@
   <p:clrMapOvr>
     <a:masterClrMapping/>
   </p:clrMapOvr>
-  <p:timing>
-    <p:tnLst>
-      <p:par>
-        <p:cTn id="1" dur="indefinite" restart="never" nodeType="tmRoot"/>
-      </p:par>
-    </p:tnLst>
-  </p:timing>
 </p:sld>
 </file>
 
 <file path=ppt/slides/slide12.xml><?xml version="1.0" encoding="utf-8"?>
+<p:sld xmlns:a="http://schemas.openxmlformats.org/drawingml/2006/main" xmlns:r="http://schemas.openxmlformats.org/officeDocument/2006/relationships" xmlns:p="http://schemas.openxmlformats.org/presentationml/2006/main">
+  <p:cSld>
+    <p:spTree>
+      <p:nvGrpSpPr>
+        <p:cNvPr id="1" name=""/>
+        <p:cNvGrpSpPr/>
+        <p:nvPr/>
+      </p:nvGrpSpPr>
+      <p:grpSpPr>
+        <a:xfrm>
+          <a:off x="0" y="0"/>
+          <a:ext cx="0" cy="0"/>
+          <a:chOff x="0" y="0"/>
+          <a:chExt cx="0" cy="0"/>
+        </a:xfrm>
+      </p:grpSpPr>
+      <p:sp>
+        <p:nvSpPr>
+          <p:cNvPr id="2" name="Title 1"/>
+          <p:cNvSpPr>
+            <a:spLocks noGrp="1"/>
+          </p:cNvSpPr>
+          <p:nvPr>
+            <p:ph type="title"/>
+          </p:nvPr>
+        </p:nvSpPr>
+        <p:spPr/>
+        <p:txBody>
+          <a:bodyPr/>
+          <a:lstStyle/>
+          <a:p>
+            <a:r>
+              <a:rPr lang="en-US" dirty="0"/>
+              <a:t>Convert to Picture:: shape from grouped shapes</a:t>
+            </a:r>
+            <a:endParaRPr lang="en-SG" dirty="0"/>
+          </a:p>
+        </p:txBody>
+      </p:sp>
+    </p:spTree>
+    <p:extLst>
+      <p:ext uri="{BB962C8B-B14F-4D97-AF65-F5344CB8AC3E}">
+        <p14:creationId xmlns:p14="http://schemas.microsoft.com/office/powerpoint/2010/main" val="3588997613"/>
+      </p:ext>
+    </p:extLst>
+  </p:cSld>
+  <p:clrMapOvr>
+    <a:masterClrMapping/>
+  </p:clrMapOvr>
+</p:sld>
+</file>
+
+<file path=ppt/slides/slide13.xml><?xml version="1.0" encoding="utf-8"?>
+<p:sld xmlns:a="http://schemas.openxmlformats.org/drawingml/2006/main" xmlns:r="http://schemas.openxmlformats.org/officeDocument/2006/relationships" xmlns:p="http://schemas.openxmlformats.org/presentationml/2006/main">
+  <p:cSld>
+    <p:bg>
+      <p:bgPr>
+        <a:solidFill>
+          <a:schemeClr val="bg1"/>
+        </a:solidFill>
+        <a:effectLst/>
+      </p:bgPr>
+    </p:bg>
+    <p:spTree>
+      <p:nvGrpSpPr>
+        <p:cNvPr id="1" name=""/>
+        <p:cNvGrpSpPr/>
+        <p:nvPr/>
+      </p:nvGrpSpPr>
+      <p:grpSpPr>
+        <a:xfrm>
+          <a:off x="0" y="0"/>
+          <a:ext cx="0" cy="0"/>
+          <a:chOff x="0" y="0"/>
+          <a:chExt cx="0" cy="0"/>
+        </a:xfrm>
+      </p:grpSpPr>
+      <p:grpSp>
+        <p:nvGrpSpPr>
+          <p:cNvPr id="2" name="Group 1">
+            <a:extLst>
+              <a:ext uri="{FF2B5EF4-FFF2-40B4-BE49-F238E27FC236}">
+                <a16:creationId xmlns:a16="http://schemas.microsoft.com/office/drawing/2014/main" id="{A30360D9-2BFD-41D0-8389-647CD9345C2E}"/>
+              </a:ext>
+            </a:extLst>
+          </p:cNvPr>
+          <p:cNvGrpSpPr/>
+          <p:nvPr/>
+        </p:nvGrpSpPr>
+        <p:grpSpPr>
+          <a:xfrm>
+            <a:off x="1000858" y="1888984"/>
+            <a:ext cx="5699347" cy="2822098"/>
+            <a:chOff x="1000858" y="1888984"/>
+            <a:chExt cx="5699347" cy="2822098"/>
+          </a:xfrm>
+        </p:grpSpPr>
+        <p:sp>
+          <p:nvSpPr>
+            <p:cNvPr id="7" name="Flowchart: Process 6"/>
+            <p:cNvSpPr/>
+            <p:nvPr/>
+          </p:nvSpPr>
+          <p:spPr>
+            <a:xfrm>
+              <a:off x="1000858" y="2233402"/>
+              <a:ext cx="3010769" cy="1195598"/>
+            </a:xfrm>
+            <a:prstGeom prst="flowChartProcess">
+              <a:avLst/>
+            </a:prstGeom>
+          </p:spPr>
+          <p:style>
+            <a:lnRef idx="2">
+              <a:schemeClr val="accent1">
+                <a:shade val="50000"/>
+              </a:schemeClr>
+            </a:lnRef>
+            <a:fillRef idx="1">
+              <a:schemeClr val="accent1"/>
+            </a:fillRef>
+            <a:effectRef idx="0">
+              <a:schemeClr val="accent1"/>
+            </a:effectRef>
+            <a:fontRef idx="minor">
+              <a:schemeClr val="lt1"/>
+            </a:fontRef>
+          </p:style>
+          <p:txBody>
+            <a:bodyPr rtlCol="0" anchor="ctr"/>
+            <a:lstStyle/>
+            <a:p>
+              <a:pPr algn="ctr"/>
+              <a:endParaRPr lang="en-US" sz="1350"/>
+            </a:p>
+          </p:txBody>
+        </p:sp>
+        <p:sp>
+          <p:nvSpPr>
+            <p:cNvPr id="8" name="pic"/>
+            <p:cNvSpPr/>
+            <p:nvPr/>
+          </p:nvSpPr>
+          <p:spPr>
+            <a:xfrm>
+              <a:off x="3344035" y="3770383"/>
+              <a:ext cx="1341254" cy="940699"/>
+            </a:xfrm>
+            <a:prstGeom prst="rect">
+              <a:avLst/>
+            </a:prstGeom>
+          </p:spPr>
+          <p:style>
+            <a:lnRef idx="2">
+              <a:schemeClr val="accent1">
+                <a:shade val="50000"/>
+              </a:schemeClr>
+            </a:lnRef>
+            <a:fillRef idx="1">
+              <a:schemeClr val="accent1"/>
+            </a:fillRef>
+            <a:effectRef idx="0">
+              <a:schemeClr val="accent1"/>
+            </a:effectRef>
+            <a:fontRef idx="minor">
+              <a:schemeClr val="lt1"/>
+            </a:fontRef>
+          </p:style>
+          <p:txBody>
+            <a:bodyPr rtlCol="0" anchor="ctr"/>
+            <a:lstStyle/>
+            <a:p>
+              <a:pPr algn="ctr"/>
+              <a:endParaRPr lang="en-US" sz="1350"/>
+            </a:p>
+          </p:txBody>
+        </p:sp>
+        <p:sp>
+          <p:nvSpPr>
+            <p:cNvPr id="9" name="Flowchart: Process 8"/>
+            <p:cNvSpPr/>
+            <p:nvPr/>
+          </p:nvSpPr>
+          <p:spPr>
+            <a:xfrm>
+              <a:off x="4636737" y="1888984"/>
+              <a:ext cx="1268426" cy="1062080"/>
+            </a:xfrm>
+            <a:prstGeom prst="flowChartProcess">
+              <a:avLst/>
+            </a:prstGeom>
+          </p:spPr>
+          <p:style>
+            <a:lnRef idx="2">
+              <a:schemeClr val="accent1">
+                <a:shade val="50000"/>
+              </a:schemeClr>
+            </a:lnRef>
+            <a:fillRef idx="1">
+              <a:schemeClr val="accent1"/>
+            </a:fillRef>
+            <a:effectRef idx="0">
+              <a:schemeClr val="accent1"/>
+            </a:effectRef>
+            <a:fontRef idx="minor">
+              <a:schemeClr val="lt1"/>
+            </a:fontRef>
+          </p:style>
+          <p:txBody>
+            <a:bodyPr rtlCol="0" anchor="ctr"/>
+            <a:lstStyle/>
+            <a:p>
+              <a:pPr algn="ctr"/>
+              <a:endParaRPr lang="en-US" sz="1350"/>
+            </a:p>
+          </p:txBody>
+        </p:sp>
+        <p:sp>
+          <p:nvSpPr>
+            <p:cNvPr id="10" name="Flowchart: Process 9"/>
+            <p:cNvSpPr/>
+            <p:nvPr/>
+          </p:nvSpPr>
+          <p:spPr>
+            <a:xfrm>
+              <a:off x="5298260" y="3181687"/>
+              <a:ext cx="1401945" cy="1056011"/>
+            </a:xfrm>
+            <a:prstGeom prst="flowChartProcess">
+              <a:avLst/>
+            </a:prstGeom>
+          </p:spPr>
+          <p:style>
+            <a:lnRef idx="2">
+              <a:schemeClr val="accent1">
+                <a:shade val="50000"/>
+              </a:schemeClr>
+            </a:lnRef>
+            <a:fillRef idx="1">
+              <a:schemeClr val="accent1"/>
+            </a:fillRef>
+            <a:effectRef idx="0">
+              <a:schemeClr val="accent1"/>
+            </a:effectRef>
+            <a:fontRef idx="minor">
+              <a:schemeClr val="lt1"/>
+            </a:fontRef>
+          </p:style>
+          <p:txBody>
+            <a:bodyPr rtlCol="0" anchor="ctr"/>
+            <a:lstStyle/>
+            <a:p>
+              <a:pPr algn="ctr"/>
+              <a:endParaRPr lang="en-US" sz="1350"/>
+            </a:p>
+          </p:txBody>
+        </p:sp>
+      </p:grpSp>
+    </p:spTree>
+    <p:extLst>
+      <p:ext uri="{BB962C8B-B14F-4D97-AF65-F5344CB8AC3E}">
+        <p14:creationId xmlns:p14="http://schemas.microsoft.com/office/powerpoint/2010/main" val="177758240"/>
+      </p:ext>
+    </p:extLst>
+  </p:cSld>
+  <p:clrMapOvr>
+    <a:masterClrMapping/>
+  </p:clrMapOvr>
+</p:sld>
+</file>
+
+<file path=ppt/slides/slide14.xml><?xml version="1.0" encoding="utf-8"?>
+<p:sld xmlns:a="http://schemas.openxmlformats.org/drawingml/2006/main" xmlns:r="http://schemas.openxmlformats.org/officeDocument/2006/relationships" xmlns:p="http://schemas.openxmlformats.org/presentationml/2006/main">
+  <p:cSld>
+    <p:bg>
+      <p:bgPr>
+        <a:solidFill>
+          <a:schemeClr val="bg1"/>
+        </a:solidFill>
+        <a:effectLst/>
+      </p:bgPr>
+    </p:bg>
+    <p:spTree>
+      <p:nvGrpSpPr>
+        <p:cNvPr id="1" name=""/>
+        <p:cNvGrpSpPr/>
+        <p:nvPr/>
+      </p:nvGrpSpPr>
+      <p:grpSpPr>
+        <a:xfrm>
+          <a:off x="0" y="0"/>
+          <a:ext cx="0" cy="0"/>
+          <a:chOff x="0" y="0"/>
+          <a:chExt cx="0" cy="0"/>
+        </a:xfrm>
+      </p:grpSpPr>
+      <p:sp>
+        <p:nvSpPr>
+          <p:cNvPr id="11" name="text 3">
+            <a:extLst>
+              <a:ext uri="{FF2B5EF4-FFF2-40B4-BE49-F238E27FC236}">
+                <a16:creationId xmlns:a16="http://schemas.microsoft.com/office/drawing/2014/main" id="{26742310-A731-46F6-91AA-B3348EA4301B}"/>
+              </a:ext>
+            </a:extLst>
+          </p:cNvPr>
+          <p:cNvSpPr txBox="1"/>
+          <p:nvPr/>
+        </p:nvSpPr>
+        <p:spPr>
+          <a:xfrm>
+            <a:off x="2057400" y="6019800"/>
+            <a:ext cx="5328318" cy="523220"/>
+          </a:xfrm>
+          <a:prstGeom prst="rect">
+            <a:avLst/>
+          </a:prstGeom>
+          <a:noFill/>
+        </p:spPr>
+        <p:txBody>
+          <a:bodyPr wrap="none" rtlCol="0">
+            <a:spAutoFit/>
+          </a:bodyPr>
+          <a:lstStyle/>
+          <a:p>
+            <a:r>
+              <a:rPr lang="en-US" sz="2800" b="1" dirty="0">
+                <a:solidFill>
+                  <a:schemeClr val="accent1"/>
+                </a:solidFill>
+              </a:rPr>
+              <a:t>Expected Output (a picture object)</a:t>
+            </a:r>
+            <a:endParaRPr lang="en-SG" sz="2800" b="1" dirty="0">
+              <a:solidFill>
+                <a:schemeClr val="accent1"/>
+              </a:solidFill>
+            </a:endParaRPr>
+          </a:p>
+        </p:txBody>
+      </p:sp>
+      <p:grpSp>
+        <p:nvGrpSpPr>
+          <p:cNvPr id="5" name="Group 4">
+            <a:extLst>
+              <a:ext uri="{FF2B5EF4-FFF2-40B4-BE49-F238E27FC236}">
+                <a16:creationId xmlns:a16="http://schemas.microsoft.com/office/drawing/2014/main" id="{71B9AD9C-CECE-421B-B9AC-4CC3BAF01965}"/>
+              </a:ext>
+            </a:extLst>
+          </p:cNvPr>
+          <p:cNvGrpSpPr/>
+          <p:nvPr/>
+        </p:nvGrpSpPr>
+        <p:grpSpPr>
+          <a:xfrm>
+            <a:off x="1000858" y="1888984"/>
+            <a:ext cx="5699347" cy="2822098"/>
+            <a:chOff x="1000858" y="1888984"/>
+            <a:chExt cx="5699347" cy="2822098"/>
+          </a:xfrm>
+        </p:grpSpPr>
+        <p:sp>
+          <p:nvSpPr>
+            <p:cNvPr id="13" name="Flowchart: Process 12">
+              <a:extLst>
+                <a:ext uri="{FF2B5EF4-FFF2-40B4-BE49-F238E27FC236}">
+                  <a16:creationId xmlns:a16="http://schemas.microsoft.com/office/drawing/2014/main" id="{F8395762-69D4-4D50-A1FB-D0875A9BED30}"/>
+                </a:ext>
+              </a:extLst>
+            </p:cNvPr>
+            <p:cNvSpPr/>
+            <p:nvPr/>
+          </p:nvSpPr>
+          <p:spPr>
+            <a:xfrm>
+              <a:off x="1000858" y="2233402"/>
+              <a:ext cx="3010769" cy="1195598"/>
+            </a:xfrm>
+            <a:prstGeom prst="flowChartProcess">
+              <a:avLst/>
+            </a:prstGeom>
+          </p:spPr>
+          <p:style>
+            <a:lnRef idx="2">
+              <a:schemeClr val="accent1">
+                <a:shade val="50000"/>
+              </a:schemeClr>
+            </a:lnRef>
+            <a:fillRef idx="1">
+              <a:schemeClr val="accent1"/>
+            </a:fillRef>
+            <a:effectRef idx="0">
+              <a:schemeClr val="accent1"/>
+            </a:effectRef>
+            <a:fontRef idx="minor">
+              <a:schemeClr val="lt1"/>
+            </a:fontRef>
+          </p:style>
+          <p:txBody>
+            <a:bodyPr rtlCol="0" anchor="ctr"/>
+            <a:lstStyle/>
+            <a:p>
+              <a:pPr algn="ctr"/>
+              <a:endParaRPr lang="en-US" sz="1350"/>
+            </a:p>
+          </p:txBody>
+        </p:sp>
+        <p:sp>
+          <p:nvSpPr>
+            <p:cNvPr id="14" name="pic">
+              <a:extLst>
+                <a:ext uri="{FF2B5EF4-FFF2-40B4-BE49-F238E27FC236}">
+                  <a16:creationId xmlns:a16="http://schemas.microsoft.com/office/drawing/2014/main" id="{49FA4136-4760-4313-AAA4-EDF1A630441A}"/>
+                </a:ext>
+              </a:extLst>
+            </p:cNvPr>
+            <p:cNvSpPr/>
+            <p:nvPr/>
+          </p:nvSpPr>
+          <p:spPr>
+            <a:xfrm>
+              <a:off x="3344035" y="3770383"/>
+              <a:ext cx="1341254" cy="940699"/>
+            </a:xfrm>
+            <a:prstGeom prst="rect">
+              <a:avLst/>
+            </a:prstGeom>
+          </p:spPr>
+          <p:style>
+            <a:lnRef idx="2">
+              <a:schemeClr val="accent1">
+                <a:shade val="50000"/>
+              </a:schemeClr>
+            </a:lnRef>
+            <a:fillRef idx="1">
+              <a:schemeClr val="accent1"/>
+            </a:fillRef>
+            <a:effectRef idx="0">
+              <a:schemeClr val="accent1"/>
+            </a:effectRef>
+            <a:fontRef idx="minor">
+              <a:schemeClr val="lt1"/>
+            </a:fontRef>
+          </p:style>
+          <p:txBody>
+            <a:bodyPr rtlCol="0" anchor="ctr"/>
+            <a:lstStyle/>
+            <a:p>
+              <a:pPr algn="ctr"/>
+              <a:endParaRPr lang="en-US" sz="1350"/>
+            </a:p>
+          </p:txBody>
+        </p:sp>
+        <p:sp>
+          <p:nvSpPr>
+            <p:cNvPr id="15" name="Flowchart: Process 14">
+              <a:extLst>
+                <a:ext uri="{FF2B5EF4-FFF2-40B4-BE49-F238E27FC236}">
+                  <a16:creationId xmlns:a16="http://schemas.microsoft.com/office/drawing/2014/main" id="{9572CBCF-E487-4007-AEDD-764617AE6B40}"/>
+                </a:ext>
+              </a:extLst>
+            </p:cNvPr>
+            <p:cNvSpPr/>
+            <p:nvPr/>
+          </p:nvSpPr>
+          <p:spPr>
+            <a:xfrm>
+              <a:off x="4636737" y="1888984"/>
+              <a:ext cx="1268426" cy="1062080"/>
+            </a:xfrm>
+            <a:prstGeom prst="flowChartProcess">
+              <a:avLst/>
+            </a:prstGeom>
+          </p:spPr>
+          <p:style>
+            <a:lnRef idx="2">
+              <a:schemeClr val="accent1">
+                <a:shade val="50000"/>
+              </a:schemeClr>
+            </a:lnRef>
+            <a:fillRef idx="1">
+              <a:schemeClr val="accent1"/>
+            </a:fillRef>
+            <a:effectRef idx="0">
+              <a:schemeClr val="accent1"/>
+            </a:effectRef>
+            <a:fontRef idx="minor">
+              <a:schemeClr val="lt1"/>
+            </a:fontRef>
+          </p:style>
+          <p:txBody>
+            <a:bodyPr rtlCol="0" anchor="ctr"/>
+            <a:lstStyle/>
+            <a:p>
+              <a:pPr algn="ctr"/>
+              <a:endParaRPr lang="en-US" sz="1350"/>
+            </a:p>
+          </p:txBody>
+        </p:sp>
+        <p:sp>
+          <p:nvSpPr>
+            <p:cNvPr id="16" name="Flowchart: Process 15">
+              <a:extLst>
+                <a:ext uri="{FF2B5EF4-FFF2-40B4-BE49-F238E27FC236}">
+                  <a16:creationId xmlns:a16="http://schemas.microsoft.com/office/drawing/2014/main" id="{4F727C1F-600C-4C39-949B-723C0B33DB64}"/>
+                </a:ext>
+              </a:extLst>
+            </p:cNvPr>
+            <p:cNvSpPr/>
+            <p:nvPr/>
+          </p:nvSpPr>
+          <p:spPr>
+            <a:xfrm>
+              <a:off x="5298260" y="3181687"/>
+              <a:ext cx="1401945" cy="1056011"/>
+            </a:xfrm>
+            <a:prstGeom prst="flowChartProcess">
+              <a:avLst/>
+            </a:prstGeom>
+          </p:spPr>
+          <p:style>
+            <a:lnRef idx="2">
+              <a:schemeClr val="accent1">
+                <a:shade val="50000"/>
+              </a:schemeClr>
+            </a:lnRef>
+            <a:fillRef idx="1">
+              <a:schemeClr val="accent1"/>
+            </a:fillRef>
+            <a:effectRef idx="0">
+              <a:schemeClr val="accent1"/>
+            </a:effectRef>
+            <a:fontRef idx="minor">
+              <a:schemeClr val="lt1"/>
+            </a:fontRef>
+          </p:style>
+          <p:txBody>
+            <a:bodyPr rtlCol="0" anchor="ctr"/>
+            <a:lstStyle/>
+            <a:p>
+              <a:pPr algn="ctr"/>
+              <a:endParaRPr lang="en-US" sz="1350"/>
+            </a:p>
+          </p:txBody>
+        </p:sp>
+      </p:grpSp>
+      <p:pic>
+        <p:nvPicPr>
+          <p:cNvPr id="6" name="Picture 5">
+            <a:extLst>
+              <a:ext uri="{FF2B5EF4-FFF2-40B4-BE49-F238E27FC236}">
+                <a16:creationId xmlns:a16="http://schemas.microsoft.com/office/drawing/2014/main" id="{26309744-667B-4D5D-B37D-C375A66033C1}"/>
+              </a:ext>
+            </a:extLst>
+          </p:cNvPr>
+          <p:cNvPicPr>
+            <a:picLocks noChangeAspect="1"/>
+          </p:cNvPicPr>
+          <p:nvPr/>
+        </p:nvPicPr>
+        <p:blipFill>
+          <a:blip r:embed="rId2"/>
+          <a:stretch>
+            <a:fillRect/>
+          </a:stretch>
+        </p:blipFill>
+        <p:spPr>
+          <a:xfrm>
+            <a:off x="3484251" y="3911507"/>
+            <a:ext cx="1365622" cy="963251"/>
+          </a:xfrm>
+          <a:prstGeom prst="rect">
+            <a:avLst/>
+          </a:prstGeom>
+        </p:spPr>
+      </p:pic>
+    </p:spTree>
+    <p:extLst>
+      <p:ext uri="{BB962C8B-B14F-4D97-AF65-F5344CB8AC3E}">
+        <p14:creationId xmlns:p14="http://schemas.microsoft.com/office/powerpoint/2010/main" val="900966048"/>
+      </p:ext>
+    </p:extLst>
+  </p:cSld>
+  <p:clrMapOvr>
+    <a:masterClrMapping/>
+  </p:clrMapOvr>
+</p:sld>
+</file>
+
+<file path=ppt/slides/slide15.xml><?xml version="1.0" encoding="utf-8"?>
 <p:sld xmlns:a="http://schemas.openxmlformats.org/drawingml/2006/main" xmlns:r="http://schemas.openxmlformats.org/officeDocument/2006/relationships" xmlns:p="http://schemas.openxmlformats.org/presentationml/2006/main" show="0">
   <p:cSld name="PPAck201403240026082737">
     <p:spTree>
@@ -10094,21 +10559,6 @@
   <p:clrMapOvr>
     <a:masterClrMapping/>
   </p:clrMapOvr>
-  <mc:AlternateContent xmlns:mc="http://schemas.openxmlformats.org/markup-compatibility/2006" xmlns:p14="http://schemas.microsoft.com/office/powerpoint/2010/main">
-    <mc:Choice Requires="p14">
-      <p:transition spd="slow" p14:dur="2000"/>
-    </mc:Choice>
-    <mc:Fallback xmlns="">
-      <p:transition spd="slow"/>
-    </mc:Fallback>
-  </mc:AlternateContent>
-  <p:timing>
-    <p:tnLst>
-      <p:par>
-        <p:cTn id="1" dur="indefinite" restart="never" nodeType="tmRoot"/>
-      </p:par>
-    </p:tnLst>
-  </p:timing>
 </p:sld>
 </file>
 
@@ -10163,7 +10613,7 @@
           <a:p>
             <a:pPr algn="l"/>
             <a:r>
-              <a:rPr lang="en-US" sz="7200" dirty="0" smtClean="0">
+              <a:rPr lang="en-US" sz="7200" dirty="0">
                 <a:solidFill>
                   <a:schemeClr val="bg1"/>
                 </a:solidFill>
@@ -10201,7 +10651,7 @@
           <a:lstStyle/>
           <a:p>
             <a:r>
-              <a:rPr lang="en-US" sz="2400" b="1" dirty="0" smtClean="0">
+              <a:rPr lang="en-US" sz="2400" b="1" dirty="0">
                 <a:solidFill>
                   <a:schemeClr val="bg1"/>
                 </a:solidFill>
@@ -10215,7 +10665,7 @@
               <a:buChar char="•"/>
             </a:pPr>
             <a:r>
-              <a:rPr lang="en-US" sz="2400" dirty="0" smtClean="0">
+              <a:rPr lang="en-US" sz="2400" dirty="0">
                 <a:solidFill>
                   <a:schemeClr val="bg1"/>
                 </a:solidFill>
@@ -10223,7 +10673,7 @@
               <a:t>Right click the </a:t>
             </a:r>
             <a:r>
-              <a:rPr lang="en-US" sz="2400" b="1" dirty="0" smtClean="0">
+              <a:rPr lang="en-US" sz="2400" b="1" dirty="0">
                 <a:solidFill>
                   <a:schemeClr val="bg1"/>
                 </a:solidFill>
@@ -10231,7 +10681,7 @@
               <a:t>object(s) </a:t>
             </a:r>
             <a:r>
-              <a:rPr lang="en-US" sz="2400" dirty="0" smtClean="0">
+              <a:rPr lang="en-US" sz="2400" dirty="0">
                 <a:solidFill>
                   <a:schemeClr val="bg1"/>
                 </a:solidFill>
@@ -10245,7 +10695,7 @@
               <a:buChar char="•"/>
             </a:pPr>
             <a:r>
-              <a:rPr lang="en-US" sz="2400" dirty="0" smtClean="0">
+              <a:rPr lang="en-US" sz="2400" dirty="0">
                 <a:solidFill>
                   <a:schemeClr val="bg1"/>
                 </a:solidFill>
@@ -10265,13 +10715,6 @@
   <p:clrMapOvr>
     <a:masterClrMapping/>
   </p:clrMapOvr>
-  <p:timing>
-    <p:tnLst>
-      <p:par>
-        <p:cTn id="1" dur="indefinite" restart="never" nodeType="tmRoot"/>
-      </p:par>
-    </p:tnLst>
-  </p:timing>
 </p:sld>
 </file>
 
@@ -10308,7 +10751,7 @@
           <a:lstStyle/>
           <a:p>
             <a:r>
-              <a:rPr lang="en-US" dirty="0" smtClean="0"/>
+              <a:rPr lang="en-US" dirty="0"/>
               <a:t>Convert to Picture:: normal case</a:t>
             </a:r>
             <a:endParaRPr lang="en-SG" dirty="0"/>
@@ -10394,7 +10837,7 @@
           <a:lstStyle/>
           <a:p>
             <a:pPr algn="ctr"/>
-            <a:endParaRPr lang="en-US" sz="6000" dirty="0" smtClean="0"/>
+            <a:endParaRPr lang="en-US" sz="6000" dirty="0"/>
           </a:p>
         </p:txBody>
       </p:sp>
@@ -10408,13 +10851,6 @@
   <p:clrMapOvr>
     <a:masterClrMapping/>
   </p:clrMapOvr>
-  <p:timing>
-    <p:tnLst>
-      <p:par>
-        <p:cTn id="1" dur="indefinite" restart="never" nodeType="tmRoot"/>
-      </p:par>
-    </p:tnLst>
-  </p:timing>
 </p:sld>
 </file>
 
@@ -10466,7 +10902,7 @@
           <a:lstStyle/>
           <a:p>
             <a:r>
-              <a:rPr lang="en-US" sz="2800" b="1" dirty="0" smtClean="0">
+              <a:rPr lang="en-US" sz="2800" b="1" dirty="0">
                 <a:solidFill>
                   <a:schemeClr val="accent1"/>
                 </a:solidFill>
@@ -10515,13 +10951,6 @@
   <p:clrMapOvr>
     <a:masterClrMapping/>
   </p:clrMapOvr>
-  <p:timing>
-    <p:tnLst>
-      <p:par>
-        <p:cTn id="1" dur="indefinite" restart="never" nodeType="tmRoot"/>
-      </p:par>
-    </p:tnLst>
-  </p:timing>
 </p:sld>
 </file>
 
@@ -10558,7 +10987,7 @@
           <a:lstStyle/>
           <a:p>
             <a:r>
-              <a:rPr lang="en-US" dirty="0" smtClean="0"/>
+              <a:rPr lang="en-US" dirty="0"/>
               <a:t>Convert to Picture:: group of shapes</a:t>
             </a:r>
             <a:endParaRPr lang="en-SG" dirty="0"/>
@@ -11057,7 +11486,7 @@
           <a:lstStyle/>
           <a:p>
             <a:r>
-              <a:rPr lang="en-US" sz="2800" b="1" dirty="0" smtClean="0">
+              <a:rPr lang="en-US" sz="2800" b="1" dirty="0">
                 <a:solidFill>
                   <a:schemeClr val="accent1"/>
                 </a:solidFill>
@@ -11142,7 +11571,7 @@
           <a:lstStyle/>
           <a:p>
             <a:r>
-              <a:rPr lang="en-US" dirty="0" smtClean="0"/>
+              <a:rPr lang="en-US" dirty="0"/>
               <a:t>Convert to Picture:: check if clipboard is restored</a:t>
             </a:r>
             <a:endParaRPr lang="en-SG" dirty="0"/>
@@ -11159,13 +11588,6 @@
   <p:clrMapOvr>
     <a:masterClrMapping/>
   </p:clrMapOvr>
-  <p:timing>
-    <p:tnLst>
-      <p:par>
-        <p:cTn id="1" dur="indefinite" restart="never" nodeType="tmRoot"/>
-      </p:par>
-    </p:tnLst>
-  </p:timing>
 </p:sld>
 </file>
 

</xml_diff>